<commit_message>
PPT Edits and image push
</commit_message>
<xml_diff>
--- a/olympics by wildcats.pptx
+++ b/olympics by wildcats.pptx
@@ -10,9 +10,10 @@
     <p:sldId id="258" r:id="rId4"/>
     <p:sldId id="259" r:id="rId5"/>
     <p:sldId id="261" r:id="rId6"/>
-    <p:sldId id="262" r:id="rId7"/>
-    <p:sldId id="263" r:id="rId8"/>
-    <p:sldId id="260" r:id="rId9"/>
+    <p:sldId id="264" r:id="rId7"/>
+    <p:sldId id="262" r:id="rId8"/>
+    <p:sldId id="263" r:id="rId9"/>
+    <p:sldId id="260" r:id="rId10"/>
   </p:sldIdLst>
   <p:sldSz cx="12192000" cy="6858000"/>
   <p:notesSz cx="6858000" cy="9144000"/>
@@ -111,6 +112,11 @@
       </a:defRPr>
     </a:lvl9pPr>
   </p:defaultTextStyle>
+  <p:extLst>
+    <p:ext uri="{EFAFB233-063F-42B5-8137-9DF3F51BA10A}">
+      <p15:sldGuideLst xmlns:p15="http://schemas.microsoft.com/office/powerpoint/2012/main"/>
+    </p:ext>
+  </p:extLst>
 </p:presentation>
 </file>
 
@@ -263,7 +269,7 @@
           <a:p>
             <a:fld id="{3321EEB9-68B1-4379-896F-CAC32EF57190}" type="datetimeFigureOut">
               <a:rPr lang="en-US" smtClean="0"/>
-              <a:t>6/30/2021</a:t>
+              <a:t>03-Jul-21</a:t>
             </a:fld>
             <a:endParaRPr lang="en-US"/>
           </a:p>
@@ -495,7 +501,7 @@
           <a:p>
             <a:fld id="{3321EEB9-68B1-4379-896F-CAC32EF57190}" type="datetimeFigureOut">
               <a:rPr lang="en-US" smtClean="0"/>
-              <a:t>6/30/2021</a:t>
+              <a:t>03-Jul-21</a:t>
             </a:fld>
             <a:endParaRPr lang="en-US"/>
           </a:p>
@@ -737,7 +743,7 @@
           <a:p>
             <a:fld id="{3321EEB9-68B1-4379-896F-CAC32EF57190}" type="datetimeFigureOut">
               <a:rPr lang="en-US" smtClean="0"/>
-              <a:t>6/30/2021</a:t>
+              <a:t>03-Jul-21</a:t>
             </a:fld>
             <a:endParaRPr lang="en-US"/>
           </a:p>
@@ -969,7 +975,7 @@
           <a:p>
             <a:fld id="{3321EEB9-68B1-4379-896F-CAC32EF57190}" type="datetimeFigureOut">
               <a:rPr lang="en-US" smtClean="0"/>
-              <a:t>6/30/2021</a:t>
+              <a:t>03-Jul-21</a:t>
             </a:fld>
             <a:endParaRPr lang="en-US"/>
           </a:p>
@@ -1245,7 +1251,7 @@
           <a:p>
             <a:fld id="{3321EEB9-68B1-4379-896F-CAC32EF57190}" type="datetimeFigureOut">
               <a:rPr lang="en-US" smtClean="0"/>
-              <a:t>6/30/2021</a:t>
+              <a:t>03-Jul-21</a:t>
             </a:fld>
             <a:endParaRPr lang="en-US"/>
           </a:p>
@@ -1577,7 +1583,7 @@
           <a:p>
             <a:fld id="{3321EEB9-68B1-4379-896F-CAC32EF57190}" type="datetimeFigureOut">
               <a:rPr lang="en-US" smtClean="0"/>
-              <a:t>6/30/2021</a:t>
+              <a:t>03-Jul-21</a:t>
             </a:fld>
             <a:endParaRPr lang="en-US"/>
           </a:p>
@@ -2056,7 +2062,7 @@
           <a:p>
             <a:fld id="{3321EEB9-68B1-4379-896F-CAC32EF57190}" type="datetimeFigureOut">
               <a:rPr lang="en-US" smtClean="0"/>
-              <a:t>6/30/2021</a:t>
+              <a:t>03-Jul-21</a:t>
             </a:fld>
             <a:endParaRPr lang="en-US"/>
           </a:p>
@@ -2198,7 +2204,7 @@
           <a:p>
             <a:fld id="{3321EEB9-68B1-4379-896F-CAC32EF57190}" type="datetimeFigureOut">
               <a:rPr lang="en-US" smtClean="0"/>
-              <a:t>6/30/2021</a:t>
+              <a:t>03-Jul-21</a:t>
             </a:fld>
             <a:endParaRPr lang="en-US"/>
           </a:p>
@@ -2311,7 +2317,7 @@
           <a:p>
             <a:fld id="{3321EEB9-68B1-4379-896F-CAC32EF57190}" type="datetimeFigureOut">
               <a:rPr lang="en-US" smtClean="0"/>
-              <a:t>6/30/2021</a:t>
+              <a:t>03-Jul-21</a:t>
             </a:fld>
             <a:endParaRPr lang="en-US"/>
           </a:p>
@@ -2656,7 +2662,7 @@
           <a:p>
             <a:fld id="{3321EEB9-68B1-4379-896F-CAC32EF57190}" type="datetimeFigureOut">
               <a:rPr lang="en-US" smtClean="0"/>
-              <a:t>6/30/2021</a:t>
+              <a:t>03-Jul-21</a:t>
             </a:fld>
             <a:endParaRPr lang="en-US"/>
           </a:p>
@@ -2945,7 +2951,7 @@
           <a:p>
             <a:fld id="{3321EEB9-68B1-4379-896F-CAC32EF57190}" type="datetimeFigureOut">
               <a:rPr lang="en-US" smtClean="0"/>
-              <a:t>6/30/2021</a:t>
+              <a:t>03-Jul-21</a:t>
             </a:fld>
             <a:endParaRPr lang="en-US"/>
           </a:p>
@@ -3220,7 +3226,7 @@
           <a:p>
             <a:fld id="{3321EEB9-68B1-4379-896F-CAC32EF57190}" type="datetimeFigureOut">
               <a:rPr lang="en-US" smtClean="0"/>
-              <a:t>6/30/2021</a:t>
+              <a:t>03-Jul-21</a:t>
             </a:fld>
             <a:endParaRPr lang="en-US"/>
           </a:p>
@@ -3665,21 +3671,15 @@
           </a:bodyPr>
           <a:lstStyle/>
           <a:p>
+            <a:pPr algn="ctr"/>
             <a:r>
               <a:rPr lang="en-US" sz="2800" b="1" i="0" u="none" strike="noStrike" dirty="0">
-                <a:solidFill>
-                  <a:srgbClr val="0070C0"/>
-                </a:solidFill>
                 <a:effectLst/>
                 <a:latin typeface="Arial" panose="020B0604020202020204" pitchFamily="34" charset="0"/>
               </a:rPr>
               <a:t>How certain aspects of Olympics have changed over the years and affected medal counts</a:t>
             </a:r>
-            <a:endParaRPr lang="en-US" sz="2800" b="1" dirty="0">
-              <a:solidFill>
-                <a:srgbClr val="0070C0"/>
-              </a:solidFill>
-            </a:endParaRPr>
+            <a:endParaRPr lang="en-US" sz="2800" b="1" dirty="0"/>
           </a:p>
         </p:txBody>
       </p:sp>
@@ -3762,6 +3762,47 @@
           </a:p>
         </p:txBody>
       </p:sp>
+      <p:pic>
+        <p:nvPicPr>
+          <p:cNvPr id="1026" name="Picture 2" descr="Olympic symbols - Wikipedia"/>
+          <p:cNvPicPr>
+            <a:picLocks noChangeAspect="1" noChangeArrowheads="1"/>
+          </p:cNvPicPr>
+          <p:nvPr/>
+        </p:nvPicPr>
+        <p:blipFill>
+          <a:blip r:embed="rId2">
+            <a:extLst>
+              <a:ext uri="{28A0092B-C50C-407E-A947-70E740481C1C}">
+                <a14:useLocalDpi xmlns:a14="http://schemas.microsoft.com/office/drawing/2010/main" val="0"/>
+              </a:ext>
+            </a:extLst>
+          </a:blip>
+          <a:srcRect/>
+          <a:stretch>
+            <a:fillRect/>
+          </a:stretch>
+        </p:blipFill>
+        <p:spPr bwMode="auto">
+          <a:xfrm>
+            <a:off x="955589" y="2653383"/>
+            <a:ext cx="7092779" cy="3274500"/>
+          </a:xfrm>
+          <a:prstGeom prst="rect">
+            <a:avLst/>
+          </a:prstGeom>
+          <a:noFill/>
+          <a:extLst>
+            <a:ext uri="{909E8E84-426E-40DD-AFC4-6F175D3DCCD1}">
+              <a14:hiddenFill xmlns:a14="http://schemas.microsoft.com/office/drawing/2010/main">
+                <a:solidFill>
+                  <a:srgbClr val="FFFFFF"/>
+                </a:solidFill>
+              </a14:hiddenFill>
+            </a:ext>
+          </a:extLst>
+        </p:spPr>
+      </p:pic>
     </p:spTree>
     <p:extLst>
       <p:ext uri="{BB962C8B-B14F-4D97-AF65-F5344CB8AC3E}">
@@ -3853,7 +3894,7 @@
         <p:spPr>
           <a:xfrm>
             <a:off x="704850" y="1186934"/>
-            <a:ext cx="10687050" cy="1477328"/>
+            <a:ext cx="10687050" cy="1754326"/>
           </a:xfrm>
           <a:prstGeom prst="rect">
             <a:avLst/>
@@ -3911,15 +3952,26 @@
               <a:buChar char="•"/>
             </a:pPr>
             <a:r>
-              <a:rPr lang="en-US" dirty="0">
+              <a:rPr lang="en-US" dirty="0" smtClean="0">
                 <a:solidFill>
                   <a:srgbClr val="1D1C1D"/>
                 </a:solidFill>
                 <a:latin typeface="Arial" panose="020B0604020202020204" pitchFamily="34" charset="0"/>
               </a:rPr>
-              <a:t>Olympic has started since 1896</a:t>
-            </a:r>
-            <a:endParaRPr lang="en-US" dirty="0"/>
+              <a:t>The first Summer Olympic Games was in 1896; first Winter Games was in 1924.</a:t>
+            </a:r>
+          </a:p>
+          <a:p>
+            <a:pPr marL="285750" indent="-285750">
+              <a:buFont typeface="Arial" panose="020B0604020202020204" pitchFamily="34" charset="0"/>
+              <a:buChar char="•"/>
+            </a:pPr>
+            <a:endParaRPr lang="en-US" dirty="0" smtClean="0">
+              <a:solidFill>
+                <a:srgbClr val="1D1C1D"/>
+              </a:solidFill>
+              <a:latin typeface="Arial" panose="020B0604020202020204" pitchFamily="34" charset="0"/>
+            </a:endParaRPr>
           </a:p>
         </p:txBody>
       </p:sp>
@@ -4023,7 +4075,7 @@
         </p:blipFill>
         <p:spPr>
           <a:xfrm>
-            <a:off x="2304216" y="1737241"/>
+            <a:off x="295274" y="1737241"/>
             <a:ext cx="7316867" cy="4573042"/>
           </a:xfrm>
           <a:prstGeom prst="rect">
@@ -4077,6 +4129,30 @@
           </a:p>
         </p:txBody>
       </p:sp>
+      <p:pic>
+        <p:nvPicPr>
+          <p:cNvPr id="2" name="Picture 1"/>
+          <p:cNvPicPr>
+            <a:picLocks noChangeAspect="1"/>
+          </p:cNvPicPr>
+          <p:nvPr/>
+        </p:nvPicPr>
+        <p:blipFill>
+          <a:blip r:embed="rId3"/>
+          <a:stretch>
+            <a:fillRect/>
+          </a:stretch>
+        </p:blipFill>
+        <p:spPr>
+          <a:xfrm>
+            <a:off x="7177985" y="3489792"/>
+            <a:ext cx="4581395" cy="1067939"/>
+          </a:xfrm>
+          <a:prstGeom prst="rect">
+            <a:avLst/>
+          </a:prstGeom>
+        </p:spPr>
+      </p:pic>
     </p:spTree>
     <p:extLst>
       <p:ext uri="{BB962C8B-B14F-4D97-AF65-F5344CB8AC3E}">
@@ -4185,7 +4261,7 @@
         </p:blipFill>
         <p:spPr>
           <a:xfrm>
-            <a:off x="628670" y="1938450"/>
+            <a:off x="628669" y="1663538"/>
             <a:ext cx="4471650" cy="2981100"/>
           </a:xfrm>
           <a:prstGeom prst="rect">
@@ -4220,7 +4296,7 @@
         </p:blipFill>
         <p:spPr>
           <a:xfrm>
-            <a:off x="5018405" y="2079226"/>
+            <a:off x="5100319" y="1790901"/>
             <a:ext cx="6435007" cy="3275094"/>
           </a:xfrm>
           <a:prstGeom prst="rect">
@@ -4270,6 +4346,54 @@
           </a:p>
         </p:txBody>
       </p:sp>
+      <p:pic>
+        <p:nvPicPr>
+          <p:cNvPr id="3" name="Picture 2"/>
+          <p:cNvPicPr>
+            <a:picLocks noChangeAspect="1"/>
+          </p:cNvPicPr>
+          <p:nvPr/>
+        </p:nvPicPr>
+        <p:blipFill>
+          <a:blip r:embed="rId4"/>
+          <a:stretch>
+            <a:fillRect/>
+          </a:stretch>
+        </p:blipFill>
+        <p:spPr>
+          <a:xfrm>
+            <a:off x="295274" y="4981458"/>
+            <a:ext cx="4805045" cy="1064258"/>
+          </a:xfrm>
+          <a:prstGeom prst="rect">
+            <a:avLst/>
+          </a:prstGeom>
+        </p:spPr>
+      </p:pic>
+      <p:pic>
+        <p:nvPicPr>
+          <p:cNvPr id="5" name="Picture 4"/>
+          <p:cNvPicPr>
+            <a:picLocks noChangeAspect="1"/>
+          </p:cNvPicPr>
+          <p:nvPr/>
+        </p:nvPicPr>
+        <p:blipFill>
+          <a:blip r:embed="rId5"/>
+          <a:stretch>
+            <a:fillRect/>
+          </a:stretch>
+        </p:blipFill>
+        <p:spPr>
+          <a:xfrm>
+            <a:off x="5233944" y="4931455"/>
+            <a:ext cx="6167756" cy="1164263"/>
+          </a:xfrm>
+          <a:prstGeom prst="rect">
+            <a:avLst/>
+          </a:prstGeom>
+        </p:spPr>
+      </p:pic>
     </p:spTree>
     <p:extLst>
       <p:ext uri="{BB962C8B-B14F-4D97-AF65-F5344CB8AC3E}">
@@ -4408,7 +4532,7 @@
         </p:blipFill>
         <p:spPr>
           <a:xfrm>
-            <a:off x="1637011" y="2437273"/>
+            <a:off x="457201" y="2225328"/>
             <a:ext cx="3230880" cy="3567288"/>
           </a:xfrm>
           <a:prstGeom prst="rect">
@@ -4443,7 +4567,7 @@
         </p:blipFill>
         <p:spPr>
           <a:xfrm>
-            <a:off x="6096000" y="2498958"/>
+            <a:off x="4055130" y="2224561"/>
             <a:ext cx="3138042" cy="3658433"/>
           </a:xfrm>
           <a:prstGeom prst="rect">
@@ -4573,6 +4697,78 @@
           </a:p>
         </p:txBody>
       </p:sp>
+      <p:pic>
+        <p:nvPicPr>
+          <p:cNvPr id="3" name="Picture 2"/>
+          <p:cNvPicPr>
+            <a:picLocks noChangeAspect="1"/>
+          </p:cNvPicPr>
+          <p:nvPr/>
+        </p:nvPicPr>
+        <p:blipFill>
+          <a:blip r:embed="rId5"/>
+          <a:stretch>
+            <a:fillRect/>
+          </a:stretch>
+        </p:blipFill>
+        <p:spPr>
+          <a:xfrm>
+            <a:off x="8173403" y="2529826"/>
+            <a:ext cx="3687076" cy="1236695"/>
+          </a:xfrm>
+          <a:prstGeom prst="rect">
+            <a:avLst/>
+          </a:prstGeom>
+        </p:spPr>
+      </p:pic>
+      <p:pic>
+        <p:nvPicPr>
+          <p:cNvPr id="6" name="Picture 5"/>
+          <p:cNvPicPr>
+            <a:picLocks noChangeAspect="1"/>
+          </p:cNvPicPr>
+          <p:nvPr/>
+        </p:nvPicPr>
+        <p:blipFill>
+          <a:blip r:embed="rId6"/>
+          <a:stretch>
+            <a:fillRect/>
+          </a:stretch>
+        </p:blipFill>
+        <p:spPr>
+          <a:xfrm>
+            <a:off x="8173403" y="3818537"/>
+            <a:ext cx="3687076" cy="1216355"/>
+          </a:xfrm>
+          <a:prstGeom prst="rect">
+            <a:avLst/>
+          </a:prstGeom>
+        </p:spPr>
+      </p:pic>
+      <p:pic>
+        <p:nvPicPr>
+          <p:cNvPr id="8" name="Picture 7"/>
+          <p:cNvPicPr>
+            <a:picLocks noChangeAspect="1"/>
+          </p:cNvPicPr>
+          <p:nvPr/>
+        </p:nvPicPr>
+        <p:blipFill>
+          <a:blip r:embed="rId7"/>
+          <a:stretch>
+            <a:fillRect/>
+          </a:stretch>
+        </p:blipFill>
+        <p:spPr>
+          <a:xfrm>
+            <a:off x="8173403" y="5086907"/>
+            <a:ext cx="3687076" cy="1257085"/>
+          </a:xfrm>
+          <a:prstGeom prst="rect">
+            <a:avLst/>
+          </a:prstGeom>
+        </p:spPr>
+      </p:pic>
     </p:spTree>
     <p:extLst>
       <p:ext uri="{BB962C8B-B14F-4D97-AF65-F5344CB8AC3E}">
@@ -4605,20 +4801,80 @@
       </p:grpSpPr>
       <p:sp>
         <p:nvSpPr>
-          <p:cNvPr id="2" name="テキスト ボックス 1">
-            <a:extLst>
-              <a:ext uri="{FF2B5EF4-FFF2-40B4-BE49-F238E27FC236}">
-                <a16:creationId xmlns:a16="http://schemas.microsoft.com/office/drawing/2014/main" id="{02706F4B-FB0C-4B84-ACA3-267780375BED}"/>
-              </a:ext>
-            </a:extLst>
-          </p:cNvPr>
+          <p:cNvPr id="2" name="Title 1"/>
+          <p:cNvSpPr>
+            <a:spLocks noGrp="1"/>
+          </p:cNvSpPr>
+          <p:nvPr>
+            <p:ph type="title"/>
+          </p:nvPr>
+        </p:nvSpPr>
+        <p:spPr>
+          <a:xfrm>
+            <a:off x="325041" y="186479"/>
+            <a:ext cx="10515600" cy="480131"/>
+          </a:xfrm>
+          <a:noFill/>
+        </p:spPr>
+        <p:txBody>
+          <a:bodyPr wrap="square" rtlCol="0">
+            <a:spAutoFit/>
+          </a:bodyPr>
+          <a:lstStyle/>
+          <a:p>
+            <a:r>
+              <a:rPr lang="en-US" sz="2800" b="1" dirty="0">
+                <a:solidFill>
+                  <a:srgbClr val="0070C0"/>
+                </a:solidFill>
+                <a:latin typeface="+mn-lt"/>
+                <a:ea typeface="+mn-ea"/>
+                <a:cs typeface="+mn-cs"/>
+              </a:rPr>
+              <a:t>Medals Won by Age Group</a:t>
+            </a:r>
+          </a:p>
+        </p:txBody>
+      </p:sp>
+      <p:pic>
+        <p:nvPicPr>
+          <p:cNvPr id="6" name="Content Placeholder 5"/>
+          <p:cNvPicPr>
+            <a:picLocks noGrp="1" noChangeAspect="1"/>
+          </p:cNvPicPr>
+          <p:nvPr>
+            <p:ph idx="1"/>
+          </p:nvPr>
+        </p:nvPicPr>
+        <p:blipFill>
+          <a:blip r:embed="rId2">
+            <a:extLst>
+              <a:ext uri="{28A0092B-C50C-407E-A947-70E740481C1C}">
+                <a14:useLocalDpi xmlns:a14="http://schemas.microsoft.com/office/drawing/2010/main" val="0"/>
+              </a:ext>
+            </a:extLst>
+          </a:blip>
+          <a:stretch>
+            <a:fillRect/>
+          </a:stretch>
+        </p:blipFill>
+        <p:spPr>
+          <a:xfrm>
+            <a:off x="325041" y="2438164"/>
+            <a:ext cx="11541918" cy="3847306"/>
+          </a:xfrm>
+        </p:spPr>
+      </p:pic>
+      <p:sp>
+        <p:nvSpPr>
+          <p:cNvPr id="8" name="TextBox 7"/>
           <p:cNvSpPr txBox="1"/>
           <p:nvPr/>
         </p:nvSpPr>
         <p:spPr>
           <a:xfrm>
-            <a:off x="295274" y="219075"/>
-            <a:ext cx="10687051" cy="523220"/>
+            <a:off x="411892" y="666610"/>
+            <a:ext cx="4530811" cy="646331"/>
           </a:xfrm>
           <a:prstGeom prst="rect">
             <a:avLst/>
@@ -4632,74 +4888,41 @@
           <a:lstStyle/>
           <a:p>
             <a:r>
-              <a:rPr lang="en-US" sz="2800" b="1" dirty="0">
-                <a:solidFill>
-                  <a:srgbClr val="0070C0"/>
-                </a:solidFill>
-              </a:rPr>
-              <a:t>Medals won by countries</a:t>
-            </a:r>
-          </a:p>
-        </p:txBody>
-      </p:sp>
-      <p:sp>
-        <p:nvSpPr>
-          <p:cNvPr id="4" name="テキスト ボックス 3">
-            <a:extLst>
-              <a:ext uri="{FF2B5EF4-FFF2-40B4-BE49-F238E27FC236}">
-                <a16:creationId xmlns:a16="http://schemas.microsoft.com/office/drawing/2014/main" id="{6BC0C496-8091-47C5-ADA8-41CF4A9DA2FC}"/>
-              </a:ext>
-            </a:extLst>
-          </p:cNvPr>
-          <p:cNvSpPr txBox="1"/>
+              <a:rPr lang="en-US" dirty="0" smtClean="0"/>
+              <a:t>The best chance for someone to win any medal would be between the ages of 20-30. </a:t>
+            </a:r>
+            <a:endParaRPr lang="en-US" dirty="0"/>
+          </a:p>
+        </p:txBody>
+      </p:sp>
+      <p:pic>
+        <p:nvPicPr>
+          <p:cNvPr id="9" name="Picture 8"/>
+          <p:cNvPicPr>
+            <a:picLocks noChangeAspect="1"/>
+          </p:cNvPicPr>
           <p:nvPr/>
-        </p:nvSpPr>
-        <p:spPr>
-          <a:xfrm>
-            <a:off x="752475" y="967859"/>
-            <a:ext cx="10687050" cy="646331"/>
+        </p:nvPicPr>
+        <p:blipFill>
+          <a:blip r:embed="rId3"/>
+          <a:stretch>
+            <a:fillRect/>
+          </a:stretch>
+        </p:blipFill>
+        <p:spPr>
+          <a:xfrm>
+            <a:off x="5741773" y="186478"/>
+            <a:ext cx="6290184" cy="2334299"/>
           </a:xfrm>
           <a:prstGeom prst="rect">
             <a:avLst/>
           </a:prstGeom>
-          <a:noFill/>
-        </p:spPr>
-        <p:txBody>
-          <a:bodyPr wrap="square">
-            <a:spAutoFit/>
-          </a:bodyPr>
-          <a:lstStyle/>
-          <a:p>
-            <a:r>
-              <a:rPr lang="en-US" sz="1800" b="0" i="0" u="none" strike="noStrike" dirty="0">
-                <a:solidFill>
-                  <a:srgbClr val="1D1C1D"/>
-                </a:solidFill>
-                <a:effectLst/>
-                <a:latin typeface="Arial" panose="020B0604020202020204" pitchFamily="34" charset="0"/>
-              </a:rPr>
-              <a:t>Summer/Winter</a:t>
-            </a:r>
-          </a:p>
-          <a:p>
-            <a:r>
-              <a:rPr lang="en-US" sz="1800" b="0" i="0" u="none" strike="noStrike" dirty="0">
-                <a:solidFill>
-                  <a:srgbClr val="1D1C1D"/>
-                </a:solidFill>
-                <a:effectLst/>
-                <a:latin typeface="Arial" panose="020B0604020202020204" pitchFamily="34" charset="0"/>
-              </a:rPr>
-              <a:t>Top 10 countries?</a:t>
-            </a:r>
-            <a:endParaRPr lang="en-US" dirty="0"/>
-          </a:p>
-        </p:txBody>
-      </p:sp>
+        </p:spPr>
+      </p:pic>
     </p:spTree>
     <p:extLst>
       <p:ext uri="{BB962C8B-B14F-4D97-AF65-F5344CB8AC3E}">
-        <p14:creationId xmlns:p14="http://schemas.microsoft.com/office/powerpoint/2010/main" val="968485070"/>
+        <p14:creationId xmlns:p14="http://schemas.microsoft.com/office/powerpoint/2010/main" val="3430190648"/>
       </p:ext>
     </p:extLst>
   </p:cSld>
@@ -4760,6 +4983,129 @@
                   <a:srgbClr val="0070C0"/>
                 </a:solidFill>
               </a:rPr>
+              <a:t>Medals won by countries</a:t>
+            </a:r>
+          </a:p>
+        </p:txBody>
+      </p:sp>
+      <p:sp>
+        <p:nvSpPr>
+          <p:cNvPr id="4" name="テキスト ボックス 3">
+            <a:extLst>
+              <a:ext uri="{FF2B5EF4-FFF2-40B4-BE49-F238E27FC236}">
+                <a16:creationId xmlns:a16="http://schemas.microsoft.com/office/drawing/2014/main" id="{6BC0C496-8091-47C5-ADA8-41CF4A9DA2FC}"/>
+              </a:ext>
+            </a:extLst>
+          </p:cNvPr>
+          <p:cNvSpPr txBox="1"/>
+          <p:nvPr/>
+        </p:nvSpPr>
+        <p:spPr>
+          <a:xfrm>
+            <a:off x="752475" y="967859"/>
+            <a:ext cx="10687050" cy="646331"/>
+          </a:xfrm>
+          <a:prstGeom prst="rect">
+            <a:avLst/>
+          </a:prstGeom>
+          <a:noFill/>
+        </p:spPr>
+        <p:txBody>
+          <a:bodyPr wrap="square">
+            <a:spAutoFit/>
+          </a:bodyPr>
+          <a:lstStyle/>
+          <a:p>
+            <a:r>
+              <a:rPr lang="en-US" sz="1800" b="0" i="0" u="none" strike="noStrike" dirty="0">
+                <a:solidFill>
+                  <a:srgbClr val="1D1C1D"/>
+                </a:solidFill>
+                <a:effectLst/>
+                <a:latin typeface="Arial" panose="020B0604020202020204" pitchFamily="34" charset="0"/>
+              </a:rPr>
+              <a:t>Summer/Winter</a:t>
+            </a:r>
+          </a:p>
+          <a:p>
+            <a:r>
+              <a:rPr lang="en-US" sz="1800" b="0" i="0" u="none" strike="noStrike" dirty="0">
+                <a:solidFill>
+                  <a:srgbClr val="1D1C1D"/>
+                </a:solidFill>
+                <a:effectLst/>
+                <a:latin typeface="Arial" panose="020B0604020202020204" pitchFamily="34" charset="0"/>
+              </a:rPr>
+              <a:t>Top 10 countries?</a:t>
+            </a:r>
+            <a:endParaRPr lang="en-US" dirty="0"/>
+          </a:p>
+        </p:txBody>
+      </p:sp>
+    </p:spTree>
+    <p:extLst>
+      <p:ext uri="{BB962C8B-B14F-4D97-AF65-F5344CB8AC3E}">
+        <p14:creationId xmlns:p14="http://schemas.microsoft.com/office/powerpoint/2010/main" val="968485070"/>
+      </p:ext>
+    </p:extLst>
+  </p:cSld>
+  <p:clrMapOvr>
+    <a:masterClrMapping/>
+  </p:clrMapOvr>
+</p:sld>
+</file>
+
+<file path=ppt/slides/slide8.xml><?xml version="1.0" encoding="utf-8"?>
+<p:sld xmlns:a="http://schemas.openxmlformats.org/drawingml/2006/main" xmlns:r="http://schemas.openxmlformats.org/officeDocument/2006/relationships" xmlns:p="http://schemas.openxmlformats.org/presentationml/2006/main">
+  <p:cSld>
+    <p:spTree>
+      <p:nvGrpSpPr>
+        <p:cNvPr id="1" name=""/>
+        <p:cNvGrpSpPr/>
+        <p:nvPr/>
+      </p:nvGrpSpPr>
+      <p:grpSpPr>
+        <a:xfrm>
+          <a:off x="0" y="0"/>
+          <a:ext cx="0" cy="0"/>
+          <a:chOff x="0" y="0"/>
+          <a:chExt cx="0" cy="0"/>
+        </a:xfrm>
+      </p:grpSpPr>
+      <p:sp>
+        <p:nvSpPr>
+          <p:cNvPr id="2" name="テキスト ボックス 1">
+            <a:extLst>
+              <a:ext uri="{FF2B5EF4-FFF2-40B4-BE49-F238E27FC236}">
+                <a16:creationId xmlns:a16="http://schemas.microsoft.com/office/drawing/2014/main" id="{02706F4B-FB0C-4B84-ACA3-267780375BED}"/>
+              </a:ext>
+            </a:extLst>
+          </p:cNvPr>
+          <p:cNvSpPr txBox="1"/>
+          <p:nvPr/>
+        </p:nvSpPr>
+        <p:spPr>
+          <a:xfrm>
+            <a:off x="295274" y="219075"/>
+            <a:ext cx="10687051" cy="523220"/>
+          </a:xfrm>
+          <a:prstGeom prst="rect">
+            <a:avLst/>
+          </a:prstGeom>
+          <a:noFill/>
+        </p:spPr>
+        <p:txBody>
+          <a:bodyPr wrap="square" rtlCol="0">
+            <a:spAutoFit/>
+          </a:bodyPr>
+          <a:lstStyle/>
+          <a:p>
+            <a:r>
+              <a:rPr lang="en-US" sz="2800" b="1" dirty="0">
+                <a:solidFill>
+                  <a:srgbClr val="0070C0"/>
+                </a:solidFill>
+              </a:rPr>
               <a:t>US medals vs the other regions</a:t>
             </a:r>
           </a:p>
@@ -4807,6 +5153,114 @@
           </a:p>
         </p:txBody>
       </p:sp>
+      <p:pic>
+        <p:nvPicPr>
+          <p:cNvPr id="3" name="Picture 2"/>
+          <p:cNvPicPr>
+            <a:picLocks noChangeAspect="1"/>
+          </p:cNvPicPr>
+          <p:nvPr/>
+        </p:nvPicPr>
+        <p:blipFill>
+          <a:blip r:embed="rId2">
+            <a:extLst>
+              <a:ext uri="{28A0092B-C50C-407E-A947-70E740481C1C}">
+                <a14:useLocalDpi xmlns:a14="http://schemas.microsoft.com/office/drawing/2010/main" val="0"/>
+              </a:ext>
+            </a:extLst>
+          </a:blip>
+          <a:stretch>
+            <a:fillRect/>
+          </a:stretch>
+        </p:blipFill>
+        <p:spPr>
+          <a:xfrm>
+            <a:off x="295274" y="1337191"/>
+            <a:ext cx="5833770" cy="3111344"/>
+          </a:xfrm>
+          <a:prstGeom prst="rect">
+            <a:avLst/>
+          </a:prstGeom>
+        </p:spPr>
+      </p:pic>
+      <p:pic>
+        <p:nvPicPr>
+          <p:cNvPr id="5" name="Picture 4"/>
+          <p:cNvPicPr>
+            <a:picLocks noChangeAspect="1"/>
+          </p:cNvPicPr>
+          <p:nvPr/>
+        </p:nvPicPr>
+        <p:blipFill>
+          <a:blip r:embed="rId3">
+            <a:extLst>
+              <a:ext uri="{28A0092B-C50C-407E-A947-70E740481C1C}">
+                <a14:useLocalDpi xmlns:a14="http://schemas.microsoft.com/office/drawing/2010/main" val="0"/>
+              </a:ext>
+            </a:extLst>
+          </a:blip>
+          <a:stretch>
+            <a:fillRect/>
+          </a:stretch>
+        </p:blipFill>
+        <p:spPr>
+          <a:xfrm>
+            <a:off x="6209950" y="1337192"/>
+            <a:ext cx="5833768" cy="3111344"/>
+          </a:xfrm>
+          <a:prstGeom prst="rect">
+            <a:avLst/>
+          </a:prstGeom>
+        </p:spPr>
+      </p:pic>
+      <p:pic>
+        <p:nvPicPr>
+          <p:cNvPr id="6" name="Picture 5"/>
+          <p:cNvPicPr>
+            <a:picLocks noChangeAspect="1"/>
+          </p:cNvPicPr>
+          <p:nvPr/>
+        </p:nvPicPr>
+        <p:blipFill>
+          <a:blip r:embed="rId4"/>
+          <a:stretch>
+            <a:fillRect/>
+          </a:stretch>
+        </p:blipFill>
+        <p:spPr>
+          <a:xfrm>
+            <a:off x="6269527" y="219075"/>
+            <a:ext cx="5714613" cy="1079495"/>
+          </a:xfrm>
+          <a:prstGeom prst="rect">
+            <a:avLst/>
+          </a:prstGeom>
+        </p:spPr>
+      </p:pic>
+      <p:pic>
+        <p:nvPicPr>
+          <p:cNvPr id="7" name="Picture 6"/>
+          <p:cNvPicPr>
+            <a:picLocks noChangeAspect="1"/>
+          </p:cNvPicPr>
+          <p:nvPr/>
+        </p:nvPicPr>
+        <p:blipFill>
+          <a:blip r:embed="rId5"/>
+          <a:stretch>
+            <a:fillRect/>
+          </a:stretch>
+        </p:blipFill>
+        <p:spPr>
+          <a:xfrm>
+            <a:off x="2338672" y="5043431"/>
+            <a:ext cx="7514656" cy="1307978"/>
+          </a:xfrm>
+          <a:prstGeom prst="rect">
+            <a:avLst/>
+          </a:prstGeom>
+        </p:spPr>
+      </p:pic>
     </p:spTree>
     <p:extLst>
       <p:ext uri="{BB962C8B-B14F-4D97-AF65-F5344CB8AC3E}">
@@ -4820,7 +5274,7 @@
 </p:sld>
 </file>
 
-<file path=ppt/slides/slide8.xml><?xml version="1.0" encoding="utf-8"?>
+<file path=ppt/slides/slide9.xml><?xml version="1.0" encoding="utf-8"?>
 <p:sld xmlns:a="http://schemas.openxmlformats.org/drawingml/2006/main" xmlns:r="http://schemas.openxmlformats.org/officeDocument/2006/relationships" xmlns:p="http://schemas.openxmlformats.org/presentationml/2006/main">
   <p:cSld>
     <p:spTree>

</xml_diff>

<commit_message>
updated after sync on 7/5
</commit_message>
<xml_diff>
--- a/olympics by wildcats.pptx
+++ b/olympics by wildcats.pptx
@@ -4,16 +4,22 @@
   <p:sldMasterIdLst>
     <p:sldMasterId id="2147483648" r:id="rId1"/>
   </p:sldMasterIdLst>
+  <p:notesMasterIdLst>
+    <p:notesMasterId r:id="rId14"/>
+  </p:notesMasterIdLst>
   <p:sldIdLst>
     <p:sldId id="256" r:id="rId2"/>
     <p:sldId id="257" r:id="rId3"/>
-    <p:sldId id="258" r:id="rId4"/>
-    <p:sldId id="259" r:id="rId5"/>
-    <p:sldId id="261" r:id="rId6"/>
-    <p:sldId id="264" r:id="rId7"/>
-    <p:sldId id="262" r:id="rId8"/>
-    <p:sldId id="263" r:id="rId9"/>
-    <p:sldId id="260" r:id="rId10"/>
+    <p:sldId id="267" r:id="rId4"/>
+    <p:sldId id="264" r:id="rId5"/>
+    <p:sldId id="268" r:id="rId6"/>
+    <p:sldId id="266" r:id="rId7"/>
+    <p:sldId id="271" r:id="rId8"/>
+    <p:sldId id="262" r:id="rId9"/>
+    <p:sldId id="269" r:id="rId10"/>
+    <p:sldId id="270" r:id="rId11"/>
+    <p:sldId id="263" r:id="rId12"/>
+    <p:sldId id="260" r:id="rId13"/>
   </p:sldIdLst>
   <p:sldSz cx="12192000" cy="6858000"/>
   <p:notesSz cx="6858000" cy="9144000"/>
@@ -120,6 +126,1304 @@
 </p:presentation>
 </file>
 
+<file path=ppt/notesMasters/notesMaster1.xml><?xml version="1.0" encoding="utf-8"?>
+<p:notesMaster xmlns:a="http://schemas.openxmlformats.org/drawingml/2006/main" xmlns:r="http://schemas.openxmlformats.org/officeDocument/2006/relationships" xmlns:p="http://schemas.openxmlformats.org/presentationml/2006/main">
+  <p:cSld>
+    <p:bg>
+      <p:bgRef idx="1001">
+        <a:schemeClr val="bg1"/>
+      </p:bgRef>
+    </p:bg>
+    <p:spTree>
+      <p:nvGrpSpPr>
+        <p:cNvPr id="1" name=""/>
+        <p:cNvGrpSpPr/>
+        <p:nvPr/>
+      </p:nvGrpSpPr>
+      <p:grpSpPr>
+        <a:xfrm>
+          <a:off x="0" y="0"/>
+          <a:ext cx="0" cy="0"/>
+          <a:chOff x="0" y="0"/>
+          <a:chExt cx="0" cy="0"/>
+        </a:xfrm>
+      </p:grpSpPr>
+      <p:sp>
+        <p:nvSpPr>
+          <p:cNvPr id="2" name="ヘッダー プレースホルダー 1"/>
+          <p:cNvSpPr>
+            <a:spLocks noGrp="1"/>
+          </p:cNvSpPr>
+          <p:nvPr>
+            <p:ph type="hdr" sz="quarter"/>
+          </p:nvPr>
+        </p:nvSpPr>
+        <p:spPr>
+          <a:xfrm>
+            <a:off x="0" y="0"/>
+            <a:ext cx="2971800" cy="458788"/>
+          </a:xfrm>
+          <a:prstGeom prst="rect">
+            <a:avLst/>
+          </a:prstGeom>
+        </p:spPr>
+        <p:txBody>
+          <a:bodyPr vert="horz" lIns="91440" tIns="45720" rIns="91440" bIns="45720" rtlCol="0"/>
+          <a:lstStyle>
+            <a:lvl1pPr algn="l">
+              <a:defRPr sz="1200"/>
+            </a:lvl1pPr>
+          </a:lstStyle>
+          <a:p>
+            <a:endParaRPr lang="en-US"/>
+          </a:p>
+        </p:txBody>
+      </p:sp>
+      <p:sp>
+        <p:nvSpPr>
+          <p:cNvPr id="3" name="日付プレースホルダー 2"/>
+          <p:cNvSpPr>
+            <a:spLocks noGrp="1"/>
+          </p:cNvSpPr>
+          <p:nvPr>
+            <p:ph type="dt" idx="1"/>
+          </p:nvPr>
+        </p:nvSpPr>
+        <p:spPr>
+          <a:xfrm>
+            <a:off x="3884613" y="0"/>
+            <a:ext cx="2971800" cy="458788"/>
+          </a:xfrm>
+          <a:prstGeom prst="rect">
+            <a:avLst/>
+          </a:prstGeom>
+        </p:spPr>
+        <p:txBody>
+          <a:bodyPr vert="horz" lIns="91440" tIns="45720" rIns="91440" bIns="45720" rtlCol="0"/>
+          <a:lstStyle>
+            <a:lvl1pPr algn="r">
+              <a:defRPr sz="1200"/>
+            </a:lvl1pPr>
+          </a:lstStyle>
+          <a:p>
+            <a:fld id="{5B7ADCDD-B44A-4CE9-B3E3-2626A84091E9}" type="datetimeFigureOut">
+              <a:rPr lang="en-US" smtClean="0"/>
+              <a:t>7/5/2021</a:t>
+            </a:fld>
+            <a:endParaRPr lang="en-US"/>
+          </a:p>
+        </p:txBody>
+      </p:sp>
+      <p:sp>
+        <p:nvSpPr>
+          <p:cNvPr id="4" name="スライド イメージ プレースホルダー 3"/>
+          <p:cNvSpPr>
+            <a:spLocks noGrp="1" noRot="1" noChangeAspect="1"/>
+          </p:cNvSpPr>
+          <p:nvPr>
+            <p:ph type="sldImg" idx="2"/>
+          </p:nvPr>
+        </p:nvSpPr>
+        <p:spPr>
+          <a:xfrm>
+            <a:off x="685800" y="1143000"/>
+            <a:ext cx="5486400" cy="3086100"/>
+          </a:xfrm>
+          <a:prstGeom prst="rect">
+            <a:avLst/>
+          </a:prstGeom>
+          <a:noFill/>
+          <a:ln w="12700">
+            <a:solidFill>
+              <a:prstClr val="black"/>
+            </a:solidFill>
+          </a:ln>
+        </p:spPr>
+        <p:txBody>
+          <a:bodyPr vert="horz" lIns="91440" tIns="45720" rIns="91440" bIns="45720" rtlCol="0" anchor="ctr"/>
+          <a:lstStyle/>
+          <a:p>
+            <a:endParaRPr lang="en-US"/>
+          </a:p>
+        </p:txBody>
+      </p:sp>
+      <p:sp>
+        <p:nvSpPr>
+          <p:cNvPr id="5" name="ノート プレースホルダー 4"/>
+          <p:cNvSpPr>
+            <a:spLocks noGrp="1"/>
+          </p:cNvSpPr>
+          <p:nvPr>
+            <p:ph type="body" sz="quarter" idx="3"/>
+          </p:nvPr>
+        </p:nvSpPr>
+        <p:spPr>
+          <a:xfrm>
+            <a:off x="685800" y="4400550"/>
+            <a:ext cx="5486400" cy="3600450"/>
+          </a:xfrm>
+          <a:prstGeom prst="rect">
+            <a:avLst/>
+          </a:prstGeom>
+        </p:spPr>
+        <p:txBody>
+          <a:bodyPr vert="horz" lIns="91440" tIns="45720" rIns="91440" bIns="45720" rtlCol="0"/>
+          <a:lstStyle/>
+          <a:p>
+            <a:pPr lvl="0"/>
+            <a:r>
+              <a:rPr lang="ja-JP" altLang="en-US"/>
+              <a:t>マスター テキストの書式設定</a:t>
+            </a:r>
+          </a:p>
+          <a:p>
+            <a:pPr lvl="1"/>
+            <a:r>
+              <a:rPr lang="ja-JP" altLang="en-US"/>
+              <a:t>第 </a:t>
+            </a:r>
+            <a:r>
+              <a:rPr lang="en-US" altLang="ja-JP"/>
+              <a:t>2 </a:t>
+            </a:r>
+            <a:r>
+              <a:rPr lang="ja-JP" altLang="en-US"/>
+              <a:t>レベル</a:t>
+            </a:r>
+          </a:p>
+          <a:p>
+            <a:pPr lvl="2"/>
+            <a:r>
+              <a:rPr lang="ja-JP" altLang="en-US"/>
+              <a:t>第 </a:t>
+            </a:r>
+            <a:r>
+              <a:rPr lang="en-US" altLang="ja-JP"/>
+              <a:t>3 </a:t>
+            </a:r>
+            <a:r>
+              <a:rPr lang="ja-JP" altLang="en-US"/>
+              <a:t>レベル</a:t>
+            </a:r>
+          </a:p>
+          <a:p>
+            <a:pPr lvl="3"/>
+            <a:r>
+              <a:rPr lang="ja-JP" altLang="en-US"/>
+              <a:t>第 </a:t>
+            </a:r>
+            <a:r>
+              <a:rPr lang="en-US" altLang="ja-JP"/>
+              <a:t>4 </a:t>
+            </a:r>
+            <a:r>
+              <a:rPr lang="ja-JP" altLang="en-US"/>
+              <a:t>レベル</a:t>
+            </a:r>
+          </a:p>
+          <a:p>
+            <a:pPr lvl="4"/>
+            <a:r>
+              <a:rPr lang="ja-JP" altLang="en-US"/>
+              <a:t>第 </a:t>
+            </a:r>
+            <a:r>
+              <a:rPr lang="en-US" altLang="ja-JP"/>
+              <a:t>5 </a:t>
+            </a:r>
+            <a:r>
+              <a:rPr lang="ja-JP" altLang="en-US"/>
+              <a:t>レベル</a:t>
+            </a:r>
+            <a:endParaRPr lang="en-US"/>
+          </a:p>
+        </p:txBody>
+      </p:sp>
+      <p:sp>
+        <p:nvSpPr>
+          <p:cNvPr id="6" name="フッター プレースホルダー 5"/>
+          <p:cNvSpPr>
+            <a:spLocks noGrp="1"/>
+          </p:cNvSpPr>
+          <p:nvPr>
+            <p:ph type="ftr" sz="quarter" idx="4"/>
+          </p:nvPr>
+        </p:nvSpPr>
+        <p:spPr>
+          <a:xfrm>
+            <a:off x="0" y="8685213"/>
+            <a:ext cx="2971800" cy="458787"/>
+          </a:xfrm>
+          <a:prstGeom prst="rect">
+            <a:avLst/>
+          </a:prstGeom>
+        </p:spPr>
+        <p:txBody>
+          <a:bodyPr vert="horz" lIns="91440" tIns="45720" rIns="91440" bIns="45720" rtlCol="0" anchor="b"/>
+          <a:lstStyle>
+            <a:lvl1pPr algn="l">
+              <a:defRPr sz="1200"/>
+            </a:lvl1pPr>
+          </a:lstStyle>
+          <a:p>
+            <a:endParaRPr lang="en-US"/>
+          </a:p>
+        </p:txBody>
+      </p:sp>
+      <p:sp>
+        <p:nvSpPr>
+          <p:cNvPr id="7" name="スライド番号プレースホルダー 6"/>
+          <p:cNvSpPr>
+            <a:spLocks noGrp="1"/>
+          </p:cNvSpPr>
+          <p:nvPr>
+            <p:ph type="sldNum" sz="quarter" idx="5"/>
+          </p:nvPr>
+        </p:nvSpPr>
+        <p:spPr>
+          <a:xfrm>
+            <a:off x="3884613" y="8685213"/>
+            <a:ext cx="2971800" cy="458787"/>
+          </a:xfrm>
+          <a:prstGeom prst="rect">
+            <a:avLst/>
+          </a:prstGeom>
+        </p:spPr>
+        <p:txBody>
+          <a:bodyPr vert="horz" lIns="91440" tIns="45720" rIns="91440" bIns="45720" rtlCol="0" anchor="b"/>
+          <a:lstStyle>
+            <a:lvl1pPr algn="r">
+              <a:defRPr sz="1200"/>
+            </a:lvl1pPr>
+          </a:lstStyle>
+          <a:p>
+            <a:fld id="{D866256B-135A-4159-8502-B8E1D01A85B5}" type="slidenum">
+              <a:rPr lang="en-US" smtClean="0"/>
+              <a:t>‹#›</a:t>
+            </a:fld>
+            <a:endParaRPr lang="en-US"/>
+          </a:p>
+        </p:txBody>
+      </p:sp>
+    </p:spTree>
+    <p:extLst>
+      <p:ext uri="{BB962C8B-B14F-4D97-AF65-F5344CB8AC3E}">
+        <p14:creationId xmlns:p14="http://schemas.microsoft.com/office/powerpoint/2010/main" val="1645783659"/>
+      </p:ext>
+    </p:extLst>
+  </p:cSld>
+  <p:clrMap bg1="lt1" tx1="dk1" bg2="lt2" tx2="dk2" accent1="accent1" accent2="accent2" accent3="accent3" accent4="accent4" accent5="accent5" accent6="accent6" hlink="hlink" folHlink="folHlink"/>
+  <p:notesStyle>
+    <a:lvl1pPr marL="0" algn="l" defTabSz="914400" rtl="0" eaLnBrk="1" latinLnBrk="0" hangingPunct="1">
+      <a:defRPr sz="1200" kern="1200">
+        <a:solidFill>
+          <a:schemeClr val="tx1"/>
+        </a:solidFill>
+        <a:latin typeface="+mn-lt"/>
+        <a:ea typeface="+mn-ea"/>
+        <a:cs typeface="+mn-cs"/>
+      </a:defRPr>
+    </a:lvl1pPr>
+    <a:lvl2pPr marL="457200" algn="l" defTabSz="914400" rtl="0" eaLnBrk="1" latinLnBrk="0" hangingPunct="1">
+      <a:defRPr sz="1200" kern="1200">
+        <a:solidFill>
+          <a:schemeClr val="tx1"/>
+        </a:solidFill>
+        <a:latin typeface="+mn-lt"/>
+        <a:ea typeface="+mn-ea"/>
+        <a:cs typeface="+mn-cs"/>
+      </a:defRPr>
+    </a:lvl2pPr>
+    <a:lvl3pPr marL="914400" algn="l" defTabSz="914400" rtl="0" eaLnBrk="1" latinLnBrk="0" hangingPunct="1">
+      <a:defRPr sz="1200" kern="1200">
+        <a:solidFill>
+          <a:schemeClr val="tx1"/>
+        </a:solidFill>
+        <a:latin typeface="+mn-lt"/>
+        <a:ea typeface="+mn-ea"/>
+        <a:cs typeface="+mn-cs"/>
+      </a:defRPr>
+    </a:lvl3pPr>
+    <a:lvl4pPr marL="1371600" algn="l" defTabSz="914400" rtl="0" eaLnBrk="1" latinLnBrk="0" hangingPunct="1">
+      <a:defRPr sz="1200" kern="1200">
+        <a:solidFill>
+          <a:schemeClr val="tx1"/>
+        </a:solidFill>
+        <a:latin typeface="+mn-lt"/>
+        <a:ea typeface="+mn-ea"/>
+        <a:cs typeface="+mn-cs"/>
+      </a:defRPr>
+    </a:lvl4pPr>
+    <a:lvl5pPr marL="1828800" algn="l" defTabSz="914400" rtl="0" eaLnBrk="1" latinLnBrk="0" hangingPunct="1">
+      <a:defRPr sz="1200" kern="1200">
+        <a:solidFill>
+          <a:schemeClr val="tx1"/>
+        </a:solidFill>
+        <a:latin typeface="+mn-lt"/>
+        <a:ea typeface="+mn-ea"/>
+        <a:cs typeface="+mn-cs"/>
+      </a:defRPr>
+    </a:lvl5pPr>
+    <a:lvl6pPr marL="2286000" algn="l" defTabSz="914400" rtl="0" eaLnBrk="1" latinLnBrk="0" hangingPunct="1">
+      <a:defRPr sz="1200" kern="1200">
+        <a:solidFill>
+          <a:schemeClr val="tx1"/>
+        </a:solidFill>
+        <a:latin typeface="+mn-lt"/>
+        <a:ea typeface="+mn-ea"/>
+        <a:cs typeface="+mn-cs"/>
+      </a:defRPr>
+    </a:lvl6pPr>
+    <a:lvl7pPr marL="2743200" algn="l" defTabSz="914400" rtl="0" eaLnBrk="1" latinLnBrk="0" hangingPunct="1">
+      <a:defRPr sz="1200" kern="1200">
+        <a:solidFill>
+          <a:schemeClr val="tx1"/>
+        </a:solidFill>
+        <a:latin typeface="+mn-lt"/>
+        <a:ea typeface="+mn-ea"/>
+        <a:cs typeface="+mn-cs"/>
+      </a:defRPr>
+    </a:lvl7pPr>
+    <a:lvl8pPr marL="3200400" algn="l" defTabSz="914400" rtl="0" eaLnBrk="1" latinLnBrk="0" hangingPunct="1">
+      <a:defRPr sz="1200" kern="1200">
+        <a:solidFill>
+          <a:schemeClr val="tx1"/>
+        </a:solidFill>
+        <a:latin typeface="+mn-lt"/>
+        <a:ea typeface="+mn-ea"/>
+        <a:cs typeface="+mn-cs"/>
+      </a:defRPr>
+    </a:lvl8pPr>
+    <a:lvl9pPr marL="3657600" algn="l" defTabSz="914400" rtl="0" eaLnBrk="1" latinLnBrk="0" hangingPunct="1">
+      <a:defRPr sz="1200" kern="1200">
+        <a:solidFill>
+          <a:schemeClr val="tx1"/>
+        </a:solidFill>
+        <a:latin typeface="+mn-lt"/>
+        <a:ea typeface="+mn-ea"/>
+        <a:cs typeface="+mn-cs"/>
+      </a:defRPr>
+    </a:lvl9pPr>
+  </p:notesStyle>
+</p:notesMaster>
+</file>
+
+<file path=ppt/notesSlides/notesSlide1.xml><?xml version="1.0" encoding="utf-8"?>
+<p:notes xmlns:a="http://schemas.openxmlformats.org/drawingml/2006/main" xmlns:r="http://schemas.openxmlformats.org/officeDocument/2006/relationships" xmlns:p="http://schemas.openxmlformats.org/presentationml/2006/main">
+  <p:cSld>
+    <p:spTree>
+      <p:nvGrpSpPr>
+        <p:cNvPr id="1" name=""/>
+        <p:cNvGrpSpPr/>
+        <p:nvPr/>
+      </p:nvGrpSpPr>
+      <p:grpSpPr>
+        <a:xfrm>
+          <a:off x="0" y="0"/>
+          <a:ext cx="0" cy="0"/>
+          <a:chOff x="0" y="0"/>
+          <a:chExt cx="0" cy="0"/>
+        </a:xfrm>
+      </p:grpSpPr>
+      <p:sp>
+        <p:nvSpPr>
+          <p:cNvPr id="2" name="スライド イメージ プレースホルダー 1"/>
+          <p:cNvSpPr>
+            <a:spLocks noGrp="1" noRot="1" noChangeAspect="1"/>
+          </p:cNvSpPr>
+          <p:nvPr>
+            <p:ph type="sldImg"/>
+          </p:nvPr>
+        </p:nvSpPr>
+        <p:spPr/>
+      </p:sp>
+      <p:sp>
+        <p:nvSpPr>
+          <p:cNvPr id="3" name="ノート プレースホルダー 2"/>
+          <p:cNvSpPr>
+            <a:spLocks noGrp="1"/>
+          </p:cNvSpPr>
+          <p:nvPr>
+            <p:ph type="body" idx="1"/>
+          </p:nvPr>
+        </p:nvSpPr>
+        <p:spPr/>
+        <p:txBody>
+          <a:bodyPr/>
+          <a:lstStyle/>
+          <a:p>
+            <a:pPr marL="0" marR="0" lvl="0" indent="0" algn="l" defTabSz="914400" rtl="0" eaLnBrk="1" fontAlgn="auto" latinLnBrk="0" hangingPunct="1">
+              <a:lnSpc>
+                <a:spcPct val="100000"/>
+              </a:lnSpc>
+              <a:spcBef>
+                <a:spcPts val="0"/>
+              </a:spcBef>
+              <a:spcAft>
+                <a:spcPts val="0"/>
+              </a:spcAft>
+              <a:buClrTx/>
+              <a:buSzTx/>
+              <a:buFontTx/>
+              <a:buNone/>
+              <a:tabLst/>
+              <a:defRPr/>
+            </a:pPr>
+            <a:r>
+              <a:rPr lang="en-US" sz="1200" b="0" i="0" u="none" strike="noStrike" dirty="0">
+                <a:solidFill>
+                  <a:srgbClr val="1D1C1D"/>
+                </a:solidFill>
+                <a:effectLst/>
+                <a:latin typeface="Arial" panose="020B0604020202020204" pitchFamily="34" charset="0"/>
+              </a:rPr>
+              <a:t>With Tokyo Olympics coming up in a few month</a:t>
+            </a:r>
+            <a:r>
+              <a:rPr lang="en-US" dirty="0">
+                <a:solidFill>
+                  <a:srgbClr val="1D1C1D"/>
+                </a:solidFill>
+                <a:latin typeface="Arial" panose="020B0604020202020204" pitchFamily="34" charset="0"/>
+              </a:rPr>
+              <a:t>, we wanted to look for observable trends and visualize them from what we have learned so far in the course. The first Summer Olympic Games was in 1896; first Winter Games was in 1924.</a:t>
+            </a:r>
+          </a:p>
+          <a:p>
+            <a:pPr marL="0" marR="0" lvl="0" indent="0" algn="l" defTabSz="914400" rtl="0" eaLnBrk="1" fontAlgn="auto" latinLnBrk="0" hangingPunct="1">
+              <a:lnSpc>
+                <a:spcPct val="100000"/>
+              </a:lnSpc>
+              <a:spcBef>
+                <a:spcPts val="0"/>
+              </a:spcBef>
+              <a:spcAft>
+                <a:spcPts val="0"/>
+              </a:spcAft>
+              <a:buClrTx/>
+              <a:buSzTx/>
+              <a:buFontTx/>
+              <a:buNone/>
+              <a:tabLst/>
+              <a:defRPr/>
+            </a:pPr>
+            <a:endParaRPr lang="en-US" dirty="0">
+              <a:solidFill>
+                <a:srgbClr val="1D1C1D"/>
+              </a:solidFill>
+              <a:latin typeface="Arial" panose="020B0604020202020204" pitchFamily="34" charset="0"/>
+            </a:endParaRPr>
+          </a:p>
+          <a:p>
+            <a:pPr marL="0" marR="0" lvl="0" indent="0" algn="l" defTabSz="914400" rtl="0" eaLnBrk="1" fontAlgn="auto" latinLnBrk="0" hangingPunct="1">
+              <a:lnSpc>
+                <a:spcPct val="100000"/>
+              </a:lnSpc>
+              <a:spcBef>
+                <a:spcPts val="0"/>
+              </a:spcBef>
+              <a:spcAft>
+                <a:spcPts val="0"/>
+              </a:spcAft>
+              <a:buClrTx/>
+              <a:buSzTx/>
+              <a:buFontTx/>
+              <a:buNone/>
+              <a:tabLst/>
+              <a:defRPr/>
+            </a:pPr>
+            <a:r>
+              <a:rPr lang="en-US" dirty="0">
+                <a:solidFill>
+                  <a:srgbClr val="1D1C1D"/>
+                </a:solidFill>
+                <a:latin typeface="Arial" panose="020B0604020202020204" pitchFamily="34" charset="0"/>
+              </a:rPr>
+              <a:t>Columns= [ID, Name, Sex, Age, Height, Weight, Team, NOC, Games, Year, Season, City, Sport, Event, Medal, region, notes]</a:t>
+            </a:r>
+          </a:p>
+          <a:p>
+            <a:endParaRPr lang="en-US" dirty="0"/>
+          </a:p>
+        </p:txBody>
+      </p:sp>
+      <p:sp>
+        <p:nvSpPr>
+          <p:cNvPr id="4" name="スライド番号プレースホルダー 3"/>
+          <p:cNvSpPr>
+            <a:spLocks noGrp="1"/>
+          </p:cNvSpPr>
+          <p:nvPr>
+            <p:ph type="sldNum" sz="quarter" idx="5"/>
+          </p:nvPr>
+        </p:nvSpPr>
+        <p:spPr/>
+        <p:txBody>
+          <a:bodyPr/>
+          <a:lstStyle/>
+          <a:p>
+            <a:fld id="{D866256B-135A-4159-8502-B8E1D01A85B5}" type="slidenum">
+              <a:rPr lang="en-US" smtClean="0"/>
+              <a:t>2</a:t>
+            </a:fld>
+            <a:endParaRPr lang="en-US"/>
+          </a:p>
+        </p:txBody>
+      </p:sp>
+    </p:spTree>
+    <p:extLst>
+      <p:ext uri="{BB962C8B-B14F-4D97-AF65-F5344CB8AC3E}">
+        <p14:creationId xmlns:p14="http://schemas.microsoft.com/office/powerpoint/2010/main" val="3052129832"/>
+      </p:ext>
+    </p:extLst>
+  </p:cSld>
+  <p:clrMapOvr>
+    <a:masterClrMapping/>
+  </p:clrMapOvr>
+</p:notes>
+</file>
+
+<file path=ppt/notesSlides/notesSlide2.xml><?xml version="1.0" encoding="utf-8"?>
+<p:notes xmlns:a="http://schemas.openxmlformats.org/drawingml/2006/main" xmlns:r="http://schemas.openxmlformats.org/officeDocument/2006/relationships" xmlns:p="http://schemas.openxmlformats.org/presentationml/2006/main">
+  <p:cSld>
+    <p:spTree>
+      <p:nvGrpSpPr>
+        <p:cNvPr id="1" name=""/>
+        <p:cNvGrpSpPr/>
+        <p:nvPr/>
+      </p:nvGrpSpPr>
+      <p:grpSpPr>
+        <a:xfrm>
+          <a:off x="0" y="0"/>
+          <a:ext cx="0" cy="0"/>
+          <a:chOff x="0" y="0"/>
+          <a:chExt cx="0" cy="0"/>
+        </a:xfrm>
+      </p:grpSpPr>
+      <p:sp>
+        <p:nvSpPr>
+          <p:cNvPr id="2" name="スライド イメージ プレースホルダー 1"/>
+          <p:cNvSpPr>
+            <a:spLocks noGrp="1" noRot="1" noChangeAspect="1"/>
+          </p:cNvSpPr>
+          <p:nvPr>
+            <p:ph type="sldImg"/>
+          </p:nvPr>
+        </p:nvSpPr>
+        <p:spPr/>
+      </p:sp>
+      <p:sp>
+        <p:nvSpPr>
+          <p:cNvPr id="3" name="ノート プレースホルダー 2"/>
+          <p:cNvSpPr>
+            <a:spLocks noGrp="1"/>
+          </p:cNvSpPr>
+          <p:nvPr>
+            <p:ph type="body" idx="1"/>
+          </p:nvPr>
+        </p:nvSpPr>
+        <p:spPr/>
+        <p:txBody>
+          <a:bodyPr/>
+          <a:lstStyle/>
+          <a:p>
+            <a:pPr marL="0" marR="0" lvl="0" indent="0" algn="l" defTabSz="914400" rtl="0" eaLnBrk="1" fontAlgn="auto" latinLnBrk="0" hangingPunct="1">
+              <a:lnSpc>
+                <a:spcPct val="100000"/>
+              </a:lnSpc>
+              <a:spcBef>
+                <a:spcPts val="0"/>
+              </a:spcBef>
+              <a:spcAft>
+                <a:spcPts val="0"/>
+              </a:spcAft>
+              <a:buClrTx/>
+              <a:buSzTx/>
+              <a:buFontTx/>
+              <a:buNone/>
+              <a:tabLst/>
+              <a:defRPr/>
+            </a:pPr>
+            <a:r>
+              <a:rPr lang="en-US" sz="1200" b="0" i="0" u="none" strike="noStrike" dirty="0">
+                <a:solidFill>
+                  <a:srgbClr val="1D1C1D"/>
+                </a:solidFill>
+                <a:effectLst/>
+                <a:latin typeface="Arial" panose="020B0604020202020204" pitchFamily="34" charset="0"/>
+              </a:rPr>
+              <a:t>The first Olympic game in 1896 had only (10+) countries to participate while (200+) countries participated in the Olympic game. Significant decrease in the number of countries was seen in 1980 due to many countries boycotting the event.</a:t>
+            </a:r>
+            <a:endParaRPr lang="en-US" dirty="0"/>
+          </a:p>
+          <a:p>
+            <a:endParaRPr lang="en-US" dirty="0"/>
+          </a:p>
+        </p:txBody>
+      </p:sp>
+      <p:sp>
+        <p:nvSpPr>
+          <p:cNvPr id="4" name="スライド番号プレースホルダー 3"/>
+          <p:cNvSpPr>
+            <a:spLocks noGrp="1"/>
+          </p:cNvSpPr>
+          <p:nvPr>
+            <p:ph type="sldNum" sz="quarter" idx="5"/>
+          </p:nvPr>
+        </p:nvSpPr>
+        <p:spPr/>
+        <p:txBody>
+          <a:bodyPr/>
+          <a:lstStyle/>
+          <a:p>
+            <a:fld id="{512D3907-F48E-4A5C-9E87-23D8240D0267}" type="slidenum">
+              <a:rPr lang="en-US" smtClean="0"/>
+              <a:t>3</a:t>
+            </a:fld>
+            <a:endParaRPr lang="en-US"/>
+          </a:p>
+        </p:txBody>
+      </p:sp>
+    </p:spTree>
+    <p:extLst>
+      <p:ext uri="{BB962C8B-B14F-4D97-AF65-F5344CB8AC3E}">
+        <p14:creationId xmlns:p14="http://schemas.microsoft.com/office/powerpoint/2010/main" val="879012309"/>
+      </p:ext>
+    </p:extLst>
+  </p:cSld>
+  <p:clrMapOvr>
+    <a:masterClrMapping/>
+  </p:clrMapOvr>
+</p:notes>
+</file>
+
+<file path=ppt/notesSlides/notesSlide3.xml><?xml version="1.0" encoding="utf-8"?>
+<p:notes xmlns:a="http://schemas.openxmlformats.org/drawingml/2006/main" xmlns:r="http://schemas.openxmlformats.org/officeDocument/2006/relationships" xmlns:p="http://schemas.openxmlformats.org/presentationml/2006/main">
+  <p:cSld>
+    <p:spTree>
+      <p:nvGrpSpPr>
+        <p:cNvPr id="1" name=""/>
+        <p:cNvGrpSpPr/>
+        <p:nvPr/>
+      </p:nvGrpSpPr>
+      <p:grpSpPr>
+        <a:xfrm>
+          <a:off x="0" y="0"/>
+          <a:ext cx="0" cy="0"/>
+          <a:chOff x="0" y="0"/>
+          <a:chExt cx="0" cy="0"/>
+        </a:xfrm>
+      </p:grpSpPr>
+      <p:sp>
+        <p:nvSpPr>
+          <p:cNvPr id="2" name="スライド イメージ プレースホルダー 1"/>
+          <p:cNvSpPr>
+            <a:spLocks noGrp="1" noRot="1" noChangeAspect="1"/>
+          </p:cNvSpPr>
+          <p:nvPr>
+            <p:ph type="sldImg"/>
+          </p:nvPr>
+        </p:nvSpPr>
+        <p:spPr/>
+      </p:sp>
+      <p:sp>
+        <p:nvSpPr>
+          <p:cNvPr id="3" name="ノート プレースホルダー 2"/>
+          <p:cNvSpPr>
+            <a:spLocks noGrp="1"/>
+          </p:cNvSpPr>
+          <p:nvPr>
+            <p:ph type="body" idx="1"/>
+          </p:nvPr>
+        </p:nvSpPr>
+        <p:spPr/>
+        <p:txBody>
+          <a:bodyPr/>
+          <a:lstStyle/>
+          <a:p>
+            <a:r>
+              <a:rPr lang="en-US" dirty="0"/>
+              <a:t>The best chance for someone to win any medal would be between the ages of 20-30</a:t>
+            </a:r>
+          </a:p>
+        </p:txBody>
+      </p:sp>
+      <p:sp>
+        <p:nvSpPr>
+          <p:cNvPr id="4" name="スライド番号プレースホルダー 3"/>
+          <p:cNvSpPr>
+            <a:spLocks noGrp="1"/>
+          </p:cNvSpPr>
+          <p:nvPr>
+            <p:ph type="sldNum" sz="quarter" idx="5"/>
+          </p:nvPr>
+        </p:nvSpPr>
+        <p:spPr/>
+        <p:txBody>
+          <a:bodyPr/>
+          <a:lstStyle/>
+          <a:p>
+            <a:fld id="{D866256B-135A-4159-8502-B8E1D01A85B5}" type="slidenum">
+              <a:rPr lang="en-US" smtClean="0"/>
+              <a:t>4</a:t>
+            </a:fld>
+            <a:endParaRPr lang="en-US"/>
+          </a:p>
+        </p:txBody>
+      </p:sp>
+    </p:spTree>
+    <p:extLst>
+      <p:ext uri="{BB962C8B-B14F-4D97-AF65-F5344CB8AC3E}">
+        <p14:creationId xmlns:p14="http://schemas.microsoft.com/office/powerpoint/2010/main" val="500609036"/>
+      </p:ext>
+    </p:extLst>
+  </p:cSld>
+  <p:clrMapOvr>
+    <a:masterClrMapping/>
+  </p:clrMapOvr>
+</p:notes>
+</file>
+
+<file path=ppt/notesSlides/notesSlide4.xml><?xml version="1.0" encoding="utf-8"?>
+<p:notes xmlns:a="http://schemas.openxmlformats.org/drawingml/2006/main" xmlns:r="http://schemas.openxmlformats.org/officeDocument/2006/relationships" xmlns:p="http://schemas.openxmlformats.org/presentationml/2006/main">
+  <p:cSld>
+    <p:spTree>
+      <p:nvGrpSpPr>
+        <p:cNvPr id="1" name=""/>
+        <p:cNvGrpSpPr/>
+        <p:nvPr/>
+      </p:nvGrpSpPr>
+      <p:grpSpPr>
+        <a:xfrm>
+          <a:off x="0" y="0"/>
+          <a:ext cx="0" cy="0"/>
+          <a:chOff x="0" y="0"/>
+          <a:chExt cx="0" cy="0"/>
+        </a:xfrm>
+      </p:grpSpPr>
+      <p:sp>
+        <p:nvSpPr>
+          <p:cNvPr id="2" name="スライド イメージ プレースホルダー 1"/>
+          <p:cNvSpPr>
+            <a:spLocks noGrp="1" noRot="1" noChangeAspect="1"/>
+          </p:cNvSpPr>
+          <p:nvPr>
+            <p:ph type="sldImg"/>
+          </p:nvPr>
+        </p:nvSpPr>
+        <p:spPr/>
+      </p:sp>
+      <p:sp>
+        <p:nvSpPr>
+          <p:cNvPr id="3" name="ノート プレースホルダー 2"/>
+          <p:cNvSpPr>
+            <a:spLocks noGrp="1"/>
+          </p:cNvSpPr>
+          <p:nvPr>
+            <p:ph type="body" idx="1"/>
+          </p:nvPr>
+        </p:nvSpPr>
+        <p:spPr/>
+        <p:txBody>
+          <a:bodyPr/>
+          <a:lstStyle/>
+          <a:p>
+            <a:pPr marL="0" marR="0" lvl="0" indent="0" algn="l" defTabSz="914400" rtl="0" eaLnBrk="1" fontAlgn="auto" latinLnBrk="0" hangingPunct="1">
+              <a:lnSpc>
+                <a:spcPct val="100000"/>
+              </a:lnSpc>
+              <a:spcBef>
+                <a:spcPts val="0"/>
+              </a:spcBef>
+              <a:spcAft>
+                <a:spcPts val="0"/>
+              </a:spcAft>
+              <a:buClrTx/>
+              <a:buSzTx/>
+              <a:buFontTx/>
+              <a:buNone/>
+              <a:tabLst/>
+              <a:defRPr/>
+            </a:pPr>
+            <a:r>
+              <a:rPr lang="en-US" sz="1200" b="0" i="0" u="none" strike="noStrike" dirty="0">
+                <a:solidFill>
+                  <a:srgbClr val="1D1C1D"/>
+                </a:solidFill>
+                <a:effectLst/>
+                <a:latin typeface="Arial" panose="020B0604020202020204" pitchFamily="34" charset="0"/>
+              </a:rPr>
+              <a:t>Participation of athletes have naturally increased over the years contributed by significant growth in number of female athletes.</a:t>
+            </a:r>
+            <a:endParaRPr lang="en-US" dirty="0"/>
+          </a:p>
+          <a:p>
+            <a:endParaRPr lang="en-US" dirty="0"/>
+          </a:p>
+        </p:txBody>
+      </p:sp>
+      <p:sp>
+        <p:nvSpPr>
+          <p:cNvPr id="4" name="スライド番号プレースホルダー 3"/>
+          <p:cNvSpPr>
+            <a:spLocks noGrp="1"/>
+          </p:cNvSpPr>
+          <p:nvPr>
+            <p:ph type="sldNum" sz="quarter" idx="5"/>
+          </p:nvPr>
+        </p:nvSpPr>
+        <p:spPr/>
+        <p:txBody>
+          <a:bodyPr/>
+          <a:lstStyle/>
+          <a:p>
+            <a:fld id="{512D3907-F48E-4A5C-9E87-23D8240D0267}" type="slidenum">
+              <a:rPr lang="en-US" smtClean="0"/>
+              <a:t>5</a:t>
+            </a:fld>
+            <a:endParaRPr lang="en-US"/>
+          </a:p>
+        </p:txBody>
+      </p:sp>
+    </p:spTree>
+    <p:extLst>
+      <p:ext uri="{BB962C8B-B14F-4D97-AF65-F5344CB8AC3E}">
+        <p14:creationId xmlns:p14="http://schemas.microsoft.com/office/powerpoint/2010/main" val="682323502"/>
+      </p:ext>
+    </p:extLst>
+  </p:cSld>
+  <p:clrMapOvr>
+    <a:masterClrMapping/>
+  </p:clrMapOvr>
+</p:notes>
+</file>
+
+<file path=ppt/notesSlides/notesSlide5.xml><?xml version="1.0" encoding="utf-8"?>
+<p:notes xmlns:a="http://schemas.openxmlformats.org/drawingml/2006/main" xmlns:r="http://schemas.openxmlformats.org/officeDocument/2006/relationships" xmlns:p="http://schemas.openxmlformats.org/presentationml/2006/main">
+  <p:cSld>
+    <p:spTree>
+      <p:nvGrpSpPr>
+        <p:cNvPr id="1" name=""/>
+        <p:cNvGrpSpPr/>
+        <p:nvPr/>
+      </p:nvGrpSpPr>
+      <p:grpSpPr>
+        <a:xfrm>
+          <a:off x="0" y="0"/>
+          <a:ext cx="0" cy="0"/>
+          <a:chOff x="0" y="0"/>
+          <a:chExt cx="0" cy="0"/>
+        </a:xfrm>
+      </p:grpSpPr>
+      <p:sp>
+        <p:nvSpPr>
+          <p:cNvPr id="2" name="スライド イメージ プレースホルダー 1"/>
+          <p:cNvSpPr>
+            <a:spLocks noGrp="1" noRot="1" noChangeAspect="1"/>
+          </p:cNvSpPr>
+          <p:nvPr>
+            <p:ph type="sldImg"/>
+          </p:nvPr>
+        </p:nvSpPr>
+        <p:spPr/>
+      </p:sp>
+      <p:sp>
+        <p:nvSpPr>
+          <p:cNvPr id="3" name="ノート プレースホルダー 2"/>
+          <p:cNvSpPr>
+            <a:spLocks noGrp="1"/>
+          </p:cNvSpPr>
+          <p:nvPr>
+            <p:ph type="body" idx="1"/>
+          </p:nvPr>
+        </p:nvSpPr>
+        <p:spPr/>
+        <p:txBody>
+          <a:bodyPr/>
+          <a:lstStyle/>
+          <a:p>
+            <a:pPr marL="0" marR="0" lvl="0" indent="0" algn="l" defTabSz="914400" rtl="0" eaLnBrk="1" fontAlgn="auto" latinLnBrk="0" hangingPunct="1">
+              <a:lnSpc>
+                <a:spcPct val="100000"/>
+              </a:lnSpc>
+              <a:spcBef>
+                <a:spcPts val="0"/>
+              </a:spcBef>
+              <a:spcAft>
+                <a:spcPts val="0"/>
+              </a:spcAft>
+              <a:buClrTx/>
+              <a:buSzTx/>
+              <a:buFontTx/>
+              <a:buNone/>
+              <a:tabLst/>
+              <a:defRPr/>
+            </a:pPr>
+            <a:r>
+              <a:rPr lang="en-US" sz="1200" b="0" i="0" u="none" strike="noStrike" dirty="0">
+                <a:solidFill>
+                  <a:srgbClr val="1D1C1D"/>
+                </a:solidFill>
+                <a:effectLst/>
+                <a:latin typeface="Arial" panose="020B0604020202020204" pitchFamily="34" charset="0"/>
+              </a:rPr>
+              <a:t>Participation of athletes have naturally increased over the years contributed by significant growth in number of female athletes.</a:t>
+            </a:r>
+            <a:endParaRPr lang="en-US" dirty="0"/>
+          </a:p>
+          <a:p>
+            <a:endParaRPr lang="en-US" dirty="0"/>
+          </a:p>
+        </p:txBody>
+      </p:sp>
+      <p:sp>
+        <p:nvSpPr>
+          <p:cNvPr id="4" name="スライド番号プレースホルダー 3"/>
+          <p:cNvSpPr>
+            <a:spLocks noGrp="1"/>
+          </p:cNvSpPr>
+          <p:nvPr>
+            <p:ph type="sldNum" sz="quarter" idx="5"/>
+          </p:nvPr>
+        </p:nvSpPr>
+        <p:spPr/>
+        <p:txBody>
+          <a:bodyPr/>
+          <a:lstStyle/>
+          <a:p>
+            <a:fld id="{512D3907-F48E-4A5C-9E87-23D8240D0267}" type="slidenum">
+              <a:rPr lang="en-US" smtClean="0"/>
+              <a:t>6</a:t>
+            </a:fld>
+            <a:endParaRPr lang="en-US"/>
+          </a:p>
+        </p:txBody>
+      </p:sp>
+    </p:spTree>
+    <p:extLst>
+      <p:ext uri="{BB962C8B-B14F-4D97-AF65-F5344CB8AC3E}">
+        <p14:creationId xmlns:p14="http://schemas.microsoft.com/office/powerpoint/2010/main" val="644984812"/>
+      </p:ext>
+    </p:extLst>
+  </p:cSld>
+  <p:clrMapOvr>
+    <a:masterClrMapping/>
+  </p:clrMapOvr>
+</p:notes>
+</file>
+
+<file path=ppt/notesSlides/notesSlide6.xml><?xml version="1.0" encoding="utf-8"?>
+<p:notes xmlns:a="http://schemas.openxmlformats.org/drawingml/2006/main" xmlns:r="http://schemas.openxmlformats.org/officeDocument/2006/relationships" xmlns:p="http://schemas.openxmlformats.org/presentationml/2006/main">
+  <p:cSld>
+    <p:spTree>
+      <p:nvGrpSpPr>
+        <p:cNvPr id="1" name=""/>
+        <p:cNvGrpSpPr/>
+        <p:nvPr/>
+      </p:nvGrpSpPr>
+      <p:grpSpPr>
+        <a:xfrm>
+          <a:off x="0" y="0"/>
+          <a:ext cx="0" cy="0"/>
+          <a:chOff x="0" y="0"/>
+          <a:chExt cx="0" cy="0"/>
+        </a:xfrm>
+      </p:grpSpPr>
+      <p:sp>
+        <p:nvSpPr>
+          <p:cNvPr id="2" name="スライド イメージ プレースホルダー 1"/>
+          <p:cNvSpPr>
+            <a:spLocks noGrp="1" noRot="1" noChangeAspect="1"/>
+          </p:cNvSpPr>
+          <p:nvPr>
+            <p:ph type="sldImg"/>
+          </p:nvPr>
+        </p:nvSpPr>
+        <p:spPr/>
+      </p:sp>
+      <p:sp>
+        <p:nvSpPr>
+          <p:cNvPr id="3" name="ノート プレースホルダー 2"/>
+          <p:cNvSpPr>
+            <a:spLocks noGrp="1"/>
+          </p:cNvSpPr>
+          <p:nvPr>
+            <p:ph type="body" idx="1"/>
+          </p:nvPr>
+        </p:nvSpPr>
+        <p:spPr/>
+        <p:txBody>
+          <a:bodyPr/>
+          <a:lstStyle/>
+          <a:p>
+            <a:pPr marL="0" marR="0" lvl="0" indent="0" algn="l" defTabSz="914400" rtl="0" eaLnBrk="1" fontAlgn="auto" latinLnBrk="0" hangingPunct="1">
+              <a:lnSpc>
+                <a:spcPct val="100000"/>
+              </a:lnSpc>
+              <a:spcBef>
+                <a:spcPts val="0"/>
+              </a:spcBef>
+              <a:spcAft>
+                <a:spcPts val="0"/>
+              </a:spcAft>
+              <a:buClrTx/>
+              <a:buSzTx/>
+              <a:buFontTx/>
+              <a:buNone/>
+              <a:tabLst/>
+              <a:defRPr/>
+            </a:pPr>
+            <a:r>
+              <a:rPr lang="en-US" sz="1200" b="0" i="0" u="none" strike="noStrike" dirty="0">
+                <a:solidFill>
+                  <a:srgbClr val="1D1C1D"/>
+                </a:solidFill>
+                <a:effectLst/>
+                <a:latin typeface="Arial" panose="020B0604020202020204" pitchFamily="34" charset="0"/>
+              </a:rPr>
+              <a:t>Number of female athletes have significantly increased over the years from what it was 12.1% of the total population in 1952 which grew to similar number to male at 45.2% in 2016 which indicates gender equality is gradually being achieved in Olympic games from a participants’ point of view.</a:t>
+            </a:r>
+            <a:endParaRPr lang="en-US" dirty="0"/>
+          </a:p>
+          <a:p>
+            <a:endParaRPr lang="en-US" dirty="0"/>
+          </a:p>
+        </p:txBody>
+      </p:sp>
+      <p:sp>
+        <p:nvSpPr>
+          <p:cNvPr id="4" name="スライド番号プレースホルダー 3"/>
+          <p:cNvSpPr>
+            <a:spLocks noGrp="1"/>
+          </p:cNvSpPr>
+          <p:nvPr>
+            <p:ph type="sldNum" sz="quarter" idx="5"/>
+          </p:nvPr>
+        </p:nvSpPr>
+        <p:spPr/>
+        <p:txBody>
+          <a:bodyPr/>
+          <a:lstStyle/>
+          <a:p>
+            <a:fld id="{512D3907-F48E-4A5C-9E87-23D8240D0267}" type="slidenum">
+              <a:rPr lang="en-US" smtClean="0"/>
+              <a:t>7</a:t>
+            </a:fld>
+            <a:endParaRPr lang="en-US"/>
+          </a:p>
+        </p:txBody>
+      </p:sp>
+    </p:spTree>
+    <p:extLst>
+      <p:ext uri="{BB962C8B-B14F-4D97-AF65-F5344CB8AC3E}">
+        <p14:creationId xmlns:p14="http://schemas.microsoft.com/office/powerpoint/2010/main" val="1341085759"/>
+      </p:ext>
+    </p:extLst>
+  </p:cSld>
+  <p:clrMapOvr>
+    <a:masterClrMapping/>
+  </p:clrMapOvr>
+</p:notes>
+</file>
+
+<file path=ppt/notesSlides/notesSlide7.xml><?xml version="1.0" encoding="utf-8"?>
+<p:notes xmlns:a="http://schemas.openxmlformats.org/drawingml/2006/main" xmlns:r="http://schemas.openxmlformats.org/officeDocument/2006/relationships" xmlns:p="http://schemas.openxmlformats.org/presentationml/2006/main">
+  <p:cSld>
+    <p:spTree>
+      <p:nvGrpSpPr>
+        <p:cNvPr id="1" name=""/>
+        <p:cNvGrpSpPr/>
+        <p:nvPr/>
+      </p:nvGrpSpPr>
+      <p:grpSpPr>
+        <a:xfrm>
+          <a:off x="0" y="0"/>
+          <a:ext cx="0" cy="0"/>
+          <a:chOff x="0" y="0"/>
+          <a:chExt cx="0" cy="0"/>
+        </a:xfrm>
+      </p:grpSpPr>
+      <p:sp>
+        <p:nvSpPr>
+          <p:cNvPr id="2" name="スライド イメージ プレースホルダー 1"/>
+          <p:cNvSpPr>
+            <a:spLocks noGrp="1" noRot="1" noChangeAspect="1"/>
+          </p:cNvSpPr>
+          <p:nvPr>
+            <p:ph type="sldImg"/>
+          </p:nvPr>
+        </p:nvSpPr>
+        <p:spPr/>
+      </p:sp>
+      <p:sp>
+        <p:nvSpPr>
+          <p:cNvPr id="3" name="ノート プレースホルダー 2"/>
+          <p:cNvSpPr>
+            <a:spLocks noGrp="1"/>
+          </p:cNvSpPr>
+          <p:nvPr>
+            <p:ph type="body" idx="1"/>
+          </p:nvPr>
+        </p:nvSpPr>
+        <p:spPr/>
+        <p:txBody>
+          <a:bodyPr/>
+          <a:lstStyle/>
+          <a:p>
+            <a:pPr marL="0" marR="0" lvl="0" indent="0" algn="l" defTabSz="914400" rtl="0" eaLnBrk="1" fontAlgn="auto" latinLnBrk="0" hangingPunct="1">
+              <a:lnSpc>
+                <a:spcPct val="100000"/>
+              </a:lnSpc>
+              <a:spcBef>
+                <a:spcPts val="0"/>
+              </a:spcBef>
+              <a:spcAft>
+                <a:spcPts val="0"/>
+              </a:spcAft>
+              <a:buClrTx/>
+              <a:buSzTx/>
+              <a:buFontTx/>
+              <a:buNone/>
+              <a:tabLst/>
+              <a:defRPr/>
+            </a:pPr>
+            <a:r>
+              <a:rPr lang="en-US" sz="1200" b="0" i="0" u="none" strike="noStrike" dirty="0">
+                <a:solidFill>
+                  <a:srgbClr val="1D1C1D"/>
+                </a:solidFill>
+                <a:effectLst/>
+                <a:latin typeface="Arial" panose="020B0604020202020204" pitchFamily="34" charset="0"/>
+              </a:rPr>
+              <a:t>Early 1900s big jump of US medals vs other regions</a:t>
+            </a:r>
+            <a:endParaRPr lang="en-US" dirty="0"/>
+          </a:p>
+          <a:p>
+            <a:endParaRPr lang="en-US" dirty="0"/>
+          </a:p>
+        </p:txBody>
+      </p:sp>
+      <p:sp>
+        <p:nvSpPr>
+          <p:cNvPr id="4" name="スライド番号プレースホルダー 3"/>
+          <p:cNvSpPr>
+            <a:spLocks noGrp="1"/>
+          </p:cNvSpPr>
+          <p:nvPr>
+            <p:ph type="sldNum" sz="quarter" idx="5"/>
+          </p:nvPr>
+        </p:nvSpPr>
+        <p:spPr/>
+        <p:txBody>
+          <a:bodyPr/>
+          <a:lstStyle/>
+          <a:p>
+            <a:fld id="{D866256B-135A-4159-8502-B8E1D01A85B5}" type="slidenum">
+              <a:rPr lang="en-US" smtClean="0"/>
+              <a:t>11</a:t>
+            </a:fld>
+            <a:endParaRPr lang="en-US"/>
+          </a:p>
+        </p:txBody>
+      </p:sp>
+    </p:spTree>
+    <p:extLst>
+      <p:ext uri="{BB962C8B-B14F-4D97-AF65-F5344CB8AC3E}">
+        <p14:creationId xmlns:p14="http://schemas.microsoft.com/office/powerpoint/2010/main" val="699973545"/>
+      </p:ext>
+    </p:extLst>
+  </p:cSld>
+  <p:clrMapOvr>
+    <a:masterClrMapping/>
+  </p:clrMapOvr>
+</p:notes>
+</file>
+
+<file path=ppt/notesSlides/notesSlide8.xml><?xml version="1.0" encoding="utf-8"?>
+<p:notes xmlns:a="http://schemas.openxmlformats.org/drawingml/2006/main" xmlns:r="http://schemas.openxmlformats.org/officeDocument/2006/relationships" xmlns:p="http://schemas.openxmlformats.org/presentationml/2006/main">
+  <p:cSld>
+    <p:spTree>
+      <p:nvGrpSpPr>
+        <p:cNvPr id="1" name=""/>
+        <p:cNvGrpSpPr/>
+        <p:nvPr/>
+      </p:nvGrpSpPr>
+      <p:grpSpPr>
+        <a:xfrm>
+          <a:off x="0" y="0"/>
+          <a:ext cx="0" cy="0"/>
+          <a:chOff x="0" y="0"/>
+          <a:chExt cx="0" cy="0"/>
+        </a:xfrm>
+      </p:grpSpPr>
+      <p:sp>
+        <p:nvSpPr>
+          <p:cNvPr id="2" name="スライド イメージ プレースホルダー 1"/>
+          <p:cNvSpPr>
+            <a:spLocks noGrp="1" noRot="1" noChangeAspect="1"/>
+          </p:cNvSpPr>
+          <p:nvPr>
+            <p:ph type="sldImg"/>
+          </p:nvPr>
+        </p:nvSpPr>
+        <p:spPr/>
+      </p:sp>
+      <p:sp>
+        <p:nvSpPr>
+          <p:cNvPr id="3" name="ノート プレースホルダー 2"/>
+          <p:cNvSpPr>
+            <a:spLocks noGrp="1"/>
+          </p:cNvSpPr>
+          <p:nvPr>
+            <p:ph type="body" idx="1"/>
+          </p:nvPr>
+        </p:nvSpPr>
+        <p:spPr/>
+        <p:txBody>
+          <a:bodyPr/>
+          <a:lstStyle/>
+          <a:p>
+            <a:endParaRPr lang="en-US" dirty="0"/>
+          </a:p>
+        </p:txBody>
+      </p:sp>
+      <p:sp>
+        <p:nvSpPr>
+          <p:cNvPr id="4" name="スライド番号プレースホルダー 3"/>
+          <p:cNvSpPr>
+            <a:spLocks noGrp="1"/>
+          </p:cNvSpPr>
+          <p:nvPr>
+            <p:ph type="sldNum" sz="quarter" idx="5"/>
+          </p:nvPr>
+        </p:nvSpPr>
+        <p:spPr/>
+        <p:txBody>
+          <a:bodyPr/>
+          <a:lstStyle/>
+          <a:p>
+            <a:fld id="{D866256B-135A-4159-8502-B8E1D01A85B5}" type="slidenum">
+              <a:rPr lang="en-US" smtClean="0"/>
+              <a:t>12</a:t>
+            </a:fld>
+            <a:endParaRPr lang="en-US"/>
+          </a:p>
+        </p:txBody>
+      </p:sp>
+    </p:spTree>
+    <p:extLst>
+      <p:ext uri="{BB962C8B-B14F-4D97-AF65-F5344CB8AC3E}">
+        <p14:creationId xmlns:p14="http://schemas.microsoft.com/office/powerpoint/2010/main" val="682509724"/>
+      </p:ext>
+    </p:extLst>
+  </p:cSld>
+  <p:clrMapOvr>
+    <a:masterClrMapping/>
+  </p:clrMapOvr>
+</p:notes>
+</file>
+
 <file path=ppt/slideLayouts/slideLayout1.xml><?xml version="1.0" encoding="utf-8"?>
 <p:sldLayout xmlns:a="http://schemas.openxmlformats.org/drawingml/2006/main" xmlns:r="http://schemas.openxmlformats.org/officeDocument/2006/relationships" xmlns:p="http://schemas.openxmlformats.org/presentationml/2006/main" type="title" preserve="1">
   <p:cSld name="タイトル スライド">
@@ -269,7 +1573,7 @@
           <a:p>
             <a:fld id="{3321EEB9-68B1-4379-896F-CAC32EF57190}" type="datetimeFigureOut">
               <a:rPr lang="en-US" smtClean="0"/>
-              <a:t>03-Jul-21</a:t>
+              <a:t>7/5/2021</a:t>
             </a:fld>
             <a:endParaRPr lang="en-US"/>
           </a:p>
@@ -501,7 +1805,7 @@
           <a:p>
             <a:fld id="{3321EEB9-68B1-4379-896F-CAC32EF57190}" type="datetimeFigureOut">
               <a:rPr lang="en-US" smtClean="0"/>
-              <a:t>03-Jul-21</a:t>
+              <a:t>7/5/2021</a:t>
             </a:fld>
             <a:endParaRPr lang="en-US"/>
           </a:p>
@@ -743,7 +2047,7 @@
           <a:p>
             <a:fld id="{3321EEB9-68B1-4379-896F-CAC32EF57190}" type="datetimeFigureOut">
               <a:rPr lang="en-US" smtClean="0"/>
-              <a:t>03-Jul-21</a:t>
+              <a:t>7/5/2021</a:t>
             </a:fld>
             <a:endParaRPr lang="en-US"/>
           </a:p>
@@ -975,7 +2279,7 @@
           <a:p>
             <a:fld id="{3321EEB9-68B1-4379-896F-CAC32EF57190}" type="datetimeFigureOut">
               <a:rPr lang="en-US" smtClean="0"/>
-              <a:t>03-Jul-21</a:t>
+              <a:t>7/5/2021</a:t>
             </a:fld>
             <a:endParaRPr lang="en-US"/>
           </a:p>
@@ -1251,7 +2555,7 @@
           <a:p>
             <a:fld id="{3321EEB9-68B1-4379-896F-CAC32EF57190}" type="datetimeFigureOut">
               <a:rPr lang="en-US" smtClean="0"/>
-              <a:t>03-Jul-21</a:t>
+              <a:t>7/5/2021</a:t>
             </a:fld>
             <a:endParaRPr lang="en-US"/>
           </a:p>
@@ -1583,7 +2887,7 @@
           <a:p>
             <a:fld id="{3321EEB9-68B1-4379-896F-CAC32EF57190}" type="datetimeFigureOut">
               <a:rPr lang="en-US" smtClean="0"/>
-              <a:t>03-Jul-21</a:t>
+              <a:t>7/5/2021</a:t>
             </a:fld>
             <a:endParaRPr lang="en-US"/>
           </a:p>
@@ -2062,7 +3366,7 @@
           <a:p>
             <a:fld id="{3321EEB9-68B1-4379-896F-CAC32EF57190}" type="datetimeFigureOut">
               <a:rPr lang="en-US" smtClean="0"/>
-              <a:t>03-Jul-21</a:t>
+              <a:t>7/5/2021</a:t>
             </a:fld>
             <a:endParaRPr lang="en-US"/>
           </a:p>
@@ -2204,7 +3508,7 @@
           <a:p>
             <a:fld id="{3321EEB9-68B1-4379-896F-CAC32EF57190}" type="datetimeFigureOut">
               <a:rPr lang="en-US" smtClean="0"/>
-              <a:t>03-Jul-21</a:t>
+              <a:t>7/5/2021</a:t>
             </a:fld>
             <a:endParaRPr lang="en-US"/>
           </a:p>
@@ -2317,7 +3621,7 @@
           <a:p>
             <a:fld id="{3321EEB9-68B1-4379-896F-CAC32EF57190}" type="datetimeFigureOut">
               <a:rPr lang="en-US" smtClean="0"/>
-              <a:t>03-Jul-21</a:t>
+              <a:t>7/5/2021</a:t>
             </a:fld>
             <a:endParaRPr lang="en-US"/>
           </a:p>
@@ -2662,7 +3966,7 @@
           <a:p>
             <a:fld id="{3321EEB9-68B1-4379-896F-CAC32EF57190}" type="datetimeFigureOut">
               <a:rPr lang="en-US" smtClean="0"/>
-              <a:t>03-Jul-21</a:t>
+              <a:t>7/5/2021</a:t>
             </a:fld>
             <a:endParaRPr lang="en-US"/>
           </a:p>
@@ -2951,7 +4255,7 @@
           <a:p>
             <a:fld id="{3321EEB9-68B1-4379-896F-CAC32EF57190}" type="datetimeFigureOut">
               <a:rPr lang="en-US" smtClean="0"/>
-              <a:t>03-Jul-21</a:t>
+              <a:t>7/5/2021</a:t>
             </a:fld>
             <a:endParaRPr lang="en-US"/>
           </a:p>
@@ -3226,7 +4530,7 @@
           <a:p>
             <a:fld id="{3321EEB9-68B1-4379-896F-CAC32EF57190}" type="datetimeFigureOut">
               <a:rPr lang="en-US" smtClean="0"/>
-              <a:t>03-Jul-21</a:t>
+              <a:t>7/5/2021</a:t>
             </a:fld>
             <a:endParaRPr lang="en-US"/>
           </a:p>
@@ -3657,7 +4961,7 @@
         </p:nvSpPr>
         <p:spPr>
           <a:xfrm>
-            <a:off x="304799" y="1266825"/>
+            <a:off x="441404" y="873165"/>
             <a:ext cx="10687051" cy="954107"/>
           </a:xfrm>
           <a:prstGeom prst="rect">
@@ -3671,7 +4975,6 @@
           </a:bodyPr>
           <a:lstStyle/>
           <a:p>
-            <a:pPr algn="ctr"/>
             <a:r>
               <a:rPr lang="en-US" sz="2800" b="1" i="0" u="none" strike="noStrike" dirty="0">
                 <a:effectLst/>
@@ -3697,8 +5000,8 @@
         </p:nvSpPr>
         <p:spPr>
           <a:xfrm>
-            <a:off x="8324850" y="5389544"/>
-            <a:ext cx="3000375" cy="707886"/>
+            <a:off x="8486896" y="5030728"/>
+            <a:ext cx="3000375" cy="954107"/>
           </a:xfrm>
           <a:prstGeom prst="rect">
             <a:avLst/>
@@ -3713,30 +5016,21 @@
           <a:p>
             <a:pPr algn="r"/>
             <a:r>
-              <a:rPr lang="en-US" sz="2000" b="1" i="0" u="none" strike="noStrike" dirty="0">
-                <a:solidFill>
-                  <a:srgbClr val="0070C0"/>
-                </a:solidFill>
+              <a:rPr lang="en-US" sz="2800" b="1" i="0" u="none" strike="noStrike" dirty="0">
                 <a:effectLst/>
                 <a:latin typeface="Arial" panose="020B0604020202020204" pitchFamily="34" charset="0"/>
               </a:rPr>
               <a:t>July 7</a:t>
             </a:r>
             <a:r>
-              <a:rPr lang="en-US" sz="2000" b="1" i="0" u="none" strike="noStrike" baseline="30000" dirty="0">
-                <a:solidFill>
-                  <a:srgbClr val="0070C0"/>
-                </a:solidFill>
+              <a:rPr lang="en-US" sz="2800" b="1" i="0" u="none" strike="noStrike" baseline="30000" dirty="0">
                 <a:effectLst/>
                 <a:latin typeface="Arial" panose="020B0604020202020204" pitchFamily="34" charset="0"/>
               </a:rPr>
               <a:t>th</a:t>
             </a:r>
             <a:r>
-              <a:rPr lang="en-US" sz="2000" b="1" i="0" u="none" strike="noStrike" dirty="0">
-                <a:solidFill>
-                  <a:srgbClr val="0070C0"/>
-                </a:solidFill>
+              <a:rPr lang="en-US" sz="2800" b="1" i="0" u="none" strike="noStrike" dirty="0">
                 <a:effectLst/>
                 <a:latin typeface="Arial" panose="020B0604020202020204" pitchFamily="34" charset="0"/>
               </a:rPr>
@@ -3746,19 +5040,12 @@
           <a:p>
             <a:pPr algn="r"/>
             <a:r>
-              <a:rPr lang="en-US" sz="2000" b="1" dirty="0">
-                <a:solidFill>
-                  <a:srgbClr val="0070C0"/>
-                </a:solidFill>
+              <a:rPr lang="en-US" sz="2800" b="1" dirty="0">
                 <a:latin typeface="Arial" panose="020B0604020202020204" pitchFamily="34" charset="0"/>
               </a:rPr>
               <a:t>Wildcats</a:t>
             </a:r>
-            <a:endParaRPr lang="en-US" sz="2000" b="1" dirty="0">
-              <a:solidFill>
-                <a:srgbClr val="0070C0"/>
-              </a:solidFill>
-            </a:endParaRPr>
+            <a:endParaRPr lang="en-US" sz="2800" b="1" dirty="0"/>
           </a:p>
         </p:txBody>
       </p:sp>
@@ -3785,8 +5072,8 @@
         </p:blipFill>
         <p:spPr bwMode="auto">
           <a:xfrm>
-            <a:off x="955589" y="2653383"/>
-            <a:ext cx="7092779" cy="3274500"/>
+            <a:off x="3657172" y="2301280"/>
+            <a:ext cx="4086291" cy="1886505"/>
           </a:xfrm>
           <a:prstGeom prst="rect">
             <a:avLst/>
@@ -3816,6 +5103,328 @@
 </p:sld>
 </file>
 
+<file path=ppt/slides/slide10.xml><?xml version="1.0" encoding="utf-8"?>
+<p:sld xmlns:a="http://schemas.openxmlformats.org/drawingml/2006/main" xmlns:r="http://schemas.openxmlformats.org/officeDocument/2006/relationships" xmlns:p="http://schemas.openxmlformats.org/presentationml/2006/main">
+  <p:cSld>
+    <p:spTree>
+      <p:nvGrpSpPr>
+        <p:cNvPr id="1" name=""/>
+        <p:cNvGrpSpPr/>
+        <p:nvPr/>
+      </p:nvGrpSpPr>
+      <p:grpSpPr>
+        <a:xfrm>
+          <a:off x="0" y="0"/>
+          <a:ext cx="0" cy="0"/>
+          <a:chOff x="0" y="0"/>
+          <a:chExt cx="0" cy="0"/>
+        </a:xfrm>
+      </p:grpSpPr>
+      <p:sp>
+        <p:nvSpPr>
+          <p:cNvPr id="2" name="テキスト ボックス 1">
+            <a:extLst>
+              <a:ext uri="{FF2B5EF4-FFF2-40B4-BE49-F238E27FC236}">
+                <a16:creationId xmlns:a16="http://schemas.microsoft.com/office/drawing/2014/main" id="{02706F4B-FB0C-4B84-ACA3-267780375BED}"/>
+              </a:ext>
+            </a:extLst>
+          </p:cNvPr>
+          <p:cNvSpPr txBox="1"/>
+          <p:nvPr/>
+        </p:nvSpPr>
+        <p:spPr>
+          <a:xfrm>
+            <a:off x="295274" y="219075"/>
+            <a:ext cx="10687051" cy="523220"/>
+          </a:xfrm>
+          <a:prstGeom prst="rect">
+            <a:avLst/>
+          </a:prstGeom>
+          <a:noFill/>
+        </p:spPr>
+        <p:txBody>
+          <a:bodyPr wrap="square" rtlCol="0">
+            <a:spAutoFit/>
+          </a:bodyPr>
+          <a:lstStyle/>
+          <a:p>
+            <a:r>
+              <a:rPr lang="en-US" sz="2800" b="1" dirty="0">
+                <a:solidFill>
+                  <a:srgbClr val="0070C0"/>
+                </a:solidFill>
+              </a:rPr>
+              <a:t>US medals vs the other regions</a:t>
+            </a:r>
+          </a:p>
+        </p:txBody>
+      </p:sp>
+      <p:pic>
+        <p:nvPicPr>
+          <p:cNvPr id="6" name="Picture 5"/>
+          <p:cNvPicPr>
+            <a:picLocks noChangeAspect="1"/>
+          </p:cNvPicPr>
+          <p:nvPr/>
+        </p:nvPicPr>
+        <p:blipFill>
+          <a:blip r:embed="rId2"/>
+          <a:stretch>
+            <a:fillRect/>
+          </a:stretch>
+        </p:blipFill>
+        <p:spPr>
+          <a:xfrm>
+            <a:off x="480469" y="3109732"/>
+            <a:ext cx="5714613" cy="1079495"/>
+          </a:xfrm>
+          <a:prstGeom prst="rect">
+            <a:avLst/>
+          </a:prstGeom>
+        </p:spPr>
+      </p:pic>
+      <p:pic>
+        <p:nvPicPr>
+          <p:cNvPr id="7" name="Picture 6"/>
+          <p:cNvPicPr>
+            <a:picLocks noChangeAspect="1"/>
+          </p:cNvPicPr>
+          <p:nvPr/>
+        </p:nvPicPr>
+        <p:blipFill>
+          <a:blip r:embed="rId3"/>
+          <a:stretch>
+            <a:fillRect/>
+          </a:stretch>
+        </p:blipFill>
+        <p:spPr>
+          <a:xfrm>
+            <a:off x="488185" y="1510113"/>
+            <a:ext cx="7514656" cy="1307978"/>
+          </a:xfrm>
+          <a:prstGeom prst="rect">
+            <a:avLst/>
+          </a:prstGeom>
+        </p:spPr>
+      </p:pic>
+    </p:spTree>
+    <p:extLst>
+      <p:ext uri="{BB962C8B-B14F-4D97-AF65-F5344CB8AC3E}">
+        <p14:creationId xmlns:p14="http://schemas.microsoft.com/office/powerpoint/2010/main" val="4143226759"/>
+      </p:ext>
+    </p:extLst>
+  </p:cSld>
+  <p:clrMapOvr>
+    <a:masterClrMapping/>
+  </p:clrMapOvr>
+</p:sld>
+</file>
+
+<file path=ppt/slides/slide11.xml><?xml version="1.0" encoding="utf-8"?>
+<p:sld xmlns:a="http://schemas.openxmlformats.org/drawingml/2006/main" xmlns:r="http://schemas.openxmlformats.org/officeDocument/2006/relationships" xmlns:p="http://schemas.openxmlformats.org/presentationml/2006/main">
+  <p:cSld>
+    <p:spTree>
+      <p:nvGrpSpPr>
+        <p:cNvPr id="1" name=""/>
+        <p:cNvGrpSpPr/>
+        <p:nvPr/>
+      </p:nvGrpSpPr>
+      <p:grpSpPr>
+        <a:xfrm>
+          <a:off x="0" y="0"/>
+          <a:ext cx="0" cy="0"/>
+          <a:chOff x="0" y="0"/>
+          <a:chExt cx="0" cy="0"/>
+        </a:xfrm>
+      </p:grpSpPr>
+      <p:sp>
+        <p:nvSpPr>
+          <p:cNvPr id="2" name="テキスト ボックス 1">
+            <a:extLst>
+              <a:ext uri="{FF2B5EF4-FFF2-40B4-BE49-F238E27FC236}">
+                <a16:creationId xmlns:a16="http://schemas.microsoft.com/office/drawing/2014/main" id="{02706F4B-FB0C-4B84-ACA3-267780375BED}"/>
+              </a:ext>
+            </a:extLst>
+          </p:cNvPr>
+          <p:cNvSpPr txBox="1"/>
+          <p:nvPr/>
+        </p:nvSpPr>
+        <p:spPr>
+          <a:xfrm>
+            <a:off x="295274" y="213968"/>
+            <a:ext cx="10687051" cy="523220"/>
+          </a:xfrm>
+          <a:prstGeom prst="rect">
+            <a:avLst/>
+          </a:prstGeom>
+          <a:noFill/>
+        </p:spPr>
+        <p:txBody>
+          <a:bodyPr wrap="square" rtlCol="0">
+            <a:spAutoFit/>
+          </a:bodyPr>
+          <a:lstStyle/>
+          <a:p>
+            <a:r>
+              <a:rPr lang="en-US" sz="2800" b="1" dirty="0">
+                <a:solidFill>
+                  <a:srgbClr val="0070C0"/>
+                </a:solidFill>
+              </a:rPr>
+              <a:t>US medals vs the other regions</a:t>
+            </a:r>
+          </a:p>
+        </p:txBody>
+      </p:sp>
+      <p:pic>
+        <p:nvPicPr>
+          <p:cNvPr id="3" name="Picture 2"/>
+          <p:cNvPicPr>
+            <a:picLocks noChangeAspect="1"/>
+          </p:cNvPicPr>
+          <p:nvPr/>
+        </p:nvPicPr>
+        <p:blipFill>
+          <a:blip r:embed="rId3">
+            <a:extLst>
+              <a:ext uri="{28A0092B-C50C-407E-A947-70E740481C1C}">
+                <a14:useLocalDpi xmlns:a14="http://schemas.microsoft.com/office/drawing/2010/main" val="0"/>
+              </a:ext>
+            </a:extLst>
+          </a:blip>
+          <a:stretch>
+            <a:fillRect/>
+          </a:stretch>
+        </p:blipFill>
+        <p:spPr>
+          <a:xfrm>
+            <a:off x="295274" y="1337191"/>
+            <a:ext cx="5833770" cy="3111344"/>
+          </a:xfrm>
+          <a:prstGeom prst="rect">
+            <a:avLst/>
+          </a:prstGeom>
+        </p:spPr>
+      </p:pic>
+      <p:pic>
+        <p:nvPicPr>
+          <p:cNvPr id="5" name="Picture 4"/>
+          <p:cNvPicPr>
+            <a:picLocks noChangeAspect="1"/>
+          </p:cNvPicPr>
+          <p:nvPr/>
+        </p:nvPicPr>
+        <p:blipFill>
+          <a:blip r:embed="rId4">
+            <a:extLst>
+              <a:ext uri="{28A0092B-C50C-407E-A947-70E740481C1C}">
+                <a14:useLocalDpi xmlns:a14="http://schemas.microsoft.com/office/drawing/2010/main" val="0"/>
+              </a:ext>
+            </a:extLst>
+          </a:blip>
+          <a:stretch>
+            <a:fillRect/>
+          </a:stretch>
+        </p:blipFill>
+        <p:spPr>
+          <a:xfrm>
+            <a:off x="5897433" y="1337191"/>
+            <a:ext cx="5833768" cy="3111344"/>
+          </a:xfrm>
+          <a:prstGeom prst="rect">
+            <a:avLst/>
+          </a:prstGeom>
+        </p:spPr>
+      </p:pic>
+    </p:spTree>
+    <p:extLst>
+      <p:ext uri="{BB962C8B-B14F-4D97-AF65-F5344CB8AC3E}">
+        <p14:creationId xmlns:p14="http://schemas.microsoft.com/office/powerpoint/2010/main" val="4235606923"/>
+      </p:ext>
+    </p:extLst>
+  </p:cSld>
+  <p:clrMapOvr>
+    <a:masterClrMapping/>
+  </p:clrMapOvr>
+</p:sld>
+</file>
+
+<file path=ppt/slides/slide12.xml><?xml version="1.0" encoding="utf-8"?>
+<p:sld xmlns:a="http://schemas.openxmlformats.org/drawingml/2006/main" xmlns:r="http://schemas.openxmlformats.org/officeDocument/2006/relationships" xmlns:p="http://schemas.openxmlformats.org/presentationml/2006/main">
+  <p:cSld>
+    <p:spTree>
+      <p:nvGrpSpPr>
+        <p:cNvPr id="1" name=""/>
+        <p:cNvGrpSpPr/>
+        <p:nvPr/>
+      </p:nvGrpSpPr>
+      <p:grpSpPr>
+        <a:xfrm>
+          <a:off x="0" y="0"/>
+          <a:ext cx="0" cy="0"/>
+          <a:chOff x="0" y="0"/>
+          <a:chExt cx="0" cy="0"/>
+        </a:xfrm>
+      </p:grpSpPr>
+      <p:sp>
+        <p:nvSpPr>
+          <p:cNvPr id="2" name="テキスト ボックス 1">
+            <a:extLst>
+              <a:ext uri="{FF2B5EF4-FFF2-40B4-BE49-F238E27FC236}">
+                <a16:creationId xmlns:a16="http://schemas.microsoft.com/office/drawing/2014/main" id="{02706F4B-FB0C-4B84-ACA3-267780375BED}"/>
+              </a:ext>
+            </a:extLst>
+          </p:cNvPr>
+          <p:cNvSpPr txBox="1"/>
+          <p:nvPr/>
+        </p:nvSpPr>
+        <p:spPr>
+          <a:xfrm>
+            <a:off x="295274" y="219075"/>
+            <a:ext cx="10687051" cy="523220"/>
+          </a:xfrm>
+          <a:prstGeom prst="rect">
+            <a:avLst/>
+          </a:prstGeom>
+          <a:noFill/>
+        </p:spPr>
+        <p:txBody>
+          <a:bodyPr wrap="square" rtlCol="0">
+            <a:spAutoFit/>
+          </a:bodyPr>
+          <a:lstStyle/>
+          <a:p>
+            <a:r>
+              <a:rPr lang="en-US" sz="2800" b="1" i="0" u="none" strike="noStrike" dirty="0">
+                <a:solidFill>
+                  <a:srgbClr val="0070C0"/>
+                </a:solidFill>
+                <a:effectLst/>
+                <a:latin typeface="Arial" panose="020B0604020202020204" pitchFamily="34" charset="0"/>
+              </a:rPr>
+              <a:t>Conclusion</a:t>
+            </a:r>
+            <a:endParaRPr lang="en-US" sz="2800" b="1" dirty="0">
+              <a:solidFill>
+                <a:srgbClr val="0070C0"/>
+              </a:solidFill>
+            </a:endParaRPr>
+          </a:p>
+        </p:txBody>
+      </p:sp>
+    </p:spTree>
+    <p:extLst>
+      <p:ext uri="{BB962C8B-B14F-4D97-AF65-F5344CB8AC3E}">
+        <p14:creationId xmlns:p14="http://schemas.microsoft.com/office/powerpoint/2010/main" val="199437817"/>
+      </p:ext>
+    </p:extLst>
+  </p:cSld>
+  <p:clrMapOvr>
+    <a:masterClrMapping/>
+  </p:clrMapOvr>
+</p:sld>
+</file>
+
 <file path=ppt/slides/slide2.xml><?xml version="1.0" encoding="utf-8"?>
 <p:sld xmlns:a="http://schemas.openxmlformats.org/drawingml/2006/main" xmlns:r="http://schemas.openxmlformats.org/officeDocument/2006/relationships" xmlns:p="http://schemas.openxmlformats.org/presentationml/2006/main">
   <p:cSld>
@@ -3879,102 +5488,35 @@
           </a:p>
         </p:txBody>
       </p:sp>
-      <p:sp>
-        <p:nvSpPr>
-          <p:cNvPr id="4" name="テキスト ボックス 3">
-            <a:extLst>
-              <a:ext uri="{FF2B5EF4-FFF2-40B4-BE49-F238E27FC236}">
-                <a16:creationId xmlns:a16="http://schemas.microsoft.com/office/drawing/2014/main" id="{6BC0C496-8091-47C5-ADA8-41CF4A9DA2FC}"/>
-              </a:ext>
-            </a:extLst>
-          </p:cNvPr>
-          <p:cNvSpPr txBox="1"/>
+      <p:pic>
+        <p:nvPicPr>
+          <p:cNvPr id="5" name="図 4">
+            <a:extLst>
+              <a:ext uri="{FF2B5EF4-FFF2-40B4-BE49-F238E27FC236}">
+                <a16:creationId xmlns:a16="http://schemas.microsoft.com/office/drawing/2014/main" id="{70BDF591-EA4A-40EE-A063-31208905CFFA}"/>
+              </a:ext>
+            </a:extLst>
+          </p:cNvPr>
+          <p:cNvPicPr>
+            <a:picLocks noChangeAspect="1"/>
+          </p:cNvPicPr>
           <p:nvPr/>
-        </p:nvSpPr>
+        </p:nvPicPr>
+        <p:blipFill rotWithShape="1">
+          <a:blip r:embed="rId3"/>
+          <a:srcRect l="2422" t="21111" r="1042" b="14074"/>
+          <a:stretch/>
+        </p:blipFill>
         <p:spPr>
           <a:xfrm>
-            <a:off x="704850" y="1186934"/>
-            <a:ext cx="10687050" cy="1754326"/>
+            <a:off x="295274" y="742295"/>
+            <a:ext cx="11812289" cy="4461075"/>
           </a:xfrm>
           <a:prstGeom prst="rect">
             <a:avLst/>
           </a:prstGeom>
-          <a:noFill/>
         </p:spPr>
-        <p:txBody>
-          <a:bodyPr wrap="square">
-            <a:spAutoFit/>
-          </a:bodyPr>
-          <a:lstStyle/>
-          <a:p>
-            <a:r>
-              <a:rPr lang="en-US" sz="1800" b="0" i="0" u="none" strike="noStrike" dirty="0">
-                <a:solidFill>
-                  <a:srgbClr val="1D1C1D"/>
-                </a:solidFill>
-                <a:effectLst/>
-                <a:latin typeface="Arial" panose="020B0604020202020204" pitchFamily="34" charset="0"/>
-              </a:rPr>
-              <a:t>With Tokyo Olympics coming up in a few month</a:t>
-            </a:r>
-            <a:r>
-              <a:rPr lang="en-US" dirty="0">
-                <a:solidFill>
-                  <a:srgbClr val="1D1C1D"/>
-                </a:solidFill>
-                <a:latin typeface="Arial" panose="020B0604020202020204" pitchFamily="34" charset="0"/>
-              </a:rPr>
-              <a:t>, we wanted to look for observable trends and visualize them from what we have learned so far in the course.  </a:t>
-            </a:r>
-          </a:p>
-          <a:p>
-            <a:endParaRPr lang="en-US" dirty="0">
-              <a:solidFill>
-                <a:srgbClr val="1D1C1D"/>
-              </a:solidFill>
-              <a:latin typeface="Arial" panose="020B0604020202020204" pitchFamily="34" charset="0"/>
-            </a:endParaRPr>
-          </a:p>
-          <a:p>
-            <a:r>
-              <a:rPr lang="en-US" dirty="0">
-                <a:solidFill>
-                  <a:srgbClr val="0070C0"/>
-                </a:solidFill>
-                <a:latin typeface="Arial" panose="020B0604020202020204" pitchFamily="34" charset="0"/>
-              </a:rPr>
-              <a:t>Facts:</a:t>
-            </a:r>
-          </a:p>
-          <a:p>
-            <a:pPr marL="285750" indent="-285750">
-              <a:buFont typeface="Arial" panose="020B0604020202020204" pitchFamily="34" charset="0"/>
-              <a:buChar char="•"/>
-            </a:pPr>
-            <a:r>
-              <a:rPr lang="en-US" dirty="0" smtClean="0">
-                <a:solidFill>
-                  <a:srgbClr val="1D1C1D"/>
-                </a:solidFill>
-                <a:latin typeface="Arial" panose="020B0604020202020204" pitchFamily="34" charset="0"/>
-              </a:rPr>
-              <a:t>The first Summer Olympic Games was in 1896; first Winter Games was in 1924.</a:t>
-            </a:r>
-          </a:p>
-          <a:p>
-            <a:pPr marL="285750" indent="-285750">
-              <a:buFont typeface="Arial" panose="020B0604020202020204" pitchFamily="34" charset="0"/>
-              <a:buChar char="•"/>
-            </a:pPr>
-            <a:endParaRPr lang="en-US" dirty="0" smtClean="0">
-              <a:solidFill>
-                <a:srgbClr val="1D1C1D"/>
-              </a:solidFill>
-              <a:latin typeface="Arial" panose="020B0604020202020204" pitchFamily="34" charset="0"/>
-            </a:endParaRPr>
-          </a:p>
-        </p:txBody>
-      </p:sp>
+      </p:pic>
     </p:spTree>
     <p:extLst>
       <p:ext uri="{BB962C8B-B14F-4D97-AF65-F5344CB8AC3E}">
@@ -4005,54 +5547,12 @@
           <a:chExt cx="0" cy="0"/>
         </a:xfrm>
       </p:grpSpPr>
-      <p:sp>
-        <p:nvSpPr>
-          <p:cNvPr id="3" name="テキスト ボックス 2">
-            <a:extLst>
-              <a:ext uri="{FF2B5EF4-FFF2-40B4-BE49-F238E27FC236}">
-                <a16:creationId xmlns:a16="http://schemas.microsoft.com/office/drawing/2014/main" id="{0CD51DEC-36DF-41F0-BD5A-A326936CA45C}"/>
-              </a:ext>
-            </a:extLst>
-          </p:cNvPr>
-          <p:cNvSpPr txBox="1"/>
-          <p:nvPr/>
-        </p:nvSpPr>
-        <p:spPr>
-          <a:xfrm>
-            <a:off x="600074" y="813911"/>
-            <a:ext cx="10725150" cy="923330"/>
-          </a:xfrm>
-          <a:prstGeom prst="rect">
-            <a:avLst/>
-          </a:prstGeom>
-          <a:noFill/>
-        </p:spPr>
-        <p:txBody>
-          <a:bodyPr wrap="square">
-            <a:spAutoFit/>
-          </a:bodyPr>
-          <a:lstStyle/>
-          <a:p>
-            <a:r>
-              <a:rPr lang="en-US" sz="1800" b="0" i="0" u="none" strike="noStrike" dirty="0">
-                <a:solidFill>
-                  <a:srgbClr val="1D1C1D"/>
-                </a:solidFill>
-                <a:effectLst/>
-                <a:latin typeface="Arial" panose="020B0604020202020204" pitchFamily="34" charset="0"/>
-              </a:rPr>
-              <a:t>The first Olympic game in 1896 had only (10+) countries to participate while (200+) countries participated in the Olympic game. Significant decrease in the number of countries was seen in 1980 due to many countries boycotting the event.</a:t>
-            </a:r>
-            <a:endParaRPr lang="en-US" dirty="0"/>
-          </a:p>
-        </p:txBody>
-      </p:sp>
       <p:pic>
         <p:nvPicPr>
-          <p:cNvPr id="5" name="図 4" descr="グラフ, ヒストグラム&#10;&#10;自動的に生成された説明">
-            <a:extLst>
-              <a:ext uri="{FF2B5EF4-FFF2-40B4-BE49-F238E27FC236}">
-                <a16:creationId xmlns:a16="http://schemas.microsoft.com/office/drawing/2014/main" id="{57A28812-7D74-4426-8D98-4D5AF6B8F3DD}"/>
+          <p:cNvPr id="4" name="図 3">
+            <a:extLst>
+              <a:ext uri="{FF2B5EF4-FFF2-40B4-BE49-F238E27FC236}">
+                <a16:creationId xmlns:a16="http://schemas.microsoft.com/office/drawing/2014/main" id="{0D7F3CD6-7514-4EA3-BDEB-02CE05EC27FE}"/>
               </a:ext>
             </a:extLst>
           </p:cNvPr>
@@ -4061,22 +5561,15 @@
           </p:cNvPicPr>
           <p:nvPr/>
         </p:nvPicPr>
-        <p:blipFill>
-          <a:blip r:embed="rId2">
-            <a:extLst>
-              <a:ext uri="{28A0092B-C50C-407E-A947-70E740481C1C}">
-                <a14:useLocalDpi xmlns:a14="http://schemas.microsoft.com/office/drawing/2010/main" val="0"/>
-              </a:ext>
-            </a:extLst>
-          </a:blip>
-          <a:stretch>
-            <a:fillRect/>
-          </a:stretch>
+        <p:blipFill rotWithShape="1">
+          <a:blip r:embed="rId3"/>
+          <a:srcRect l="2422" t="18334" r="35833" b="55980"/>
+          <a:stretch/>
         </p:blipFill>
         <p:spPr>
           <a:xfrm>
-            <a:off x="295274" y="1737241"/>
-            <a:ext cx="7316867" cy="4573042"/>
+            <a:off x="422274" y="745926"/>
+            <a:ext cx="6423026" cy="1503051"/>
           </a:xfrm>
           <a:prstGeom prst="rect">
             <a:avLst/>
@@ -4131,22 +5624,33 @@
       </p:sp>
       <p:pic>
         <p:nvPicPr>
-          <p:cNvPr id="2" name="Picture 1"/>
+          <p:cNvPr id="8" name="図 7" descr="グラフ, ヒストグラム&#10;&#10;自動的に生成された説明">
+            <a:extLst>
+              <a:ext uri="{FF2B5EF4-FFF2-40B4-BE49-F238E27FC236}">
+                <a16:creationId xmlns:a16="http://schemas.microsoft.com/office/drawing/2014/main" id="{03F625FF-AD72-4CB4-BAA8-41A490E292A3}"/>
+              </a:ext>
+            </a:extLst>
+          </p:cNvPr>
           <p:cNvPicPr>
             <a:picLocks noChangeAspect="1"/>
           </p:cNvPicPr>
           <p:nvPr/>
         </p:nvPicPr>
-        <p:blipFill>
-          <a:blip r:embed="rId3"/>
-          <a:stretch>
-            <a:fillRect/>
-          </a:stretch>
+        <p:blipFill rotWithShape="1">
+          <a:blip r:embed="rId4">
+            <a:extLst>
+              <a:ext uri="{28A0092B-C50C-407E-A947-70E740481C1C}">
+                <a14:useLocalDpi xmlns:a14="http://schemas.microsoft.com/office/drawing/2010/main" val="0"/>
+              </a:ext>
+            </a:extLst>
+          </a:blip>
+          <a:srcRect l="4047" t="5843" r="8169"/>
+          <a:stretch/>
         </p:blipFill>
         <p:spPr>
           <a:xfrm>
-            <a:off x="7177985" y="3489792"/>
-            <a:ext cx="4581395" cy="1067939"/>
+            <a:off x="4448173" y="1663699"/>
+            <a:ext cx="7321553" cy="4908168"/>
           </a:xfrm>
           <a:prstGeom prst="rect">
             <a:avLst/>
@@ -4156,7 +5660,7 @@
     </p:spTree>
     <p:extLst>
       <p:ext uri="{BB962C8B-B14F-4D97-AF65-F5344CB8AC3E}">
-        <p14:creationId xmlns:p14="http://schemas.microsoft.com/office/powerpoint/2010/main" val="2151389812"/>
+        <p14:creationId xmlns:p14="http://schemas.microsoft.com/office/powerpoint/2010/main" val="1496605470"/>
       </p:ext>
     </p:extLst>
   </p:cSld>
@@ -4185,20 +5689,79 @@
       </p:grpSpPr>
       <p:sp>
         <p:nvSpPr>
-          <p:cNvPr id="2" name="テキスト ボックス 1">
-            <a:extLst>
-              <a:ext uri="{FF2B5EF4-FFF2-40B4-BE49-F238E27FC236}">
-                <a16:creationId xmlns:a16="http://schemas.microsoft.com/office/drawing/2014/main" id="{688377C2-DBC5-4D7B-8B81-1EB9BD94F8AA}"/>
-              </a:ext>
-            </a:extLst>
-          </p:cNvPr>
+          <p:cNvPr id="2" name="Title 1"/>
+          <p:cNvSpPr>
+            <a:spLocks noGrp="1"/>
+          </p:cNvSpPr>
+          <p:nvPr>
+            <p:ph type="title"/>
+          </p:nvPr>
+        </p:nvSpPr>
+        <p:spPr>
+          <a:xfrm>
+            <a:off x="325041" y="186479"/>
+            <a:ext cx="10515600" cy="480131"/>
+          </a:xfrm>
+          <a:noFill/>
+        </p:spPr>
+        <p:txBody>
+          <a:bodyPr wrap="square" rtlCol="0">
+            <a:spAutoFit/>
+          </a:bodyPr>
+          <a:lstStyle/>
+          <a:p>
+            <a:r>
+              <a:rPr lang="en-US" sz="2800" b="1" dirty="0">
+                <a:solidFill>
+                  <a:srgbClr val="0070C0"/>
+                </a:solidFill>
+                <a:latin typeface="+mn-lt"/>
+                <a:ea typeface="+mn-ea"/>
+                <a:cs typeface="+mn-cs"/>
+              </a:rPr>
+              <a:t>Medals Won by Age Group</a:t>
+            </a:r>
+          </a:p>
+        </p:txBody>
+      </p:sp>
+      <p:pic>
+        <p:nvPicPr>
+          <p:cNvPr id="6" name="Content Placeholder 5"/>
+          <p:cNvPicPr>
+            <a:picLocks noGrp="1" noChangeAspect="1"/>
+          </p:cNvPicPr>
+          <p:nvPr>
+            <p:ph idx="1"/>
+          </p:nvPr>
+        </p:nvPicPr>
+        <p:blipFill rotWithShape="1">
+          <a:blip r:embed="rId3">
+            <a:extLst>
+              <a:ext uri="{28A0092B-C50C-407E-A947-70E740481C1C}">
+                <a14:useLocalDpi xmlns:a14="http://schemas.microsoft.com/office/drawing/2010/main" val="0"/>
+              </a:ext>
+            </a:extLst>
+          </a:blip>
+          <a:srcRect l="8791" t="6482" r="8892" b="6350"/>
+          <a:stretch/>
+        </p:blipFill>
+        <p:spPr>
+          <a:xfrm>
+            <a:off x="411891" y="2775451"/>
+            <a:ext cx="11591055" cy="4091356"/>
+          </a:xfrm>
+        </p:spPr>
+      </p:pic>
+      <p:sp>
+        <p:nvSpPr>
+          <p:cNvPr id="8" name="TextBox 7"/>
           <p:cNvSpPr txBox="1"/>
           <p:nvPr/>
         </p:nvSpPr>
         <p:spPr>
           <a:xfrm>
-            <a:off x="295274" y="219075"/>
-            <a:ext cx="10687051" cy="523220"/>
+            <a:off x="411892" y="666610"/>
+            <a:ext cx="4530811" cy="369332"/>
           </a:xfrm>
           <a:prstGeom prst="rect">
             <a:avLst/>
@@ -4212,182 +5775,29 @@
           <a:lstStyle/>
           <a:p>
             <a:r>
-              <a:rPr lang="en-US" sz="2800" b="1" i="0" u="none" strike="noStrike" dirty="0">
-                <a:solidFill>
-                  <a:srgbClr val="0070C0"/>
-                </a:solidFill>
-                <a:effectLst/>
-                <a:latin typeface="Arial" panose="020B0604020202020204" pitchFamily="34" charset="0"/>
-              </a:rPr>
-              <a:t>Number of athletes participation over the </a:t>
-            </a:r>
-            <a:r>
-              <a:rPr lang="en-US" sz="2800" b="1" dirty="0">
-                <a:solidFill>
-                  <a:srgbClr val="0070C0"/>
-                </a:solidFill>
-                <a:latin typeface="Arial" panose="020B0604020202020204" pitchFamily="34" charset="0"/>
-              </a:rPr>
-              <a:t>year</a:t>
+              <a:rPr lang="en-US" dirty="0"/>
+              <a:t>. </a:t>
             </a:r>
           </a:p>
         </p:txBody>
       </p:sp>
       <p:pic>
         <p:nvPicPr>
-          <p:cNvPr id="4" name="図 3" descr="グラフ, 折れ線グラフ&#10;&#10;自動的に生成された説明">
-            <a:extLst>
-              <a:ext uri="{FF2B5EF4-FFF2-40B4-BE49-F238E27FC236}">
-                <a16:creationId xmlns:a16="http://schemas.microsoft.com/office/drawing/2014/main" id="{869915AE-9EC9-469A-BFAB-D4CF56141126}"/>
-              </a:ext>
-            </a:extLst>
-          </p:cNvPr>
-          <p:cNvPicPr>
-            <a:picLocks noChangeAspect="1"/>
-          </p:cNvPicPr>
-          <p:nvPr/>
-        </p:nvPicPr>
-        <p:blipFill>
-          <a:blip r:embed="rId2">
-            <a:extLst>
-              <a:ext uri="{28A0092B-C50C-407E-A947-70E740481C1C}">
-                <a14:useLocalDpi xmlns:a14="http://schemas.microsoft.com/office/drawing/2010/main" val="0"/>
-              </a:ext>
-            </a:extLst>
-          </a:blip>
-          <a:stretch>
-            <a:fillRect/>
-          </a:stretch>
-        </p:blipFill>
-        <p:spPr>
-          <a:xfrm>
-            <a:off x="628669" y="1663538"/>
-            <a:ext cx="4471650" cy="2981100"/>
-          </a:xfrm>
-          <a:prstGeom prst="rect">
-            <a:avLst/>
-          </a:prstGeom>
-        </p:spPr>
-      </p:pic>
-      <p:pic>
-        <p:nvPicPr>
-          <p:cNvPr id="6" name="図 5" descr="グラフ, 折れ線グラフ&#10;&#10;自動的に生成された説明">
-            <a:extLst>
-              <a:ext uri="{FF2B5EF4-FFF2-40B4-BE49-F238E27FC236}">
-                <a16:creationId xmlns:a16="http://schemas.microsoft.com/office/drawing/2014/main" id="{0858222E-1125-4871-8CF4-41A526F5E8E9}"/>
-              </a:ext>
-            </a:extLst>
-          </p:cNvPr>
+          <p:cNvPr id="9" name="Picture 8"/>
           <p:cNvPicPr>
             <a:picLocks noChangeAspect="1"/>
           </p:cNvPicPr>
           <p:nvPr/>
         </p:nvPicPr>
         <p:blipFill rotWithShape="1">
-          <a:blip r:embed="rId3">
-            <a:extLst>
-              <a:ext uri="{28A0092B-C50C-407E-A947-70E740481C1C}">
-                <a14:useLocalDpi xmlns:a14="http://schemas.microsoft.com/office/drawing/2010/main" val="0"/>
-              </a:ext>
-            </a:extLst>
-          </a:blip>
-          <a:srcRect t="49105"/>
+          <a:blip r:embed="rId4"/>
+          <a:srcRect b="9658"/>
           <a:stretch/>
         </p:blipFill>
         <p:spPr>
           <a:xfrm>
-            <a:off x="5100319" y="1790901"/>
-            <a:ext cx="6435007" cy="3275094"/>
-          </a:xfrm>
-          <a:prstGeom prst="rect">
-            <a:avLst/>
-          </a:prstGeom>
-        </p:spPr>
-      </p:pic>
-      <p:sp>
-        <p:nvSpPr>
-          <p:cNvPr id="8" name="テキスト ボックス 7">
-            <a:extLst>
-              <a:ext uri="{FF2B5EF4-FFF2-40B4-BE49-F238E27FC236}">
-                <a16:creationId xmlns:a16="http://schemas.microsoft.com/office/drawing/2014/main" id="{4DA7481A-A72F-4A95-97B0-EF4E6C45C99B}"/>
-              </a:ext>
-            </a:extLst>
-          </p:cNvPr>
-          <p:cNvSpPr txBox="1"/>
-          <p:nvPr/>
-        </p:nvSpPr>
-        <p:spPr>
-          <a:xfrm>
-            <a:off x="628669" y="1017207"/>
-            <a:ext cx="10687051" cy="646331"/>
-          </a:xfrm>
-          <a:prstGeom prst="rect">
-            <a:avLst/>
-          </a:prstGeom>
-          <a:noFill/>
-        </p:spPr>
-        <p:txBody>
-          <a:bodyPr wrap="square">
-            <a:spAutoFit/>
-          </a:bodyPr>
-          <a:lstStyle/>
-          <a:p>
-            <a:r>
-              <a:rPr lang="en-US" sz="1800" b="0" i="0" u="none" strike="noStrike" dirty="0">
-                <a:solidFill>
-                  <a:srgbClr val="1D1C1D"/>
-                </a:solidFill>
-                <a:effectLst/>
-                <a:latin typeface="Arial" panose="020B0604020202020204" pitchFamily="34" charset="0"/>
-              </a:rPr>
-              <a:t>Participation of athletes have naturally increased over the years contributed by significant growth in number of female athletes.</a:t>
-            </a:r>
-            <a:endParaRPr lang="en-US" dirty="0"/>
-          </a:p>
-        </p:txBody>
-      </p:sp>
-      <p:pic>
-        <p:nvPicPr>
-          <p:cNvPr id="3" name="Picture 2"/>
-          <p:cNvPicPr>
-            <a:picLocks noChangeAspect="1"/>
-          </p:cNvPicPr>
-          <p:nvPr/>
-        </p:nvPicPr>
-        <p:blipFill>
-          <a:blip r:embed="rId4"/>
-          <a:stretch>
-            <a:fillRect/>
-          </a:stretch>
-        </p:blipFill>
-        <p:spPr>
-          <a:xfrm>
-            <a:off x="295274" y="4981458"/>
-            <a:ext cx="4805045" cy="1064258"/>
-          </a:xfrm>
-          <a:prstGeom prst="rect">
-            <a:avLst/>
-          </a:prstGeom>
-        </p:spPr>
-      </p:pic>
-      <p:pic>
-        <p:nvPicPr>
-          <p:cNvPr id="5" name="Picture 4"/>
-          <p:cNvPicPr>
-            <a:picLocks noChangeAspect="1"/>
-          </p:cNvPicPr>
-          <p:nvPr/>
-        </p:nvPicPr>
-        <p:blipFill>
-          <a:blip r:embed="rId5"/>
-          <a:stretch>
-            <a:fillRect/>
-          </a:stretch>
-        </p:blipFill>
-        <p:spPr>
-          <a:xfrm>
-            <a:off x="5233944" y="4931455"/>
-            <a:ext cx="6167756" cy="1164263"/>
+            <a:off x="411892" y="666610"/>
+            <a:ext cx="6290184" cy="2108841"/>
           </a:xfrm>
           <a:prstGeom prst="rect">
             <a:avLst/>
@@ -4397,7 +5807,7 @@
     </p:spTree>
     <p:extLst>
       <p:ext uri="{BB962C8B-B14F-4D97-AF65-F5344CB8AC3E}">
-        <p14:creationId xmlns:p14="http://schemas.microsoft.com/office/powerpoint/2010/main" val="3636296785"/>
+        <p14:creationId xmlns:p14="http://schemas.microsoft.com/office/powerpoint/2010/main" val="3430190648"/>
       </p:ext>
     </p:extLst>
   </p:cSld>
@@ -4424,12 +5834,41 @@
           <a:chExt cx="0" cy="0"/>
         </a:xfrm>
       </p:grpSpPr>
+      <p:pic>
+        <p:nvPicPr>
+          <p:cNvPr id="5" name="図 4">
+            <a:extLst>
+              <a:ext uri="{FF2B5EF4-FFF2-40B4-BE49-F238E27FC236}">
+                <a16:creationId xmlns:a16="http://schemas.microsoft.com/office/drawing/2014/main" id="{905D3DD5-C866-475E-AE20-0080C3B99EC9}"/>
+              </a:ext>
+            </a:extLst>
+          </p:cNvPr>
+          <p:cNvPicPr>
+            <a:picLocks noChangeAspect="1"/>
+          </p:cNvPicPr>
+          <p:nvPr/>
+        </p:nvPicPr>
+        <p:blipFill rotWithShape="1">
+          <a:blip r:embed="rId3"/>
+          <a:srcRect l="6058" t="36296" r="44917" b="45482"/>
+          <a:stretch/>
+        </p:blipFill>
+        <p:spPr>
+          <a:xfrm>
+            <a:off x="295274" y="839063"/>
+            <a:ext cx="6574464" cy="1374559"/>
+          </a:xfrm>
+          <a:prstGeom prst="rect">
+            <a:avLst/>
+          </a:prstGeom>
+        </p:spPr>
+      </p:pic>
       <p:sp>
         <p:nvSpPr>
           <p:cNvPr id="2" name="テキスト ボックス 1">
             <a:extLst>
               <a:ext uri="{FF2B5EF4-FFF2-40B4-BE49-F238E27FC236}">
-                <a16:creationId xmlns:a16="http://schemas.microsoft.com/office/drawing/2014/main" id="{02706F4B-FB0C-4B84-ACA3-267780375BED}"/>
+                <a16:creationId xmlns:a16="http://schemas.microsoft.com/office/drawing/2014/main" id="{688377C2-DBC5-4D7B-8B81-1EB9BD94F8AA}"/>
               </a:ext>
             </a:extLst>
           </p:cNvPr>
@@ -4453,64 +5892,33 @@
           <a:lstStyle/>
           <a:p>
             <a:r>
+              <a:rPr lang="en-US" sz="2800" b="1" i="0" u="none" strike="noStrike" dirty="0">
+                <a:solidFill>
+                  <a:srgbClr val="0070C0"/>
+                </a:solidFill>
+                <a:effectLst/>
+                <a:latin typeface="Arial" panose="020B0604020202020204" pitchFamily="34" charset="0"/>
+              </a:rPr>
+              <a:t>Number of athletes participation over the </a:t>
+            </a:r>
+            <a:r>
               <a:rPr lang="en-US" sz="2800" b="1" dirty="0">
                 <a:solidFill>
                   <a:srgbClr val="0070C0"/>
                 </a:solidFill>
-              </a:rPr>
-              <a:t>Male vs Female participation change over the years</a:t>
-            </a:r>
-          </a:p>
-        </p:txBody>
-      </p:sp>
-      <p:sp>
-        <p:nvSpPr>
-          <p:cNvPr id="4" name="テキスト ボックス 3">
-            <a:extLst>
-              <a:ext uri="{FF2B5EF4-FFF2-40B4-BE49-F238E27FC236}">
-                <a16:creationId xmlns:a16="http://schemas.microsoft.com/office/drawing/2014/main" id="{6BC0C496-8091-47C5-ADA8-41CF4A9DA2FC}"/>
-              </a:ext>
-            </a:extLst>
-          </p:cNvPr>
-          <p:cNvSpPr txBox="1"/>
-          <p:nvPr/>
-        </p:nvSpPr>
-        <p:spPr>
-          <a:xfrm>
-            <a:off x="457201" y="883647"/>
-            <a:ext cx="8115300" cy="1200329"/>
-          </a:xfrm>
-          <a:prstGeom prst="rect">
-            <a:avLst/>
-          </a:prstGeom>
-          <a:noFill/>
-        </p:spPr>
-        <p:txBody>
-          <a:bodyPr wrap="square">
-            <a:spAutoFit/>
-          </a:bodyPr>
-          <a:lstStyle/>
-          <a:p>
-            <a:r>
-              <a:rPr lang="en-US" sz="1800" b="0" i="0" u="none" strike="noStrike" dirty="0">
-                <a:solidFill>
-                  <a:srgbClr val="1D1C1D"/>
-                </a:solidFill>
-                <a:effectLst/>
                 <a:latin typeface="Arial" panose="020B0604020202020204" pitchFamily="34" charset="0"/>
               </a:rPr>
-              <a:t>Number of female athletes have significantly increased over the years from what it was 12.1% of the total population in 1952 which grew to similar number to male at 45.2% in 2016 which indicates gender equality is gradually being achieved in Olympic games from a participants’ point of view.</a:t>
-            </a:r>
-            <a:endParaRPr lang="en-US" dirty="0"/>
+              <a:t>year</a:t>
+            </a:r>
           </a:p>
         </p:txBody>
       </p:sp>
       <p:pic>
         <p:nvPicPr>
-          <p:cNvPr id="5" name="図 4" descr="グラフ, 円グラフ&#10;&#10;自動的に生成された説明">
-            <a:extLst>
-              <a:ext uri="{FF2B5EF4-FFF2-40B4-BE49-F238E27FC236}">
-                <a16:creationId xmlns:a16="http://schemas.microsoft.com/office/drawing/2014/main" id="{ED7E2C23-B922-4140-9037-E2A0901C9DB3}"/>
+          <p:cNvPr id="11" name="図 10" descr="グラフ, 折れ線グラフ&#10;&#10;自動的に生成された説明">
+            <a:extLst>
+              <a:ext uri="{FF2B5EF4-FFF2-40B4-BE49-F238E27FC236}">
+                <a16:creationId xmlns:a16="http://schemas.microsoft.com/office/drawing/2014/main" id="{B243A8EC-DE48-4317-9D51-430BFFD40180}"/>
               </a:ext>
             </a:extLst>
           </p:cNvPr>
@@ -4520,249 +5928,20 @@
           <p:nvPr/>
         </p:nvPicPr>
         <p:blipFill rotWithShape="1">
-          <a:blip r:embed="rId2">
+          <a:blip r:embed="rId4">
             <a:extLst>
               <a:ext uri="{28A0092B-C50C-407E-A947-70E740481C1C}">
                 <a14:useLocalDpi xmlns:a14="http://schemas.microsoft.com/office/drawing/2010/main" val="0"/>
               </a:ext>
             </a:extLst>
           </a:blip>
-          <a:srcRect l="21477" r="19648" b="2491"/>
+          <a:srcRect t="4177" r="7949"/>
           <a:stretch/>
         </p:blipFill>
         <p:spPr>
           <a:xfrm>
-            <a:off x="457201" y="2225328"/>
-            <a:ext cx="3230880" cy="3567288"/>
-          </a:xfrm>
-          <a:prstGeom prst="rect">
-            <a:avLst/>
-          </a:prstGeom>
-        </p:spPr>
-      </p:pic>
-      <p:pic>
-        <p:nvPicPr>
-          <p:cNvPr id="7" name="図 6" descr="グラフ, 円グラフ&#10;&#10;自動的に生成された説明">
-            <a:extLst>
-              <a:ext uri="{FF2B5EF4-FFF2-40B4-BE49-F238E27FC236}">
-                <a16:creationId xmlns:a16="http://schemas.microsoft.com/office/drawing/2014/main" id="{91F49A1C-0785-4551-BDDB-E6A106C43ACF}"/>
-              </a:ext>
-            </a:extLst>
-          </p:cNvPr>
-          <p:cNvPicPr>
-            <a:picLocks noChangeAspect="1"/>
-          </p:cNvPicPr>
-          <p:nvPr/>
-        </p:nvPicPr>
-        <p:blipFill rotWithShape="1">
-          <a:blip r:embed="rId3">
-            <a:extLst>
-              <a:ext uri="{28A0092B-C50C-407E-A947-70E740481C1C}">
-                <a14:useLocalDpi xmlns:a14="http://schemas.microsoft.com/office/drawing/2010/main" val="0"/>
-              </a:ext>
-            </a:extLst>
-          </a:blip>
-          <a:srcRect l="22807" r="20009"/>
-          <a:stretch/>
-        </p:blipFill>
-        <p:spPr>
-          <a:xfrm>
-            <a:off x="4055130" y="2224561"/>
-            <a:ext cx="3138042" cy="3658433"/>
-          </a:xfrm>
-          <a:prstGeom prst="rect">
-            <a:avLst/>
-          </a:prstGeom>
-        </p:spPr>
-      </p:pic>
-      <p:pic>
-        <p:nvPicPr>
-          <p:cNvPr id="9" name="図 8" descr="グラフ, 円グラフ&#10;&#10;自動的に生成された説明">
-            <a:extLst>
-              <a:ext uri="{FF2B5EF4-FFF2-40B4-BE49-F238E27FC236}">
-                <a16:creationId xmlns:a16="http://schemas.microsoft.com/office/drawing/2014/main" id="{E582B545-4181-4D3A-826F-5FE96F19809E}"/>
-              </a:ext>
-            </a:extLst>
-          </p:cNvPr>
-          <p:cNvPicPr>
-            <a:picLocks noChangeAspect="1"/>
-          </p:cNvPicPr>
-          <p:nvPr/>
-        </p:nvPicPr>
-        <p:blipFill>
-          <a:blip r:embed="rId4">
-            <a:extLst>
-              <a:ext uri="{28A0092B-C50C-407E-A947-70E740481C1C}">
-                <a14:useLocalDpi xmlns:a14="http://schemas.microsoft.com/office/drawing/2010/main" val="0"/>
-              </a:ext>
-            </a:extLst>
-          </a:blip>
-          <a:stretch>
-            <a:fillRect/>
-          </a:stretch>
-        </p:blipFill>
-        <p:spPr>
-          <a:xfrm>
-            <a:off x="8939550" y="437799"/>
-            <a:ext cx="3138041" cy="2092027"/>
-          </a:xfrm>
-          <a:prstGeom prst="rect">
-            <a:avLst/>
-          </a:prstGeom>
-        </p:spPr>
-      </p:pic>
-      <p:sp>
-        <p:nvSpPr>
-          <p:cNvPr id="11" name="テキスト ボックス 10">
-            <a:extLst>
-              <a:ext uri="{FF2B5EF4-FFF2-40B4-BE49-F238E27FC236}">
-                <a16:creationId xmlns:a16="http://schemas.microsoft.com/office/drawing/2014/main" id="{6D731A48-EEF6-4E23-BB8C-AE5EBF4DD3DC}"/>
-              </a:ext>
-            </a:extLst>
-          </p:cNvPr>
-          <p:cNvSpPr txBox="1"/>
-          <p:nvPr/>
-        </p:nvSpPr>
-        <p:spPr>
-          <a:xfrm>
-            <a:off x="2790488" y="6004561"/>
-            <a:ext cx="923925" cy="369332"/>
-          </a:xfrm>
-          <a:prstGeom prst="rect">
-            <a:avLst/>
-          </a:prstGeom>
-          <a:noFill/>
-        </p:spPr>
-        <p:txBody>
-          <a:bodyPr wrap="square">
-            <a:spAutoFit/>
-          </a:bodyPr>
-          <a:lstStyle/>
-          <a:p>
-            <a:pPr algn="ctr"/>
-            <a:r>
-              <a:rPr lang="en-US" sz="1800" b="0" i="0" u="none" strike="noStrike" dirty="0">
-                <a:solidFill>
-                  <a:srgbClr val="1D1C1D"/>
-                </a:solidFill>
-                <a:effectLst/>
-                <a:latin typeface="Arial" panose="020B0604020202020204" pitchFamily="34" charset="0"/>
-              </a:rPr>
-              <a:t>1952 </a:t>
-            </a:r>
-            <a:endParaRPr lang="en-US" dirty="0"/>
-          </a:p>
-        </p:txBody>
-      </p:sp>
-      <p:sp>
-        <p:nvSpPr>
-          <p:cNvPr id="12" name="テキスト ボックス 11">
-            <a:extLst>
-              <a:ext uri="{FF2B5EF4-FFF2-40B4-BE49-F238E27FC236}">
-                <a16:creationId xmlns:a16="http://schemas.microsoft.com/office/drawing/2014/main" id="{A5C11D66-5FF0-4AB6-8B9F-4B7A053F9627}"/>
-              </a:ext>
-            </a:extLst>
-          </p:cNvPr>
-          <p:cNvSpPr txBox="1"/>
-          <p:nvPr/>
-        </p:nvSpPr>
-        <p:spPr>
-          <a:xfrm>
-            <a:off x="7249478" y="6023579"/>
-            <a:ext cx="923925" cy="369332"/>
-          </a:xfrm>
-          <a:prstGeom prst="rect">
-            <a:avLst/>
-          </a:prstGeom>
-          <a:noFill/>
-        </p:spPr>
-        <p:txBody>
-          <a:bodyPr wrap="square">
-            <a:spAutoFit/>
-          </a:bodyPr>
-          <a:lstStyle/>
-          <a:p>
-            <a:pPr algn="ctr"/>
-            <a:r>
-              <a:rPr lang="en-US" sz="1800" b="0" i="0" u="none" strike="noStrike" dirty="0">
-                <a:solidFill>
-                  <a:srgbClr val="1D1C1D"/>
-                </a:solidFill>
-                <a:effectLst/>
-                <a:latin typeface="Arial" panose="020B0604020202020204" pitchFamily="34" charset="0"/>
-              </a:rPr>
-              <a:t>2016 </a:t>
-            </a:r>
-            <a:endParaRPr lang="en-US" dirty="0"/>
-          </a:p>
-        </p:txBody>
-      </p:sp>
-      <p:pic>
-        <p:nvPicPr>
-          <p:cNvPr id="3" name="Picture 2"/>
-          <p:cNvPicPr>
-            <a:picLocks noChangeAspect="1"/>
-          </p:cNvPicPr>
-          <p:nvPr/>
-        </p:nvPicPr>
-        <p:blipFill>
-          <a:blip r:embed="rId5"/>
-          <a:stretch>
-            <a:fillRect/>
-          </a:stretch>
-        </p:blipFill>
-        <p:spPr>
-          <a:xfrm>
-            <a:off x="8173403" y="2529826"/>
-            <a:ext cx="3687076" cy="1236695"/>
-          </a:xfrm>
-          <a:prstGeom prst="rect">
-            <a:avLst/>
-          </a:prstGeom>
-        </p:spPr>
-      </p:pic>
-      <p:pic>
-        <p:nvPicPr>
-          <p:cNvPr id="6" name="Picture 5"/>
-          <p:cNvPicPr>
-            <a:picLocks noChangeAspect="1"/>
-          </p:cNvPicPr>
-          <p:nvPr/>
-        </p:nvPicPr>
-        <p:blipFill>
-          <a:blip r:embed="rId6"/>
-          <a:stretch>
-            <a:fillRect/>
-          </a:stretch>
-        </p:blipFill>
-        <p:spPr>
-          <a:xfrm>
-            <a:off x="8173403" y="3818537"/>
-            <a:ext cx="3687076" cy="1216355"/>
-          </a:xfrm>
-          <a:prstGeom prst="rect">
-            <a:avLst/>
-          </a:prstGeom>
-        </p:spPr>
-      </p:pic>
-      <p:pic>
-        <p:nvPicPr>
-          <p:cNvPr id="8" name="Picture 7"/>
-          <p:cNvPicPr>
-            <a:picLocks noChangeAspect="1"/>
-          </p:cNvPicPr>
-          <p:nvPr/>
-        </p:nvPicPr>
-        <p:blipFill>
-          <a:blip r:embed="rId7"/>
-          <a:stretch>
-            <a:fillRect/>
-          </a:stretch>
-        </p:blipFill>
-        <p:spPr>
-          <a:xfrm>
-            <a:off x="8173403" y="5086907"/>
-            <a:ext cx="3687076" cy="1257085"/>
+            <a:off x="4740273" y="1638092"/>
+            <a:ext cx="7009237" cy="4864308"/>
           </a:xfrm>
           <a:prstGeom prst="rect">
             <a:avLst/>
@@ -4772,7 +5951,7 @@
     </p:spTree>
     <p:extLst>
       <p:ext uri="{BB962C8B-B14F-4D97-AF65-F5344CB8AC3E}">
-        <p14:creationId xmlns:p14="http://schemas.microsoft.com/office/powerpoint/2010/main" val="4048509449"/>
+        <p14:creationId xmlns:p14="http://schemas.microsoft.com/office/powerpoint/2010/main" val="1694773093"/>
       </p:ext>
     </p:extLst>
   </p:cSld>
@@ -4801,80 +5980,20 @@
       </p:grpSpPr>
       <p:sp>
         <p:nvSpPr>
-          <p:cNvPr id="2" name="Title 1"/>
-          <p:cNvSpPr>
-            <a:spLocks noGrp="1"/>
-          </p:cNvSpPr>
-          <p:nvPr>
-            <p:ph type="title"/>
-          </p:nvPr>
+          <p:cNvPr id="2" name="テキスト ボックス 1">
+            <a:extLst>
+              <a:ext uri="{FF2B5EF4-FFF2-40B4-BE49-F238E27FC236}">
+                <a16:creationId xmlns:a16="http://schemas.microsoft.com/office/drawing/2014/main" id="{688377C2-DBC5-4D7B-8B81-1EB9BD94F8AA}"/>
+              </a:ext>
+            </a:extLst>
+          </p:cNvPr>
+          <p:cNvSpPr txBox="1"/>
+          <p:nvPr/>
         </p:nvSpPr>
         <p:spPr>
           <a:xfrm>
-            <a:off x="325041" y="186479"/>
-            <a:ext cx="10515600" cy="480131"/>
-          </a:xfrm>
-          <a:noFill/>
-        </p:spPr>
-        <p:txBody>
-          <a:bodyPr wrap="square" rtlCol="0">
-            <a:spAutoFit/>
-          </a:bodyPr>
-          <a:lstStyle/>
-          <a:p>
-            <a:r>
-              <a:rPr lang="en-US" sz="2800" b="1" dirty="0">
-                <a:solidFill>
-                  <a:srgbClr val="0070C0"/>
-                </a:solidFill>
-                <a:latin typeface="+mn-lt"/>
-                <a:ea typeface="+mn-ea"/>
-                <a:cs typeface="+mn-cs"/>
-              </a:rPr>
-              <a:t>Medals Won by Age Group</a:t>
-            </a:r>
-          </a:p>
-        </p:txBody>
-      </p:sp>
-      <p:pic>
-        <p:nvPicPr>
-          <p:cNvPr id="6" name="Content Placeholder 5"/>
-          <p:cNvPicPr>
-            <a:picLocks noGrp="1" noChangeAspect="1"/>
-          </p:cNvPicPr>
-          <p:nvPr>
-            <p:ph idx="1"/>
-          </p:nvPr>
-        </p:nvPicPr>
-        <p:blipFill>
-          <a:blip r:embed="rId2">
-            <a:extLst>
-              <a:ext uri="{28A0092B-C50C-407E-A947-70E740481C1C}">
-                <a14:useLocalDpi xmlns:a14="http://schemas.microsoft.com/office/drawing/2010/main" val="0"/>
-              </a:ext>
-            </a:extLst>
-          </a:blip>
-          <a:stretch>
-            <a:fillRect/>
-          </a:stretch>
-        </p:blipFill>
-        <p:spPr>
-          <a:xfrm>
-            <a:off x="325041" y="2438164"/>
-            <a:ext cx="11541918" cy="3847306"/>
-          </a:xfrm>
-        </p:spPr>
-      </p:pic>
-      <p:sp>
-        <p:nvSpPr>
-          <p:cNvPr id="8" name="TextBox 7"/>
-          <p:cNvSpPr txBox="1"/>
-          <p:nvPr/>
-        </p:nvSpPr>
-        <p:spPr>
-          <a:xfrm>
-            <a:off x="411892" y="666610"/>
-            <a:ext cx="4530811" cy="646331"/>
+            <a:off x="295274" y="219075"/>
+            <a:ext cx="10687051" cy="523220"/>
           </a:xfrm>
           <a:prstGeom prst="rect">
             <a:avLst/>
@@ -4888,31 +6007,85 @@
           <a:lstStyle/>
           <a:p>
             <a:r>
-              <a:rPr lang="en-US" dirty="0" smtClean="0"/>
-              <a:t>The best chance for someone to win any medal would be between the ages of 20-30. </a:t>
-            </a:r>
-            <a:endParaRPr lang="en-US" dirty="0"/>
+              <a:rPr lang="en-US" sz="2800" b="1" i="0" u="none" strike="noStrike" dirty="0">
+                <a:solidFill>
+                  <a:srgbClr val="0070C0"/>
+                </a:solidFill>
+                <a:effectLst/>
+                <a:latin typeface="Arial" panose="020B0604020202020204" pitchFamily="34" charset="0"/>
+              </a:rPr>
+              <a:t>Number of athletes participation over the </a:t>
+            </a:r>
+            <a:r>
+              <a:rPr lang="en-US" sz="2800" b="1" dirty="0">
+                <a:solidFill>
+                  <a:srgbClr val="0070C0"/>
+                </a:solidFill>
+                <a:latin typeface="Arial" panose="020B0604020202020204" pitchFamily="34" charset="0"/>
+              </a:rPr>
+              <a:t>year</a:t>
+            </a:r>
           </a:p>
         </p:txBody>
       </p:sp>
       <p:pic>
         <p:nvPicPr>
-          <p:cNvPr id="9" name="Picture 8"/>
+          <p:cNvPr id="9" name="図 8">
+            <a:extLst>
+              <a:ext uri="{FF2B5EF4-FFF2-40B4-BE49-F238E27FC236}">
+                <a16:creationId xmlns:a16="http://schemas.microsoft.com/office/drawing/2014/main" id="{806B31F8-BCB8-4366-B487-254FCC103C46}"/>
+              </a:ext>
+            </a:extLst>
+          </p:cNvPr>
           <p:cNvPicPr>
             <a:picLocks noChangeAspect="1"/>
           </p:cNvPicPr>
           <p:nvPr/>
         </p:nvPicPr>
-        <p:blipFill>
+        <p:blipFill rotWithShape="1">
           <a:blip r:embed="rId3"/>
-          <a:stretch>
-            <a:fillRect/>
-          </a:stretch>
+          <a:srcRect l="2422" t="20180" r="7973" b="52244"/>
+          <a:stretch/>
         </p:blipFill>
         <p:spPr>
           <a:xfrm>
-            <a:off x="5741773" y="186478"/>
-            <a:ext cx="6290184" cy="2334299"/>
+            <a:off x="295274" y="852706"/>
+            <a:ext cx="10924661" cy="1891137"/>
+          </a:xfrm>
+          <a:prstGeom prst="rect">
+            <a:avLst/>
+          </a:prstGeom>
+        </p:spPr>
+      </p:pic>
+      <p:pic>
+        <p:nvPicPr>
+          <p:cNvPr id="7" name="図 6" descr="グラフ, 折れ線グラフ, ヒストグラム&#10;&#10;自動的に生成された説明">
+            <a:extLst>
+              <a:ext uri="{FF2B5EF4-FFF2-40B4-BE49-F238E27FC236}">
+                <a16:creationId xmlns:a16="http://schemas.microsoft.com/office/drawing/2014/main" id="{695FA492-1DD1-4F8D-BD88-2C807B4168B0}"/>
+              </a:ext>
+            </a:extLst>
+          </p:cNvPr>
+          <p:cNvPicPr>
+            <a:picLocks noChangeAspect="1"/>
+          </p:cNvPicPr>
+          <p:nvPr/>
+        </p:nvPicPr>
+        <p:blipFill rotWithShape="1">
+          <a:blip r:embed="rId4">
+            <a:extLst>
+              <a:ext uri="{28A0092B-C50C-407E-A947-70E740481C1C}">
+                <a14:useLocalDpi xmlns:a14="http://schemas.microsoft.com/office/drawing/2010/main" val="0"/>
+              </a:ext>
+            </a:extLst>
+          </a:blip>
+          <a:srcRect l="3148" t="50000" r="7778" b="5478"/>
+          <a:stretch/>
+        </p:blipFill>
+        <p:spPr>
+          <a:xfrm>
+            <a:off x="1787224" y="2888978"/>
+            <a:ext cx="7940759" cy="3969083"/>
           </a:xfrm>
           <a:prstGeom prst="rect">
             <a:avLst/>
@@ -4922,7 +6095,7 @@
     </p:spTree>
     <p:extLst>
       <p:ext uri="{BB962C8B-B14F-4D97-AF65-F5344CB8AC3E}">
-        <p14:creationId xmlns:p14="http://schemas.microsoft.com/office/powerpoint/2010/main" val="3430190648"/>
+        <p14:creationId xmlns:p14="http://schemas.microsoft.com/office/powerpoint/2010/main" val="1929326997"/>
       </p:ext>
     </p:extLst>
   </p:cSld>
@@ -4983,69 +6156,172 @@
                   <a:srgbClr val="0070C0"/>
                 </a:solidFill>
               </a:rPr>
-              <a:t>Medals won by countries</a:t>
-            </a:r>
-          </a:p>
-        </p:txBody>
-      </p:sp>
-      <p:sp>
-        <p:nvSpPr>
-          <p:cNvPr id="4" name="テキスト ボックス 3">
-            <a:extLst>
-              <a:ext uri="{FF2B5EF4-FFF2-40B4-BE49-F238E27FC236}">
-                <a16:creationId xmlns:a16="http://schemas.microsoft.com/office/drawing/2014/main" id="{6BC0C496-8091-47C5-ADA8-41CF4A9DA2FC}"/>
-              </a:ext>
-            </a:extLst>
-          </p:cNvPr>
-          <p:cNvSpPr txBox="1"/>
+              <a:t>Male vs Female participation change over the years</a:t>
+            </a:r>
+          </a:p>
+        </p:txBody>
+      </p:sp>
+      <p:pic>
+        <p:nvPicPr>
+          <p:cNvPr id="16" name="図 15" descr="グラフ, 円グラフ&#10;&#10;自動的に生成された説明">
+            <a:extLst>
+              <a:ext uri="{FF2B5EF4-FFF2-40B4-BE49-F238E27FC236}">
+                <a16:creationId xmlns:a16="http://schemas.microsoft.com/office/drawing/2014/main" id="{EC843017-9C9D-4005-B15C-8DE250A79E89}"/>
+              </a:ext>
+            </a:extLst>
+          </p:cNvPr>
+          <p:cNvPicPr>
+            <a:picLocks noChangeAspect="1"/>
+          </p:cNvPicPr>
           <p:nvPr/>
-        </p:nvSpPr>
+        </p:nvPicPr>
+        <p:blipFill rotWithShape="1">
+          <a:blip r:embed="rId3">
+            <a:extLst>
+              <a:ext uri="{28A0092B-C50C-407E-A947-70E740481C1C}">
+                <a14:useLocalDpi xmlns:a14="http://schemas.microsoft.com/office/drawing/2010/main" val="0"/>
+              </a:ext>
+            </a:extLst>
+          </a:blip>
+          <a:srcRect l="20157" r="17588"/>
+          <a:stretch/>
+        </p:blipFill>
         <p:spPr>
           <a:xfrm>
-            <a:off x="752475" y="967859"/>
-            <a:ext cx="10687050" cy="646331"/>
+            <a:off x="1271387" y="2706700"/>
+            <a:ext cx="3440314" cy="3684149"/>
           </a:xfrm>
           <a:prstGeom prst="rect">
             <a:avLst/>
           </a:prstGeom>
-          <a:noFill/>
         </p:spPr>
-        <p:txBody>
-          <a:bodyPr wrap="square">
-            <a:spAutoFit/>
-          </a:bodyPr>
-          <a:lstStyle/>
-          <a:p>
-            <a:r>
-              <a:rPr lang="en-US" sz="1800" b="0" i="0" u="none" strike="noStrike" dirty="0">
-                <a:solidFill>
-                  <a:srgbClr val="1D1C1D"/>
-                </a:solidFill>
-                <a:effectLst/>
-                <a:latin typeface="Arial" panose="020B0604020202020204" pitchFamily="34" charset="0"/>
-              </a:rPr>
-              <a:t>Summer/Winter</a:t>
-            </a:r>
-          </a:p>
-          <a:p>
-            <a:r>
-              <a:rPr lang="en-US" sz="1800" b="0" i="0" u="none" strike="noStrike" dirty="0">
-                <a:solidFill>
-                  <a:srgbClr val="1D1C1D"/>
-                </a:solidFill>
-                <a:effectLst/>
-                <a:latin typeface="Arial" panose="020B0604020202020204" pitchFamily="34" charset="0"/>
-              </a:rPr>
-              <a:t>Top 10 countries?</a:t>
-            </a:r>
-            <a:endParaRPr lang="en-US" dirty="0"/>
-          </a:p>
-        </p:txBody>
-      </p:sp>
+      </p:pic>
+      <p:pic>
+        <p:nvPicPr>
+          <p:cNvPr id="18" name="図 17" descr="グラフ, 円グラフ&#10;&#10;自動的に生成された説明">
+            <a:extLst>
+              <a:ext uri="{FF2B5EF4-FFF2-40B4-BE49-F238E27FC236}">
+                <a16:creationId xmlns:a16="http://schemas.microsoft.com/office/drawing/2014/main" id="{4F38DFD6-0DF9-4FC0-8549-D4EEC035C1FD}"/>
+              </a:ext>
+            </a:extLst>
+          </p:cNvPr>
+          <p:cNvPicPr>
+            <a:picLocks noChangeAspect="1"/>
+          </p:cNvPicPr>
+          <p:nvPr/>
+        </p:nvPicPr>
+        <p:blipFill rotWithShape="1">
+          <a:blip r:embed="rId4">
+            <a:extLst>
+              <a:ext uri="{28A0092B-C50C-407E-A947-70E740481C1C}">
+                <a14:useLocalDpi xmlns:a14="http://schemas.microsoft.com/office/drawing/2010/main" val="0"/>
+              </a:ext>
+            </a:extLst>
+          </a:blip>
+          <a:srcRect l="17380" r="14140"/>
+          <a:stretch/>
+        </p:blipFill>
+        <p:spPr>
+          <a:xfrm>
+            <a:off x="6783049" y="2706700"/>
+            <a:ext cx="3822995" cy="3721756"/>
+          </a:xfrm>
+          <a:prstGeom prst="rect">
+            <a:avLst/>
+          </a:prstGeom>
+        </p:spPr>
+      </p:pic>
+      <p:pic>
+        <p:nvPicPr>
+          <p:cNvPr id="6" name="図 5">
+            <a:extLst>
+              <a:ext uri="{FF2B5EF4-FFF2-40B4-BE49-F238E27FC236}">
+                <a16:creationId xmlns:a16="http://schemas.microsoft.com/office/drawing/2014/main" id="{D87261C6-1159-4B61-A03B-5F0599876886}"/>
+              </a:ext>
+            </a:extLst>
+          </p:cNvPr>
+          <p:cNvPicPr>
+            <a:picLocks noChangeAspect="1"/>
+          </p:cNvPicPr>
+          <p:nvPr/>
+        </p:nvPicPr>
+        <p:blipFill rotWithShape="1">
+          <a:blip r:embed="rId5"/>
+          <a:srcRect l="7187" t="37403" r="67881" b="59460"/>
+          <a:stretch/>
+        </p:blipFill>
+        <p:spPr>
+          <a:xfrm>
+            <a:off x="663284" y="6286821"/>
+            <a:ext cx="4975515" cy="352104"/>
+          </a:xfrm>
+          <a:prstGeom prst="rect">
+            <a:avLst/>
+          </a:prstGeom>
+        </p:spPr>
+      </p:pic>
+      <p:pic>
+        <p:nvPicPr>
+          <p:cNvPr id="14" name="図 13">
+            <a:extLst>
+              <a:ext uri="{FF2B5EF4-FFF2-40B4-BE49-F238E27FC236}">
+                <a16:creationId xmlns:a16="http://schemas.microsoft.com/office/drawing/2014/main" id="{D6C2B4D1-2C4D-434C-BE23-9810A20A952E}"/>
+              </a:ext>
+            </a:extLst>
+          </p:cNvPr>
+          <p:cNvPicPr>
+            <a:picLocks noChangeAspect="1"/>
+          </p:cNvPicPr>
+          <p:nvPr/>
+        </p:nvPicPr>
+        <p:blipFill rotWithShape="1">
+          <a:blip r:embed="rId6"/>
+          <a:srcRect l="7666" t="37747" r="65833" b="58519"/>
+          <a:stretch/>
+        </p:blipFill>
+        <p:spPr>
+          <a:xfrm>
+            <a:off x="6454485" y="6244545"/>
+            <a:ext cx="4975515" cy="394380"/>
+          </a:xfrm>
+          <a:prstGeom prst="rect">
+            <a:avLst/>
+          </a:prstGeom>
+        </p:spPr>
+      </p:pic>
+      <p:pic>
+        <p:nvPicPr>
+          <p:cNvPr id="19" name="図 18">
+            <a:extLst>
+              <a:ext uri="{FF2B5EF4-FFF2-40B4-BE49-F238E27FC236}">
+                <a16:creationId xmlns:a16="http://schemas.microsoft.com/office/drawing/2014/main" id="{8D8D1627-6A5D-476A-8C97-D589EDE8D2F6}"/>
+              </a:ext>
+            </a:extLst>
+          </p:cNvPr>
+          <p:cNvPicPr>
+            <a:picLocks noChangeAspect="1"/>
+          </p:cNvPicPr>
+          <p:nvPr/>
+        </p:nvPicPr>
+        <p:blipFill rotWithShape="1">
+          <a:blip r:embed="rId7"/>
+          <a:srcRect l="2422" t="27963" r="42813" b="57343"/>
+          <a:stretch/>
+        </p:blipFill>
+        <p:spPr>
+          <a:xfrm>
+            <a:off x="332667" y="821343"/>
+            <a:ext cx="11097333" cy="1674888"/>
+          </a:xfrm>
+          <a:prstGeom prst="rect">
+            <a:avLst/>
+          </a:prstGeom>
+        </p:spPr>
+      </p:pic>
     </p:spTree>
     <p:extLst>
       <p:ext uri="{BB962C8B-B14F-4D97-AF65-F5344CB8AC3E}">
-        <p14:creationId xmlns:p14="http://schemas.microsoft.com/office/powerpoint/2010/main" val="968485070"/>
+        <p14:creationId xmlns:p14="http://schemas.microsoft.com/office/powerpoint/2010/main" val="426983075"/>
       </p:ext>
     </p:extLst>
   </p:cSld>
@@ -5106,7 +6382,7 @@
                   <a:srgbClr val="0070C0"/>
                 </a:solidFill>
               </a:rPr>
-              <a:t>US medals vs the other regions</a:t>
+              <a:t>Medals won by countries</a:t>
             </a:r>
           </a:p>
         </p:txBody>
@@ -5147,124 +6423,16 @@
                 <a:effectLst/>
                 <a:latin typeface="Arial" panose="020B0604020202020204" pitchFamily="34" charset="0"/>
               </a:rPr>
-              <a:t>Early 1900s big jump of US medals vs other regions</a:t>
+              <a:t>Codes</a:t>
             </a:r>
             <a:endParaRPr lang="en-US" dirty="0"/>
           </a:p>
         </p:txBody>
       </p:sp>
-      <p:pic>
-        <p:nvPicPr>
-          <p:cNvPr id="3" name="Picture 2"/>
-          <p:cNvPicPr>
-            <a:picLocks noChangeAspect="1"/>
-          </p:cNvPicPr>
-          <p:nvPr/>
-        </p:nvPicPr>
-        <p:blipFill>
-          <a:blip r:embed="rId2">
-            <a:extLst>
-              <a:ext uri="{28A0092B-C50C-407E-A947-70E740481C1C}">
-                <a14:useLocalDpi xmlns:a14="http://schemas.microsoft.com/office/drawing/2010/main" val="0"/>
-              </a:ext>
-            </a:extLst>
-          </a:blip>
-          <a:stretch>
-            <a:fillRect/>
-          </a:stretch>
-        </p:blipFill>
-        <p:spPr>
-          <a:xfrm>
-            <a:off x="295274" y="1337191"/>
-            <a:ext cx="5833770" cy="3111344"/>
-          </a:xfrm>
-          <a:prstGeom prst="rect">
-            <a:avLst/>
-          </a:prstGeom>
-        </p:spPr>
-      </p:pic>
-      <p:pic>
-        <p:nvPicPr>
-          <p:cNvPr id="5" name="Picture 4"/>
-          <p:cNvPicPr>
-            <a:picLocks noChangeAspect="1"/>
-          </p:cNvPicPr>
-          <p:nvPr/>
-        </p:nvPicPr>
-        <p:blipFill>
-          <a:blip r:embed="rId3">
-            <a:extLst>
-              <a:ext uri="{28A0092B-C50C-407E-A947-70E740481C1C}">
-                <a14:useLocalDpi xmlns:a14="http://schemas.microsoft.com/office/drawing/2010/main" val="0"/>
-              </a:ext>
-            </a:extLst>
-          </a:blip>
-          <a:stretch>
-            <a:fillRect/>
-          </a:stretch>
-        </p:blipFill>
-        <p:spPr>
-          <a:xfrm>
-            <a:off x="6209950" y="1337192"/>
-            <a:ext cx="5833768" cy="3111344"/>
-          </a:xfrm>
-          <a:prstGeom prst="rect">
-            <a:avLst/>
-          </a:prstGeom>
-        </p:spPr>
-      </p:pic>
-      <p:pic>
-        <p:nvPicPr>
-          <p:cNvPr id="6" name="Picture 5"/>
-          <p:cNvPicPr>
-            <a:picLocks noChangeAspect="1"/>
-          </p:cNvPicPr>
-          <p:nvPr/>
-        </p:nvPicPr>
-        <p:blipFill>
-          <a:blip r:embed="rId4"/>
-          <a:stretch>
-            <a:fillRect/>
-          </a:stretch>
-        </p:blipFill>
-        <p:spPr>
-          <a:xfrm>
-            <a:off x="6269527" y="219075"/>
-            <a:ext cx="5714613" cy="1079495"/>
-          </a:xfrm>
-          <a:prstGeom prst="rect">
-            <a:avLst/>
-          </a:prstGeom>
-        </p:spPr>
-      </p:pic>
-      <p:pic>
-        <p:nvPicPr>
-          <p:cNvPr id="7" name="Picture 6"/>
-          <p:cNvPicPr>
-            <a:picLocks noChangeAspect="1"/>
-          </p:cNvPicPr>
-          <p:nvPr/>
-        </p:nvPicPr>
-        <p:blipFill>
-          <a:blip r:embed="rId5"/>
-          <a:stretch>
-            <a:fillRect/>
-          </a:stretch>
-        </p:blipFill>
-        <p:spPr>
-          <a:xfrm>
-            <a:off x="2338672" y="5043431"/>
-            <a:ext cx="7514656" cy="1307978"/>
-          </a:xfrm>
-          <a:prstGeom prst="rect">
-            <a:avLst/>
-          </a:prstGeom>
-        </p:spPr>
-      </p:pic>
     </p:spTree>
     <p:extLst>
       <p:ext uri="{BB962C8B-B14F-4D97-AF65-F5344CB8AC3E}">
-        <p14:creationId xmlns:p14="http://schemas.microsoft.com/office/powerpoint/2010/main" val="4235606923"/>
+        <p14:creationId xmlns:p14="http://schemas.microsoft.com/office/powerpoint/2010/main" val="968485070"/>
       </p:ext>
     </p:extLst>
   </p:cSld>
@@ -5291,35 +6459,6 @@
           <a:chExt cx="0" cy="0"/>
         </a:xfrm>
       </p:grpSpPr>
-      <p:pic>
-        <p:nvPicPr>
-          <p:cNvPr id="7" name="図 6">
-            <a:extLst>
-              <a:ext uri="{FF2B5EF4-FFF2-40B4-BE49-F238E27FC236}">
-                <a16:creationId xmlns:a16="http://schemas.microsoft.com/office/drawing/2014/main" id="{047A037E-ABC1-46B5-B4E6-CCDFBB3836C5}"/>
-              </a:ext>
-            </a:extLst>
-          </p:cNvPr>
-          <p:cNvPicPr>
-            <a:picLocks noChangeAspect="1"/>
-          </p:cNvPicPr>
-          <p:nvPr/>
-        </p:nvPicPr>
-        <p:blipFill rotWithShape="1">
-          <a:blip r:embed="rId2"/>
-          <a:srcRect l="5618" t="37113" r="47151" b="17037"/>
-          <a:stretch/>
-        </p:blipFill>
-        <p:spPr>
-          <a:xfrm>
-            <a:off x="6797675" y="4076505"/>
-            <a:ext cx="4957446" cy="2707005"/>
-          </a:xfrm>
-          <a:prstGeom prst="rect">
-            <a:avLst/>
-          </a:prstGeom>
-        </p:spPr>
-      </p:pic>
       <p:sp>
         <p:nvSpPr>
           <p:cNvPr id="2" name="テキスト ボックス 1">
@@ -5349,68 +6488,32 @@
           <a:lstStyle/>
           <a:p>
             <a:r>
-              <a:rPr lang="en-US" sz="2800" b="1" i="0" u="none" strike="noStrike" dirty="0">
+              <a:rPr lang="en-US" sz="2800" b="1" dirty="0">
                 <a:solidFill>
                   <a:srgbClr val="0070C0"/>
                 </a:solidFill>
-                <a:effectLst/>
-                <a:latin typeface="Arial" panose="020B0604020202020204" pitchFamily="34" charset="0"/>
               </a:rPr>
-              <a:t>Outro</a:t>
-            </a:r>
-            <a:endParaRPr lang="en-US" sz="2800" b="1" dirty="0">
-              <a:solidFill>
-                <a:srgbClr val="0070C0"/>
-              </a:solidFill>
-            </a:endParaRPr>
-          </a:p>
-        </p:txBody>
-      </p:sp>
-      <p:pic>
-        <p:nvPicPr>
-          <p:cNvPr id="5" name="図 4">
-            <a:extLst>
-              <a:ext uri="{FF2B5EF4-FFF2-40B4-BE49-F238E27FC236}">
-                <a16:creationId xmlns:a16="http://schemas.microsoft.com/office/drawing/2014/main" id="{3FA6757E-547A-42D6-907E-FD0D23B81B09}"/>
-              </a:ext>
-            </a:extLst>
-          </p:cNvPr>
-          <p:cNvPicPr>
-            <a:picLocks noChangeAspect="1"/>
-          </p:cNvPicPr>
+              <a:t>Medals won by countries</a:t>
+            </a:r>
+          </a:p>
+        </p:txBody>
+      </p:sp>
+      <p:sp>
+        <p:nvSpPr>
+          <p:cNvPr id="4" name="テキスト ボックス 3">
+            <a:extLst>
+              <a:ext uri="{FF2B5EF4-FFF2-40B4-BE49-F238E27FC236}">
+                <a16:creationId xmlns:a16="http://schemas.microsoft.com/office/drawing/2014/main" id="{6BC0C496-8091-47C5-ADA8-41CF4A9DA2FC}"/>
+              </a:ext>
+            </a:extLst>
+          </p:cNvPr>
+          <p:cNvSpPr txBox="1"/>
           <p:nvPr/>
-        </p:nvPicPr>
-        <p:blipFill rotWithShape="1">
-          <a:blip r:embed="rId3"/>
-          <a:srcRect l="5416" t="18666" r="46750" b="11408"/>
-          <a:stretch/>
-        </p:blipFill>
+        </p:nvSpPr>
         <p:spPr>
           <a:xfrm>
-            <a:off x="6797675" y="0"/>
-            <a:ext cx="4957445" cy="4076505"/>
-          </a:xfrm>
-          <a:prstGeom prst="rect">
-            <a:avLst/>
-          </a:prstGeom>
-        </p:spPr>
-      </p:pic>
-      <p:sp>
-        <p:nvSpPr>
-          <p:cNvPr id="8" name="テキスト ボックス 7">
-            <a:extLst>
-              <a:ext uri="{FF2B5EF4-FFF2-40B4-BE49-F238E27FC236}">
-                <a16:creationId xmlns:a16="http://schemas.microsoft.com/office/drawing/2014/main" id="{18ADCDEF-CCA0-4DE5-9836-B8F77311FE60}"/>
-              </a:ext>
-            </a:extLst>
-          </p:cNvPr>
-          <p:cNvSpPr txBox="1"/>
-          <p:nvPr/>
-        </p:nvSpPr>
-        <p:spPr>
-          <a:xfrm>
-            <a:off x="4034155" y="6269593"/>
-            <a:ext cx="3372485" cy="369332"/>
+            <a:off x="752475" y="967859"/>
+            <a:ext cx="10687050" cy="369332"/>
           </a:xfrm>
           <a:prstGeom prst="rect">
             <a:avLst/>
@@ -5431,7 +6534,7 @@
                 <a:effectLst/>
                 <a:latin typeface="Arial" panose="020B0604020202020204" pitchFamily="34" charset="0"/>
               </a:rPr>
-              <a:t>Host nation advantage?</a:t>
+              <a:t>Graph</a:t>
             </a:r>
             <a:endParaRPr lang="en-US" dirty="0"/>
           </a:p>
@@ -5440,7 +6543,7 @@
     </p:spTree>
     <p:extLst>
       <p:ext uri="{BB962C8B-B14F-4D97-AF65-F5344CB8AC3E}">
-        <p14:creationId xmlns:p14="http://schemas.microsoft.com/office/powerpoint/2010/main" val="199437817"/>
+        <p14:creationId xmlns:p14="http://schemas.microsoft.com/office/powerpoint/2010/main" val="218435581"/>
       </p:ext>
     </p:extLst>
   </p:cSld>
@@ -5743,4 +6846,299 @@
     </a:ext>
   </a:extLst>
 </a:theme>
+</file>
+
+<file path=ppt/theme/theme2.xml><?xml version="1.0" encoding="utf-8"?>
+<a:theme xmlns:a="http://schemas.openxmlformats.org/drawingml/2006/main" name="Office テーマ">
+  <a:themeElements>
+    <a:clrScheme name="Office">
+      <a:dk1>
+        <a:sysClr val="windowText" lastClr="000000"/>
+      </a:dk1>
+      <a:lt1>
+        <a:sysClr val="window" lastClr="FFFFFF"/>
+      </a:lt1>
+      <a:dk2>
+        <a:srgbClr val="44546A"/>
+      </a:dk2>
+      <a:lt2>
+        <a:srgbClr val="E7E6E6"/>
+      </a:lt2>
+      <a:accent1>
+        <a:srgbClr val="4472C4"/>
+      </a:accent1>
+      <a:accent2>
+        <a:srgbClr val="ED7D31"/>
+      </a:accent2>
+      <a:accent3>
+        <a:srgbClr val="A5A5A5"/>
+      </a:accent3>
+      <a:accent4>
+        <a:srgbClr val="FFC000"/>
+      </a:accent4>
+      <a:accent5>
+        <a:srgbClr val="5B9BD5"/>
+      </a:accent5>
+      <a:accent6>
+        <a:srgbClr val="70AD47"/>
+      </a:accent6>
+      <a:hlink>
+        <a:srgbClr val="0563C1"/>
+      </a:hlink>
+      <a:folHlink>
+        <a:srgbClr val="954F72"/>
+      </a:folHlink>
+    </a:clrScheme>
+    <a:fontScheme name="Office">
+      <a:majorFont>
+        <a:latin typeface="Calibri Light" panose="020F0302020204030204"/>
+        <a:ea typeface=""/>
+        <a:cs typeface=""/>
+        <a:font script="Jpan" typeface="游ゴシック Light"/>
+        <a:font script="Hang" typeface="맑은 고딕"/>
+        <a:font script="Hans" typeface="等线 Light"/>
+        <a:font script="Hant" typeface="新細明體"/>
+        <a:font script="Arab" typeface="Times New Roman"/>
+        <a:font script="Hebr" typeface="Times New Roman"/>
+        <a:font script="Thai" typeface="Angsana New"/>
+        <a:font script="Ethi" typeface="Nyala"/>
+        <a:font script="Beng" typeface="Vrinda"/>
+        <a:font script="Gujr" typeface="Shruti"/>
+        <a:font script="Khmr" typeface="MoolBoran"/>
+        <a:font script="Knda" typeface="Tunga"/>
+        <a:font script="Guru" typeface="Raavi"/>
+        <a:font script="Cans" typeface="Euphemia"/>
+        <a:font script="Cher" typeface="Plantagenet Cherokee"/>
+        <a:font script="Yiii" typeface="Microsoft Yi Baiti"/>
+        <a:font script="Tibt" typeface="Microsoft Himalaya"/>
+        <a:font script="Thaa" typeface="MV Boli"/>
+        <a:font script="Deva" typeface="Mangal"/>
+        <a:font script="Telu" typeface="Gautami"/>
+        <a:font script="Taml" typeface="Latha"/>
+        <a:font script="Syrc" typeface="Estrangelo Edessa"/>
+        <a:font script="Orya" typeface="Kalinga"/>
+        <a:font script="Mlym" typeface="Kartika"/>
+        <a:font script="Laoo" typeface="DokChampa"/>
+        <a:font script="Sinh" typeface="Iskoola Pota"/>
+        <a:font script="Mong" typeface="Mongolian Baiti"/>
+        <a:font script="Viet" typeface="Times New Roman"/>
+        <a:font script="Uigh" typeface="Microsoft Uighur"/>
+        <a:font script="Geor" typeface="Sylfaen"/>
+        <a:font script="Armn" typeface="Arial"/>
+        <a:font script="Bugi" typeface="Leelawadee UI"/>
+        <a:font script="Bopo" typeface="Microsoft JhengHei"/>
+        <a:font script="Java" typeface="Javanese Text"/>
+        <a:font script="Lisu" typeface="Segoe UI"/>
+        <a:font script="Mymr" typeface="Myanmar Text"/>
+        <a:font script="Nkoo" typeface="Ebrima"/>
+        <a:font script="Olck" typeface="Nirmala UI"/>
+        <a:font script="Osma" typeface="Ebrima"/>
+        <a:font script="Phag" typeface="Phagspa"/>
+        <a:font script="Syrn" typeface="Estrangelo Edessa"/>
+        <a:font script="Syrj" typeface="Estrangelo Edessa"/>
+        <a:font script="Syre" typeface="Estrangelo Edessa"/>
+        <a:font script="Sora" typeface="Nirmala UI"/>
+        <a:font script="Tale" typeface="Microsoft Tai Le"/>
+        <a:font script="Talu" typeface="Microsoft New Tai Lue"/>
+        <a:font script="Tfng" typeface="Ebrima"/>
+      </a:majorFont>
+      <a:minorFont>
+        <a:latin typeface="Calibri" panose="020F0502020204030204"/>
+        <a:ea typeface=""/>
+        <a:cs typeface=""/>
+        <a:font script="Jpan" typeface="游ゴシック"/>
+        <a:font script="Hang" typeface="맑은 고딕"/>
+        <a:font script="Hans" typeface="等线"/>
+        <a:font script="Hant" typeface="新細明體"/>
+        <a:font script="Arab" typeface="Arial"/>
+        <a:font script="Hebr" typeface="Arial"/>
+        <a:font script="Thai" typeface="Cordia New"/>
+        <a:font script="Ethi" typeface="Nyala"/>
+        <a:font script="Beng" typeface="Vrinda"/>
+        <a:font script="Gujr" typeface="Shruti"/>
+        <a:font script="Khmr" typeface="DaunPenh"/>
+        <a:font script="Knda" typeface="Tunga"/>
+        <a:font script="Guru" typeface="Raavi"/>
+        <a:font script="Cans" typeface="Euphemia"/>
+        <a:font script="Cher" typeface="Plantagenet Cherokee"/>
+        <a:font script="Yiii" typeface="Microsoft Yi Baiti"/>
+        <a:font script="Tibt" typeface="Microsoft Himalaya"/>
+        <a:font script="Thaa" typeface="MV Boli"/>
+        <a:font script="Deva" typeface="Mangal"/>
+        <a:font script="Telu" typeface="Gautami"/>
+        <a:font script="Taml" typeface="Latha"/>
+        <a:font script="Syrc" typeface="Estrangelo Edessa"/>
+        <a:font script="Orya" typeface="Kalinga"/>
+        <a:font script="Mlym" typeface="Kartika"/>
+        <a:font script="Laoo" typeface="DokChampa"/>
+        <a:font script="Sinh" typeface="Iskoola Pota"/>
+        <a:font script="Mong" typeface="Mongolian Baiti"/>
+        <a:font script="Viet" typeface="Arial"/>
+        <a:font script="Uigh" typeface="Microsoft Uighur"/>
+        <a:font script="Geor" typeface="Sylfaen"/>
+        <a:font script="Armn" typeface="Arial"/>
+        <a:font script="Bugi" typeface="Leelawadee UI"/>
+        <a:font script="Bopo" typeface="Microsoft JhengHei"/>
+        <a:font script="Java" typeface="Javanese Text"/>
+        <a:font script="Lisu" typeface="Segoe UI"/>
+        <a:font script="Mymr" typeface="Myanmar Text"/>
+        <a:font script="Nkoo" typeface="Ebrima"/>
+        <a:font script="Olck" typeface="Nirmala UI"/>
+        <a:font script="Osma" typeface="Ebrima"/>
+        <a:font script="Phag" typeface="Phagspa"/>
+        <a:font script="Syrn" typeface="Estrangelo Edessa"/>
+        <a:font script="Syrj" typeface="Estrangelo Edessa"/>
+        <a:font script="Syre" typeface="Estrangelo Edessa"/>
+        <a:font script="Sora" typeface="Nirmala UI"/>
+        <a:font script="Tale" typeface="Microsoft Tai Le"/>
+        <a:font script="Talu" typeface="Microsoft New Tai Lue"/>
+        <a:font script="Tfng" typeface="Ebrima"/>
+      </a:minorFont>
+    </a:fontScheme>
+    <a:fmtScheme name="Office">
+      <a:fillStyleLst>
+        <a:solidFill>
+          <a:schemeClr val="phClr"/>
+        </a:solidFill>
+        <a:gradFill rotWithShape="1">
+          <a:gsLst>
+            <a:gs pos="0">
+              <a:schemeClr val="phClr">
+                <a:lumMod val="110000"/>
+                <a:satMod val="105000"/>
+                <a:tint val="67000"/>
+              </a:schemeClr>
+            </a:gs>
+            <a:gs pos="50000">
+              <a:schemeClr val="phClr">
+                <a:lumMod val="105000"/>
+                <a:satMod val="103000"/>
+                <a:tint val="73000"/>
+              </a:schemeClr>
+            </a:gs>
+            <a:gs pos="100000">
+              <a:schemeClr val="phClr">
+                <a:lumMod val="105000"/>
+                <a:satMod val="109000"/>
+                <a:tint val="81000"/>
+              </a:schemeClr>
+            </a:gs>
+          </a:gsLst>
+          <a:lin ang="5400000" scaled="0"/>
+        </a:gradFill>
+        <a:gradFill rotWithShape="1">
+          <a:gsLst>
+            <a:gs pos="0">
+              <a:schemeClr val="phClr">
+                <a:satMod val="103000"/>
+                <a:lumMod val="102000"/>
+                <a:tint val="94000"/>
+              </a:schemeClr>
+            </a:gs>
+            <a:gs pos="50000">
+              <a:schemeClr val="phClr">
+                <a:satMod val="110000"/>
+                <a:lumMod val="100000"/>
+                <a:shade val="100000"/>
+              </a:schemeClr>
+            </a:gs>
+            <a:gs pos="100000">
+              <a:schemeClr val="phClr">
+                <a:lumMod val="99000"/>
+                <a:satMod val="120000"/>
+                <a:shade val="78000"/>
+              </a:schemeClr>
+            </a:gs>
+          </a:gsLst>
+          <a:lin ang="5400000" scaled="0"/>
+        </a:gradFill>
+      </a:fillStyleLst>
+      <a:lnStyleLst>
+        <a:ln w="6350" cap="flat" cmpd="sng" algn="ctr">
+          <a:solidFill>
+            <a:schemeClr val="phClr"/>
+          </a:solidFill>
+          <a:prstDash val="solid"/>
+          <a:miter lim="800000"/>
+        </a:ln>
+        <a:ln w="12700" cap="flat" cmpd="sng" algn="ctr">
+          <a:solidFill>
+            <a:schemeClr val="phClr"/>
+          </a:solidFill>
+          <a:prstDash val="solid"/>
+          <a:miter lim="800000"/>
+        </a:ln>
+        <a:ln w="19050" cap="flat" cmpd="sng" algn="ctr">
+          <a:solidFill>
+            <a:schemeClr val="phClr"/>
+          </a:solidFill>
+          <a:prstDash val="solid"/>
+          <a:miter lim="800000"/>
+        </a:ln>
+      </a:lnStyleLst>
+      <a:effectStyleLst>
+        <a:effectStyle>
+          <a:effectLst/>
+        </a:effectStyle>
+        <a:effectStyle>
+          <a:effectLst/>
+        </a:effectStyle>
+        <a:effectStyle>
+          <a:effectLst>
+            <a:outerShdw blurRad="57150" dist="19050" dir="5400000" algn="ctr" rotWithShape="0">
+              <a:srgbClr val="000000">
+                <a:alpha val="63000"/>
+              </a:srgbClr>
+            </a:outerShdw>
+          </a:effectLst>
+        </a:effectStyle>
+      </a:effectStyleLst>
+      <a:bgFillStyleLst>
+        <a:solidFill>
+          <a:schemeClr val="phClr"/>
+        </a:solidFill>
+        <a:solidFill>
+          <a:schemeClr val="phClr">
+            <a:tint val="95000"/>
+            <a:satMod val="170000"/>
+          </a:schemeClr>
+        </a:solidFill>
+        <a:gradFill rotWithShape="1">
+          <a:gsLst>
+            <a:gs pos="0">
+              <a:schemeClr val="phClr">
+                <a:tint val="93000"/>
+                <a:satMod val="150000"/>
+                <a:shade val="98000"/>
+                <a:lumMod val="102000"/>
+              </a:schemeClr>
+            </a:gs>
+            <a:gs pos="50000">
+              <a:schemeClr val="phClr">
+                <a:tint val="98000"/>
+                <a:satMod val="130000"/>
+                <a:shade val="90000"/>
+                <a:lumMod val="103000"/>
+              </a:schemeClr>
+            </a:gs>
+            <a:gs pos="100000">
+              <a:schemeClr val="phClr">
+                <a:shade val="63000"/>
+                <a:satMod val="120000"/>
+              </a:schemeClr>
+            </a:gs>
+          </a:gsLst>
+          <a:lin ang="5400000" scaled="0"/>
+        </a:gradFill>
+      </a:bgFillStyleLst>
+    </a:fmtScheme>
+  </a:themeElements>
+  <a:objectDefaults/>
+  <a:extraClrSchemeLst/>
+  <a:extLst>
+    <a:ext uri="{05A4C25C-085E-4340-85A3-A5531E510DB2}">
+      <thm15:themeFamily xmlns:thm15="http://schemas.microsoft.com/office/thememl/2012/main" name="Office Theme" id="{62F939B6-93AF-4DB8-9C6B-D6C7DFDC589F}" vid="{4A3C46E8-61CC-4603-A589-7422A47A8E4A}"/>
+    </a:ext>
+  </a:extLst>
+</a:theme>
 </file>
</xml_diff>

<commit_message>
deleted the last page and blank comments to ppt
</commit_message>
<xml_diff>
--- a/olympics by wildcats.pptx
+++ b/olympics by wildcats.pptx
@@ -5,7 +5,7 @@
     <p:sldMasterId id="2147483648" r:id="rId1"/>
   </p:sldMasterIdLst>
   <p:notesMasterIdLst>
-    <p:notesMasterId r:id="rId15"/>
+    <p:notesMasterId r:id="rId14"/>
   </p:notesMasterIdLst>
   <p:sldIdLst>
     <p:sldId id="256" r:id="rId2"/>
@@ -20,7 +20,6 @@
     <p:sldId id="262" r:id="rId11"/>
     <p:sldId id="270" r:id="rId12"/>
     <p:sldId id="263" r:id="rId13"/>
-    <p:sldId id="260" r:id="rId14"/>
   </p:sldIdLst>
   <p:sldSz cx="12192000" cy="6858000"/>
   <p:notesSz cx="6858000" cy="9144000"/>
@@ -139,34 +138,6 @@
 </p:cmAuthorLst>
 </file>
 
-<file path=ppt/comments/comment1.xml><?xml version="1.0" encoding="utf-8"?>
-<p:cmLst xmlns:a="http://schemas.openxmlformats.org/drawingml/2006/main" xmlns:r="http://schemas.openxmlformats.org/officeDocument/2006/relationships" xmlns:p="http://schemas.openxmlformats.org/presentationml/2006/main">
-  <p:cm authorId="1" dt="2021-07-06T22:47:40.344" idx="2">
-    <p:pos x="10" y="10"/>
-    <p:text/>
-    <p:extLst>
-      <p:ext uri="{C676402C-5697-4E1C-873F-D02D1690AC5C}">
-        <p15:threadingInfo xmlns:p15="http://schemas.microsoft.com/office/powerpoint/2012/main" timeZoneBias="420"/>
-      </p:ext>
-    </p:extLst>
-  </p:cm>
-</p:cmLst>
-</file>
-
-<file path=ppt/comments/comment2.xml><?xml version="1.0" encoding="utf-8"?>
-<p:cmLst xmlns:a="http://schemas.openxmlformats.org/drawingml/2006/main" xmlns:r="http://schemas.openxmlformats.org/officeDocument/2006/relationships" xmlns:p="http://schemas.openxmlformats.org/presentationml/2006/main">
-  <p:cm authorId="1" dt="2021-07-06T22:47:40.344" idx="1">
-    <p:pos x="10" y="10"/>
-    <p:text/>
-    <p:extLst>
-      <p:ext uri="{C676402C-5697-4E1C-873F-D02D1690AC5C}">
-        <p15:threadingInfo xmlns:p15="http://schemas.microsoft.com/office/powerpoint/2012/main" timeZoneBias="420"/>
-      </p:ext>
-    </p:extLst>
-  </p:cm>
-</p:cmLst>
-</file>
-
 <file path=ppt/notesMasters/notesMaster1.xml><?xml version="1.0" encoding="utf-8"?>
 <p:notesMaster xmlns:a="http://schemas.openxmlformats.org/drawingml/2006/main" xmlns:r="http://schemas.openxmlformats.org/officeDocument/2006/relationships" xmlns:p="http://schemas.openxmlformats.org/presentationml/2006/main">
   <p:cSld>
@@ -249,7 +220,7 @@
           <a:p>
             <a:fld id="{5B7ADCDD-B44A-4CE9-B3E3-2626A84091E9}" type="datetimeFigureOut">
               <a:rPr lang="en-US" smtClean="0"/>
-              <a:t>7/6/2021</a:t>
+              <a:t>7/7/2021</a:t>
             </a:fld>
             <a:endParaRPr lang="en-US"/>
           </a:p>
@@ -1381,90 +1352,6 @@
 </p:notes>
 </file>
 
-<file path=ppt/notesSlides/notesSlide8.xml><?xml version="1.0" encoding="utf-8"?>
-<p:notes xmlns:a="http://schemas.openxmlformats.org/drawingml/2006/main" xmlns:r="http://schemas.openxmlformats.org/officeDocument/2006/relationships" xmlns:p="http://schemas.openxmlformats.org/presentationml/2006/main">
-  <p:cSld>
-    <p:spTree>
-      <p:nvGrpSpPr>
-        <p:cNvPr id="1" name=""/>
-        <p:cNvGrpSpPr/>
-        <p:nvPr/>
-      </p:nvGrpSpPr>
-      <p:grpSpPr>
-        <a:xfrm>
-          <a:off x="0" y="0"/>
-          <a:ext cx="0" cy="0"/>
-          <a:chOff x="0" y="0"/>
-          <a:chExt cx="0" cy="0"/>
-        </a:xfrm>
-      </p:grpSpPr>
-      <p:sp>
-        <p:nvSpPr>
-          <p:cNvPr id="2" name="スライド イメージ プレースホルダー 1"/>
-          <p:cNvSpPr>
-            <a:spLocks noGrp="1" noRot="1" noChangeAspect="1"/>
-          </p:cNvSpPr>
-          <p:nvPr>
-            <p:ph type="sldImg"/>
-          </p:nvPr>
-        </p:nvSpPr>
-        <p:spPr/>
-      </p:sp>
-      <p:sp>
-        <p:nvSpPr>
-          <p:cNvPr id="3" name="ノート プレースホルダー 2"/>
-          <p:cNvSpPr>
-            <a:spLocks noGrp="1"/>
-          </p:cNvSpPr>
-          <p:nvPr>
-            <p:ph type="body" idx="1"/>
-          </p:nvPr>
-        </p:nvSpPr>
-        <p:spPr/>
-        <p:txBody>
-          <a:bodyPr/>
-          <a:lstStyle/>
-          <a:p>
-            <a:endParaRPr lang="en-US" dirty="0"/>
-          </a:p>
-        </p:txBody>
-      </p:sp>
-      <p:sp>
-        <p:nvSpPr>
-          <p:cNvPr id="4" name="スライド番号プレースホルダー 3"/>
-          <p:cNvSpPr>
-            <a:spLocks noGrp="1"/>
-          </p:cNvSpPr>
-          <p:nvPr>
-            <p:ph type="sldNum" sz="quarter" idx="5"/>
-          </p:nvPr>
-        </p:nvSpPr>
-        <p:spPr/>
-        <p:txBody>
-          <a:bodyPr/>
-          <a:lstStyle/>
-          <a:p>
-            <a:fld id="{D866256B-135A-4159-8502-B8E1D01A85B5}" type="slidenum">
-              <a:rPr lang="en-US" smtClean="0"/>
-              <a:t>13</a:t>
-            </a:fld>
-            <a:endParaRPr lang="en-US"/>
-          </a:p>
-        </p:txBody>
-      </p:sp>
-    </p:spTree>
-    <p:extLst>
-      <p:ext uri="{BB962C8B-B14F-4D97-AF65-F5344CB8AC3E}">
-        <p14:creationId xmlns:p14="http://schemas.microsoft.com/office/powerpoint/2010/main" val="682509724"/>
-      </p:ext>
-    </p:extLst>
-  </p:cSld>
-  <p:clrMapOvr>
-    <a:masterClrMapping/>
-  </p:clrMapOvr>
-</p:notes>
-</file>
-
 <file path=ppt/slideLayouts/slideLayout1.xml><?xml version="1.0" encoding="utf-8"?>
 <p:sldLayout xmlns:a="http://schemas.openxmlformats.org/drawingml/2006/main" xmlns:r="http://schemas.openxmlformats.org/officeDocument/2006/relationships" xmlns:p="http://schemas.openxmlformats.org/presentationml/2006/main" type="title" preserve="1">
   <p:cSld name="タイトル スライド">
@@ -1614,7 +1501,7 @@
           <a:p>
             <a:fld id="{3321EEB9-68B1-4379-896F-CAC32EF57190}" type="datetimeFigureOut">
               <a:rPr lang="en-US" smtClean="0"/>
-              <a:t>7/6/2021</a:t>
+              <a:t>7/7/2021</a:t>
             </a:fld>
             <a:endParaRPr lang="en-US"/>
           </a:p>
@@ -1846,7 +1733,7 @@
           <a:p>
             <a:fld id="{3321EEB9-68B1-4379-896F-CAC32EF57190}" type="datetimeFigureOut">
               <a:rPr lang="en-US" smtClean="0"/>
-              <a:t>7/6/2021</a:t>
+              <a:t>7/7/2021</a:t>
             </a:fld>
             <a:endParaRPr lang="en-US"/>
           </a:p>
@@ -2088,7 +1975,7 @@
           <a:p>
             <a:fld id="{3321EEB9-68B1-4379-896F-CAC32EF57190}" type="datetimeFigureOut">
               <a:rPr lang="en-US" smtClean="0"/>
-              <a:t>7/6/2021</a:t>
+              <a:t>7/7/2021</a:t>
             </a:fld>
             <a:endParaRPr lang="en-US"/>
           </a:p>
@@ -2320,7 +2207,7 @@
           <a:p>
             <a:fld id="{3321EEB9-68B1-4379-896F-CAC32EF57190}" type="datetimeFigureOut">
               <a:rPr lang="en-US" smtClean="0"/>
-              <a:t>7/6/2021</a:t>
+              <a:t>7/7/2021</a:t>
             </a:fld>
             <a:endParaRPr lang="en-US"/>
           </a:p>
@@ -2596,7 +2483,7 @@
           <a:p>
             <a:fld id="{3321EEB9-68B1-4379-896F-CAC32EF57190}" type="datetimeFigureOut">
               <a:rPr lang="en-US" smtClean="0"/>
-              <a:t>7/6/2021</a:t>
+              <a:t>7/7/2021</a:t>
             </a:fld>
             <a:endParaRPr lang="en-US"/>
           </a:p>
@@ -2928,7 +2815,7 @@
           <a:p>
             <a:fld id="{3321EEB9-68B1-4379-896F-CAC32EF57190}" type="datetimeFigureOut">
               <a:rPr lang="en-US" smtClean="0"/>
-              <a:t>7/6/2021</a:t>
+              <a:t>7/7/2021</a:t>
             </a:fld>
             <a:endParaRPr lang="en-US"/>
           </a:p>
@@ -3407,7 +3294,7 @@
           <a:p>
             <a:fld id="{3321EEB9-68B1-4379-896F-CAC32EF57190}" type="datetimeFigureOut">
               <a:rPr lang="en-US" smtClean="0"/>
-              <a:t>7/6/2021</a:t>
+              <a:t>7/7/2021</a:t>
             </a:fld>
             <a:endParaRPr lang="en-US"/>
           </a:p>
@@ -3549,7 +3436,7 @@
           <a:p>
             <a:fld id="{3321EEB9-68B1-4379-896F-CAC32EF57190}" type="datetimeFigureOut">
               <a:rPr lang="en-US" smtClean="0"/>
-              <a:t>7/6/2021</a:t>
+              <a:t>7/7/2021</a:t>
             </a:fld>
             <a:endParaRPr lang="en-US"/>
           </a:p>
@@ -3662,7 +3549,7 @@
           <a:p>
             <a:fld id="{3321EEB9-68B1-4379-896F-CAC32EF57190}" type="datetimeFigureOut">
               <a:rPr lang="en-US" smtClean="0"/>
-              <a:t>7/6/2021</a:t>
+              <a:t>7/7/2021</a:t>
             </a:fld>
             <a:endParaRPr lang="en-US"/>
           </a:p>
@@ -4007,7 +3894,7 @@
           <a:p>
             <a:fld id="{3321EEB9-68B1-4379-896F-CAC32EF57190}" type="datetimeFigureOut">
               <a:rPr lang="en-US" smtClean="0"/>
-              <a:t>7/6/2021</a:t>
+              <a:t>7/7/2021</a:t>
             </a:fld>
             <a:endParaRPr lang="en-US"/>
           </a:p>
@@ -4296,7 +4183,7 @@
           <a:p>
             <a:fld id="{3321EEB9-68B1-4379-896F-CAC32EF57190}" type="datetimeFigureOut">
               <a:rPr lang="en-US" smtClean="0"/>
-              <a:t>7/6/2021</a:t>
+              <a:t>7/7/2021</a:t>
             </a:fld>
             <a:endParaRPr lang="en-US"/>
           </a:p>
@@ -4571,7 +4458,7 @@
           <a:p>
             <a:fld id="{3321EEB9-68B1-4379-896F-CAC32EF57190}" type="datetimeFigureOut">
               <a:rPr lang="en-US" smtClean="0"/>
-              <a:t>7/6/2021</a:t>
+              <a:t>7/7/2021</a:t>
             </a:fld>
             <a:endParaRPr lang="en-US"/>
           </a:p>
@@ -5552,82 +5439,6 @@
     <p:extLst>
       <p:ext uri="{BB962C8B-B14F-4D97-AF65-F5344CB8AC3E}">
         <p14:creationId xmlns:p14="http://schemas.microsoft.com/office/powerpoint/2010/main" val="4235606923"/>
-      </p:ext>
-    </p:extLst>
-  </p:cSld>
-  <p:clrMapOvr>
-    <a:masterClrMapping/>
-  </p:clrMapOvr>
-</p:sld>
-</file>
-
-<file path=ppt/slides/slide13.xml><?xml version="1.0" encoding="utf-8"?>
-<p:sld xmlns:a="http://schemas.openxmlformats.org/drawingml/2006/main" xmlns:r="http://schemas.openxmlformats.org/officeDocument/2006/relationships" xmlns:p="http://schemas.openxmlformats.org/presentationml/2006/main">
-  <p:cSld>
-    <p:spTree>
-      <p:nvGrpSpPr>
-        <p:cNvPr id="1" name=""/>
-        <p:cNvGrpSpPr/>
-        <p:nvPr/>
-      </p:nvGrpSpPr>
-      <p:grpSpPr>
-        <a:xfrm>
-          <a:off x="0" y="0"/>
-          <a:ext cx="0" cy="0"/>
-          <a:chOff x="0" y="0"/>
-          <a:chExt cx="0" cy="0"/>
-        </a:xfrm>
-      </p:grpSpPr>
-      <p:sp>
-        <p:nvSpPr>
-          <p:cNvPr id="2" name="テキスト ボックス 1">
-            <a:extLst>
-              <a:ext uri="{FF2B5EF4-FFF2-40B4-BE49-F238E27FC236}">
-                <a16:creationId xmlns:a16="http://schemas.microsoft.com/office/drawing/2014/main" id="{02706F4B-FB0C-4B84-ACA3-267780375BED}"/>
-              </a:ext>
-            </a:extLst>
-          </p:cNvPr>
-          <p:cNvSpPr txBox="1"/>
-          <p:nvPr/>
-        </p:nvSpPr>
-        <p:spPr>
-          <a:xfrm>
-            <a:off x="295274" y="219075"/>
-            <a:ext cx="10687051" cy="523220"/>
-          </a:xfrm>
-          <a:prstGeom prst="rect">
-            <a:avLst/>
-          </a:prstGeom>
-          <a:noFill/>
-        </p:spPr>
-        <p:txBody>
-          <a:bodyPr wrap="square" rtlCol="0">
-            <a:spAutoFit/>
-          </a:bodyPr>
-          <a:lstStyle/>
-          <a:p>
-            <a:r>
-              <a:rPr lang="en-US" sz="2800" b="1" i="0" u="none" strike="noStrike" dirty="0">
-                <a:solidFill>
-                  <a:srgbClr val="0070C0"/>
-                </a:solidFill>
-                <a:effectLst/>
-                <a:latin typeface="Arial" panose="020B0604020202020204" pitchFamily="34" charset="0"/>
-              </a:rPr>
-              <a:t>Conclusion</a:t>
-            </a:r>
-            <a:endParaRPr lang="en-US" sz="2800" b="1" dirty="0">
-              <a:solidFill>
-                <a:srgbClr val="0070C0"/>
-              </a:solidFill>
-            </a:endParaRPr>
-          </a:p>
-        </p:txBody>
-      </p:sp>
-    </p:spTree>
-    <p:extLst>
-      <p:ext uri="{BB962C8B-B14F-4D97-AF65-F5344CB8AC3E}">
-        <p14:creationId xmlns:p14="http://schemas.microsoft.com/office/powerpoint/2010/main" val="199437817"/>
       </p:ext>
     </p:extLst>
   </p:cSld>

</xml_diff>